<commit_message>
Updated presentation and graph generation
</commit_message>
<xml_diff>
--- a/Presentation/PresentazioneDispositivi.pptx
+++ b/Presentation/PresentazioneDispositivi.pptx
@@ -11,10 +11,12 @@
     <p:sldId id="259" r:id="rId5"/>
     <p:sldId id="260" r:id="rId6"/>
     <p:sldId id="265" r:id="rId7"/>
-    <p:sldId id="261" r:id="rId8"/>
-    <p:sldId id="262" r:id="rId9"/>
+    <p:sldId id="267" r:id="rId8"/>
+    <p:sldId id="261" r:id="rId9"/>
     <p:sldId id="263" r:id="rId10"/>
-    <p:sldId id="264" r:id="rId11"/>
+    <p:sldId id="266" r:id="rId11"/>
+    <p:sldId id="262" r:id="rId12"/>
+    <p:sldId id="264" r:id="rId13"/>
   </p:sldIdLst>
   <p:sldSz cx="12192000" cy="6858000"/>
   <p:notesSz cx="6858000" cy="9144000"/>
@@ -113,6 +115,11 @@
       </a:defRPr>
     </a:lvl9pPr>
   </p:defaultTextStyle>
+  <p:extLst>
+    <p:ext uri="{EFAFB233-063F-42B5-8137-9DF3F51BA10A}">
+      <p15:sldGuideLst xmlns:p15="http://schemas.microsoft.com/office/powerpoint/2012/main"/>
+    </p:ext>
+  </p:extLst>
 </p:presentation>
 </file>
 
@@ -174,7 +181,7 @@
           <a:noFill/>
           <a:extLst>
             <a:ext uri="{909E8E84-426E-40dd-AFC4-6F175D3DCCD1}">
-              <a14:hiddenFill xmlns:a14="http://schemas.microsoft.com/office/drawing/2010/main" xmlns="">
+              <a14:hiddenFill xmlns="" xmlns:a14="http://schemas.microsoft.com/office/drawing/2010/main">
                 <a:solidFill>
                   <a:srgbClr val="FFFFFF"/>
                 </a:solidFill>
@@ -234,7 +241,7 @@
             </a:ln>
             <a:extLst>
               <a:ext uri="{91240B29-F687-4f45-9708-019B960494DF}">
-                <a14:hiddenLine xmlns:a14="http://schemas.microsoft.com/office/drawing/2010/main" xmlns="" w="9525">
+                <a14:hiddenLine xmlns="" xmlns:a14="http://schemas.microsoft.com/office/drawing/2010/main" w="9525">
                   <a:solidFill>
                     <a:srgbClr val="000000"/>
                   </a:solidFill>
@@ -324,7 +331,7 @@
             </a:ln>
             <a:extLst>
               <a:ext uri="{91240B29-F687-4f45-9708-019B960494DF}">
-                <a14:hiddenLine xmlns:a14="http://schemas.microsoft.com/office/drawing/2010/main" xmlns="" w="9525">
+                <a14:hiddenLine xmlns="" xmlns:a14="http://schemas.microsoft.com/office/drawing/2010/main" w="9525">
                   <a:solidFill>
                     <a:srgbClr val="000000"/>
                   </a:solidFill>
@@ -414,7 +421,7 @@
             </a:ln>
             <a:extLst>
               <a:ext uri="{91240B29-F687-4f45-9708-019B960494DF}">
-                <a14:hiddenLine xmlns:a14="http://schemas.microsoft.com/office/drawing/2010/main" xmlns="" w="9525">
+                <a14:hiddenLine xmlns="" xmlns:a14="http://schemas.microsoft.com/office/drawing/2010/main" w="9525">
                   <a:solidFill>
                     <a:srgbClr val="000000"/>
                   </a:solidFill>
@@ -448,7 +455,7 @@
             </a:ln>
             <a:extLst>
               <a:ext uri="{91240B29-F687-4f45-9708-019B960494DF}">
-                <a14:hiddenLine xmlns:a14="http://schemas.microsoft.com/office/drawing/2010/main" xmlns="" w="9525">
+                <a14:hiddenLine xmlns="" xmlns:a14="http://schemas.microsoft.com/office/drawing/2010/main" w="9525">
                   <a:solidFill>
                     <a:srgbClr val="000000"/>
                   </a:solidFill>
@@ -538,7 +545,7 @@
             </a:ln>
             <a:extLst>
               <a:ext uri="{91240B29-F687-4f45-9708-019B960494DF}">
-                <a14:hiddenLine xmlns:a14="http://schemas.microsoft.com/office/drawing/2010/main" xmlns="" w="9525">
+                <a14:hiddenLine xmlns="" xmlns:a14="http://schemas.microsoft.com/office/drawing/2010/main" w="9525">
                   <a:solidFill>
                     <a:srgbClr val="000000"/>
                   </a:solidFill>
@@ -600,7 +607,7 @@
             </a:ln>
             <a:extLst>
               <a:ext uri="{91240B29-F687-4f45-9708-019B960494DF}">
-                <a14:hiddenLine xmlns:a14="http://schemas.microsoft.com/office/drawing/2010/main" xmlns="" w="9525">
+                <a14:hiddenLine xmlns="" xmlns:a14="http://schemas.microsoft.com/office/drawing/2010/main" w="9525">
                   <a:solidFill>
                     <a:srgbClr val="000000"/>
                   </a:solidFill>
@@ -662,7 +669,7 @@
             </a:ln>
             <a:extLst>
               <a:ext uri="{91240B29-F687-4f45-9708-019B960494DF}">
-                <a14:hiddenLine xmlns:a14="http://schemas.microsoft.com/office/drawing/2010/main" xmlns="" w="9525">
+                <a14:hiddenLine xmlns="" xmlns:a14="http://schemas.microsoft.com/office/drawing/2010/main" w="9525">
                   <a:solidFill>
                     <a:srgbClr val="000000"/>
                   </a:solidFill>
@@ -752,7 +759,7 @@
             </a:ln>
             <a:extLst>
               <a:ext uri="{91240B29-F687-4f45-9708-019B960494DF}">
-                <a14:hiddenLine xmlns:a14="http://schemas.microsoft.com/office/drawing/2010/main" xmlns="" w="9525">
+                <a14:hiddenLine xmlns="" xmlns:a14="http://schemas.microsoft.com/office/drawing/2010/main" w="9525">
                   <a:solidFill>
                     <a:srgbClr val="000000"/>
                   </a:solidFill>
@@ -814,7 +821,7 @@
             </a:ln>
             <a:extLst>
               <a:ext uri="{91240B29-F687-4f45-9708-019B960494DF}">
-                <a14:hiddenLine xmlns:a14="http://schemas.microsoft.com/office/drawing/2010/main" xmlns="" w="9525">
+                <a14:hiddenLine xmlns="" xmlns:a14="http://schemas.microsoft.com/office/drawing/2010/main" w="9525">
                   <a:solidFill>
                     <a:srgbClr val="000000"/>
                   </a:solidFill>
@@ -876,7 +883,7 @@
             </a:ln>
             <a:extLst>
               <a:ext uri="{91240B29-F687-4f45-9708-019B960494DF}">
-                <a14:hiddenLine xmlns:a14="http://schemas.microsoft.com/office/drawing/2010/main" xmlns="" w="9525">
+                <a14:hiddenLine xmlns="" xmlns:a14="http://schemas.microsoft.com/office/drawing/2010/main" w="9525">
                   <a:solidFill>
                     <a:srgbClr val="000000"/>
                   </a:solidFill>
@@ -966,7 +973,7 @@
             </a:ln>
             <a:extLst>
               <a:ext uri="{91240B29-F687-4f45-9708-019B960494DF}">
-                <a14:hiddenLine xmlns:a14="http://schemas.microsoft.com/office/drawing/2010/main" xmlns="" w="9525">
+                <a14:hiddenLine xmlns="" xmlns:a14="http://schemas.microsoft.com/office/drawing/2010/main" w="9525">
                   <a:solidFill>
                     <a:srgbClr val="000000"/>
                   </a:solidFill>
@@ -1056,7 +1063,7 @@
             </a:ln>
             <a:extLst>
               <a:ext uri="{91240B29-F687-4f45-9708-019B960494DF}">
-                <a14:hiddenLine xmlns:a14="http://schemas.microsoft.com/office/drawing/2010/main" xmlns="" w="9525">
+                <a14:hiddenLine xmlns="" xmlns:a14="http://schemas.microsoft.com/office/drawing/2010/main" w="9525">
                   <a:solidFill>
                     <a:srgbClr val="000000"/>
                   </a:solidFill>
@@ -1118,7 +1125,7 @@
             </a:ln>
             <a:extLst>
               <a:ext uri="{91240B29-F687-4f45-9708-019B960494DF}">
-                <a14:hiddenLine xmlns:a14="http://schemas.microsoft.com/office/drawing/2010/main" xmlns="" w="9525">
+                <a14:hiddenLine xmlns="" xmlns:a14="http://schemas.microsoft.com/office/drawing/2010/main" w="9525">
                   <a:solidFill>
                     <a:srgbClr val="000000"/>
                   </a:solidFill>
@@ -1228,7 +1235,7 @@
             </a:ln>
             <a:extLst>
               <a:ext uri="{91240B29-F687-4f45-9708-019B960494DF}">
-                <a14:hiddenLine xmlns:a14="http://schemas.microsoft.com/office/drawing/2010/main" xmlns="" w="9525">
+                <a14:hiddenLine xmlns="" xmlns:a14="http://schemas.microsoft.com/office/drawing/2010/main" w="9525">
                   <a:solidFill>
                     <a:srgbClr val="000000"/>
                   </a:solidFill>
@@ -1290,7 +1297,7 @@
             </a:ln>
             <a:extLst>
               <a:ext uri="{91240B29-F687-4f45-9708-019B960494DF}">
-                <a14:hiddenLine xmlns:a14="http://schemas.microsoft.com/office/drawing/2010/main" xmlns="" w="9525">
+                <a14:hiddenLine xmlns="" xmlns:a14="http://schemas.microsoft.com/office/drawing/2010/main" w="9525">
                   <a:solidFill>
                     <a:srgbClr val="000000"/>
                   </a:solidFill>
@@ -1380,7 +1387,7 @@
             </a:ln>
             <a:extLst>
               <a:ext uri="{91240B29-F687-4f45-9708-019B960494DF}">
-                <a14:hiddenLine xmlns:a14="http://schemas.microsoft.com/office/drawing/2010/main" xmlns="" w="9525">
+                <a14:hiddenLine xmlns="" xmlns:a14="http://schemas.microsoft.com/office/drawing/2010/main" w="9525">
                   <a:solidFill>
                     <a:srgbClr val="000000"/>
                   </a:solidFill>
@@ -1470,7 +1477,7 @@
             </a:ln>
             <a:extLst>
               <a:ext uri="{91240B29-F687-4f45-9708-019B960494DF}">
-                <a14:hiddenLine xmlns:a14="http://schemas.microsoft.com/office/drawing/2010/main" xmlns="" w="9525">
+                <a14:hiddenLine xmlns="" xmlns:a14="http://schemas.microsoft.com/office/drawing/2010/main" w="9525">
                   <a:solidFill>
                     <a:srgbClr val="000000"/>
                   </a:solidFill>
@@ -1532,7 +1539,7 @@
             </a:ln>
             <a:extLst>
               <a:ext uri="{91240B29-F687-4f45-9708-019B960494DF}">
-                <a14:hiddenLine xmlns:a14="http://schemas.microsoft.com/office/drawing/2010/main" xmlns="" w="9525">
+                <a14:hiddenLine xmlns="" xmlns:a14="http://schemas.microsoft.com/office/drawing/2010/main" w="9525">
                   <a:solidFill>
                     <a:srgbClr val="000000"/>
                   </a:solidFill>
@@ -1622,7 +1629,7 @@
             </a:ln>
             <a:extLst>
               <a:ext uri="{91240B29-F687-4f45-9708-019B960494DF}">
-                <a14:hiddenLine xmlns:a14="http://schemas.microsoft.com/office/drawing/2010/main" xmlns="" w="9525">
+                <a14:hiddenLine xmlns="" xmlns:a14="http://schemas.microsoft.com/office/drawing/2010/main" w="9525">
                   <a:solidFill>
                     <a:srgbClr val="000000"/>
                   </a:solidFill>
@@ -1712,7 +1719,7 @@
             </a:ln>
             <a:extLst>
               <a:ext uri="{91240B29-F687-4f45-9708-019B960494DF}">
-                <a14:hiddenLine xmlns:a14="http://schemas.microsoft.com/office/drawing/2010/main" xmlns="" w="9525">
+                <a14:hiddenLine xmlns="" xmlns:a14="http://schemas.microsoft.com/office/drawing/2010/main" w="9525">
                   <a:solidFill>
                     <a:srgbClr val="000000"/>
                   </a:solidFill>
@@ -1768,7 +1775,7 @@
             </a:ln>
             <a:extLst>
               <a:ext uri="{91240B29-F687-4f45-9708-019B960494DF}">
-                <a14:hiddenLine xmlns:a14="http://schemas.microsoft.com/office/drawing/2010/main" xmlns="" w="9525">
+                <a14:hiddenLine xmlns="" xmlns:a14="http://schemas.microsoft.com/office/drawing/2010/main" w="9525">
                   <a:solidFill>
                     <a:srgbClr val="000000"/>
                   </a:solidFill>
@@ -1858,7 +1865,7 @@
             </a:ln>
             <a:extLst>
               <a:ext uri="{91240B29-F687-4f45-9708-019B960494DF}">
-                <a14:hiddenLine xmlns:a14="http://schemas.microsoft.com/office/drawing/2010/main" xmlns="" w="9525">
+                <a14:hiddenLine xmlns="" xmlns:a14="http://schemas.microsoft.com/office/drawing/2010/main" w="9525">
                   <a:solidFill>
                     <a:srgbClr val="000000"/>
                   </a:solidFill>
@@ -1914,7 +1921,7 @@
             </a:ln>
             <a:extLst>
               <a:ext uri="{91240B29-F687-4f45-9708-019B960494DF}">
-                <a14:hiddenLine xmlns:a14="http://schemas.microsoft.com/office/drawing/2010/main" xmlns="" w="9525">
+                <a14:hiddenLine xmlns="" xmlns:a14="http://schemas.microsoft.com/office/drawing/2010/main" w="9525">
                   <a:solidFill>
                     <a:srgbClr val="000000"/>
                   </a:solidFill>
@@ -2004,7 +2011,7 @@
             </a:ln>
             <a:extLst>
               <a:ext uri="{91240B29-F687-4f45-9708-019B960494DF}">
-                <a14:hiddenLine xmlns:a14="http://schemas.microsoft.com/office/drawing/2010/main" xmlns="" w="9525">
+                <a14:hiddenLine xmlns="" xmlns:a14="http://schemas.microsoft.com/office/drawing/2010/main" w="9525">
                   <a:solidFill>
                     <a:srgbClr val="000000"/>
                   </a:solidFill>
@@ -2072,7 +2079,7 @@
             </a:ln>
             <a:extLst>
               <a:ext uri="{91240B29-F687-4f45-9708-019B960494DF}">
-                <a14:hiddenLine xmlns:a14="http://schemas.microsoft.com/office/drawing/2010/main" xmlns="" w="9525">
+                <a14:hiddenLine xmlns="" xmlns:a14="http://schemas.microsoft.com/office/drawing/2010/main" w="9525">
                   <a:solidFill>
                     <a:srgbClr val="000000"/>
                   </a:solidFill>
@@ -2162,7 +2169,7 @@
             </a:ln>
             <a:extLst>
               <a:ext uri="{91240B29-F687-4f45-9708-019B960494DF}">
-                <a14:hiddenLine xmlns:a14="http://schemas.microsoft.com/office/drawing/2010/main" xmlns="" w="9525">
+                <a14:hiddenLine xmlns="" xmlns:a14="http://schemas.microsoft.com/office/drawing/2010/main" w="9525">
                   <a:solidFill>
                     <a:srgbClr val="000000"/>
                   </a:solidFill>
@@ -2230,7 +2237,7 @@
             </a:ln>
             <a:extLst>
               <a:ext uri="{91240B29-F687-4f45-9708-019B960494DF}">
-                <a14:hiddenLine xmlns:a14="http://schemas.microsoft.com/office/drawing/2010/main" xmlns="" w="9525">
+                <a14:hiddenLine xmlns="" xmlns:a14="http://schemas.microsoft.com/office/drawing/2010/main" w="9525">
                   <a:solidFill>
                     <a:srgbClr val="000000"/>
                   </a:solidFill>
@@ -2320,7 +2327,7 @@
             </a:ln>
             <a:extLst>
               <a:ext uri="{91240B29-F687-4f45-9708-019B960494DF}">
-                <a14:hiddenLine xmlns:a14="http://schemas.microsoft.com/office/drawing/2010/main" xmlns="" w="9525">
+                <a14:hiddenLine xmlns="" xmlns:a14="http://schemas.microsoft.com/office/drawing/2010/main" w="9525">
                   <a:solidFill>
                     <a:srgbClr val="000000"/>
                   </a:solidFill>
@@ -2354,7 +2361,7 @@
             </a:ln>
             <a:extLst>
               <a:ext uri="{91240B29-F687-4f45-9708-019B960494DF}">
-                <a14:hiddenLine xmlns:a14="http://schemas.microsoft.com/office/drawing/2010/main" xmlns="" w="9525">
+                <a14:hiddenLine xmlns="" xmlns:a14="http://schemas.microsoft.com/office/drawing/2010/main" w="9525">
                   <a:solidFill>
                     <a:srgbClr val="000000"/>
                   </a:solidFill>
@@ -2444,7 +2451,7 @@
             </a:ln>
             <a:extLst>
               <a:ext uri="{91240B29-F687-4f45-9708-019B960494DF}">
-                <a14:hiddenLine xmlns:a14="http://schemas.microsoft.com/office/drawing/2010/main" xmlns="" w="9525">
+                <a14:hiddenLine xmlns="" xmlns:a14="http://schemas.microsoft.com/office/drawing/2010/main" w="9525">
                   <a:solidFill>
                     <a:srgbClr val="000000"/>
                   </a:solidFill>
@@ -2506,7 +2513,7 @@
             </a:ln>
             <a:extLst>
               <a:ext uri="{91240B29-F687-4f45-9708-019B960494DF}">
-                <a14:hiddenLine xmlns:a14="http://schemas.microsoft.com/office/drawing/2010/main" xmlns="" w="9525">
+                <a14:hiddenLine xmlns="" xmlns:a14="http://schemas.microsoft.com/office/drawing/2010/main" w="9525">
                   <a:solidFill>
                     <a:srgbClr val="000000"/>
                   </a:solidFill>
@@ -2568,7 +2575,7 @@
             </a:ln>
             <a:extLst>
               <a:ext uri="{91240B29-F687-4f45-9708-019B960494DF}">
-                <a14:hiddenLine xmlns:a14="http://schemas.microsoft.com/office/drawing/2010/main" xmlns="" w="9525">
+                <a14:hiddenLine xmlns="" xmlns:a14="http://schemas.microsoft.com/office/drawing/2010/main" w="9525">
                   <a:solidFill>
                     <a:srgbClr val="000000"/>
                   </a:solidFill>
@@ -2658,7 +2665,7 @@
             </a:ln>
             <a:extLst>
               <a:ext uri="{91240B29-F687-4f45-9708-019B960494DF}">
-                <a14:hiddenLine xmlns:a14="http://schemas.microsoft.com/office/drawing/2010/main" xmlns="" w="9525">
+                <a14:hiddenLine xmlns="" xmlns:a14="http://schemas.microsoft.com/office/drawing/2010/main" w="9525">
                   <a:solidFill>
                     <a:srgbClr val="000000"/>
                   </a:solidFill>
@@ -2726,7 +2733,7 @@
             </a:ln>
             <a:extLst>
               <a:ext uri="{91240B29-F687-4f45-9708-019B960494DF}">
-                <a14:hiddenLine xmlns:a14="http://schemas.microsoft.com/office/drawing/2010/main" xmlns="" w="9525">
+                <a14:hiddenLine xmlns="" xmlns:a14="http://schemas.microsoft.com/office/drawing/2010/main" w="9525">
                   <a:solidFill>
                     <a:srgbClr val="000000"/>
                   </a:solidFill>
@@ -2788,7 +2795,7 @@
             </a:ln>
             <a:extLst>
               <a:ext uri="{91240B29-F687-4f45-9708-019B960494DF}">
-                <a14:hiddenLine xmlns:a14="http://schemas.microsoft.com/office/drawing/2010/main" xmlns="" w="9525">
+                <a14:hiddenLine xmlns="" xmlns:a14="http://schemas.microsoft.com/office/drawing/2010/main" w="9525">
                   <a:solidFill>
                     <a:srgbClr val="000000"/>
                   </a:solidFill>
@@ -2878,7 +2885,7 @@
             </a:ln>
             <a:extLst>
               <a:ext uri="{91240B29-F687-4f45-9708-019B960494DF}">
-                <a14:hiddenLine xmlns:a14="http://schemas.microsoft.com/office/drawing/2010/main" xmlns="" w="9525">
+                <a14:hiddenLine xmlns="" xmlns:a14="http://schemas.microsoft.com/office/drawing/2010/main" w="9525">
                   <a:solidFill>
                     <a:srgbClr val="000000"/>
                   </a:solidFill>
@@ -2940,7 +2947,7 @@
             </a:ln>
             <a:extLst>
               <a:ext uri="{91240B29-F687-4f45-9708-019B960494DF}">
-                <a14:hiddenLine xmlns:a14="http://schemas.microsoft.com/office/drawing/2010/main" xmlns="" w="9525">
+                <a14:hiddenLine xmlns="" xmlns:a14="http://schemas.microsoft.com/office/drawing/2010/main" w="9525">
                   <a:solidFill>
                     <a:srgbClr val="000000"/>
                   </a:solidFill>
@@ -3030,7 +3037,7 @@
             </a:ln>
             <a:extLst>
               <a:ext uri="{91240B29-F687-4f45-9708-019B960494DF}">
-                <a14:hiddenLine xmlns:a14="http://schemas.microsoft.com/office/drawing/2010/main" xmlns="" w="9525">
+                <a14:hiddenLine xmlns="" xmlns:a14="http://schemas.microsoft.com/office/drawing/2010/main" w="9525">
                   <a:solidFill>
                     <a:srgbClr val="000000"/>
                   </a:solidFill>
@@ -3092,7 +3099,7 @@
             </a:ln>
             <a:extLst>
               <a:ext uri="{91240B29-F687-4f45-9708-019B960494DF}">
-                <a14:hiddenLine xmlns:a14="http://schemas.microsoft.com/office/drawing/2010/main" xmlns="" w="9525">
+                <a14:hiddenLine xmlns="" xmlns:a14="http://schemas.microsoft.com/office/drawing/2010/main" w="9525">
                   <a:solidFill>
                     <a:srgbClr val="000000"/>
                   </a:solidFill>
@@ -3182,7 +3189,7 @@
             </a:ln>
             <a:extLst>
               <a:ext uri="{91240B29-F687-4f45-9708-019B960494DF}">
-                <a14:hiddenLine xmlns:a14="http://schemas.microsoft.com/office/drawing/2010/main" xmlns="" w="9525">
+                <a14:hiddenLine xmlns="" xmlns:a14="http://schemas.microsoft.com/office/drawing/2010/main" w="9525">
                   <a:solidFill>
                     <a:srgbClr val="000000"/>
                   </a:solidFill>
@@ -3216,7 +3223,7 @@
             </a:ln>
             <a:extLst>
               <a:ext uri="{91240B29-F687-4f45-9708-019B960494DF}">
-                <a14:hiddenLine xmlns:a14="http://schemas.microsoft.com/office/drawing/2010/main" xmlns="" w="9525">
+                <a14:hiddenLine xmlns="" xmlns:a14="http://schemas.microsoft.com/office/drawing/2010/main" w="9525">
                   <a:solidFill>
                     <a:srgbClr val="000000"/>
                   </a:solidFill>
@@ -3281,7 +3288,7 @@
             </a:ln>
             <a:extLst>
               <a:ext uri="{91240B29-F687-4f45-9708-019B960494DF}">
-                <a14:hiddenLine xmlns:a14="http://schemas.microsoft.com/office/drawing/2010/main" xmlns="" w="9525">
+                <a14:hiddenLine xmlns="" xmlns:a14="http://schemas.microsoft.com/office/drawing/2010/main" w="9525">
                   <a:solidFill>
                     <a:srgbClr val="000000"/>
                   </a:solidFill>
@@ -3371,7 +3378,7 @@
             </a:ln>
             <a:extLst>
               <a:ext uri="{91240B29-F687-4f45-9708-019B960494DF}">
-                <a14:hiddenLine xmlns:a14="http://schemas.microsoft.com/office/drawing/2010/main" xmlns="" w="9525">
+                <a14:hiddenLine xmlns="" xmlns:a14="http://schemas.microsoft.com/office/drawing/2010/main" w="9525">
                   <a:solidFill>
                     <a:srgbClr val="000000"/>
                   </a:solidFill>
@@ -3433,7 +3440,7 @@
             </a:ln>
             <a:extLst>
               <a:ext uri="{91240B29-F687-4f45-9708-019B960494DF}">
-                <a14:hiddenLine xmlns:a14="http://schemas.microsoft.com/office/drawing/2010/main" xmlns="" w="9525">
+                <a14:hiddenLine xmlns="" xmlns:a14="http://schemas.microsoft.com/office/drawing/2010/main" w="9525">
                   <a:solidFill>
                     <a:srgbClr val="000000"/>
                   </a:solidFill>
@@ -3523,7 +3530,7 @@
             </a:ln>
             <a:extLst>
               <a:ext uri="{91240B29-F687-4f45-9708-019B960494DF}">
-                <a14:hiddenLine xmlns:a14="http://schemas.microsoft.com/office/drawing/2010/main" xmlns="" w="9525">
+                <a14:hiddenLine xmlns="" xmlns:a14="http://schemas.microsoft.com/office/drawing/2010/main" w="9525">
                   <a:solidFill>
                     <a:srgbClr val="000000"/>
                   </a:solidFill>
@@ -3613,7 +3620,7 @@
             </a:ln>
             <a:extLst>
               <a:ext uri="{91240B29-F687-4f45-9708-019B960494DF}">
-                <a14:hiddenLine xmlns:a14="http://schemas.microsoft.com/office/drawing/2010/main" xmlns="" w="9525">
+                <a14:hiddenLine xmlns="" xmlns:a14="http://schemas.microsoft.com/office/drawing/2010/main" w="9525">
                   <a:solidFill>
                     <a:srgbClr val="000000"/>
                   </a:solidFill>
@@ -3678,7 +3685,7 @@
             </a:ln>
             <a:extLst>
               <a:ext uri="{91240B29-F687-4f45-9708-019B960494DF}">
-                <a14:hiddenLine xmlns:a14="http://schemas.microsoft.com/office/drawing/2010/main" xmlns="" w="9525">
+                <a14:hiddenLine xmlns="" xmlns:a14="http://schemas.microsoft.com/office/drawing/2010/main" w="9525">
                   <a:solidFill>
                     <a:srgbClr val="000000"/>
                   </a:solidFill>
@@ -3740,7 +3747,7 @@
             </a:ln>
             <a:extLst>
               <a:ext uri="{91240B29-F687-4f45-9708-019B960494DF}">
-                <a14:hiddenLine xmlns:a14="http://schemas.microsoft.com/office/drawing/2010/main" xmlns="" w="9525">
+                <a14:hiddenLine xmlns="" xmlns:a14="http://schemas.microsoft.com/office/drawing/2010/main" w="9525">
                   <a:solidFill>
                     <a:srgbClr val="000000"/>
                   </a:solidFill>
@@ -3830,7 +3837,7 @@
             </a:ln>
             <a:extLst>
               <a:ext uri="{91240B29-F687-4f45-9708-019B960494DF}">
-                <a14:hiddenLine xmlns:a14="http://schemas.microsoft.com/office/drawing/2010/main" xmlns="" w="9525">
+                <a14:hiddenLine xmlns="" xmlns:a14="http://schemas.microsoft.com/office/drawing/2010/main" w="9525">
                   <a:solidFill>
                     <a:srgbClr val="000000"/>
                   </a:solidFill>
@@ -3920,7 +3927,7 @@
             </a:ln>
             <a:extLst>
               <a:ext uri="{91240B29-F687-4f45-9708-019B960494DF}">
-                <a14:hiddenLine xmlns:a14="http://schemas.microsoft.com/office/drawing/2010/main" xmlns="" w="9525">
+                <a14:hiddenLine xmlns="" xmlns:a14="http://schemas.microsoft.com/office/drawing/2010/main" w="9525">
                   <a:solidFill>
                     <a:srgbClr val="000000"/>
                   </a:solidFill>
@@ -3982,7 +3989,7 @@
             </a:ln>
             <a:extLst>
               <a:ext uri="{91240B29-F687-4f45-9708-019B960494DF}">
-                <a14:hiddenLine xmlns:a14="http://schemas.microsoft.com/office/drawing/2010/main" xmlns="" w="9525">
+                <a14:hiddenLine xmlns="" xmlns:a14="http://schemas.microsoft.com/office/drawing/2010/main" w="9525">
                   <a:solidFill>
                     <a:srgbClr val="000000"/>
                   </a:solidFill>
@@ -4102,7 +4109,7 @@
             </a:ln>
             <a:extLst>
               <a:ext uri="{91240B29-F687-4f45-9708-019B960494DF}">
-                <a14:hiddenLine xmlns:a14="http://schemas.microsoft.com/office/drawing/2010/main" xmlns="" w="9525">
+                <a14:hiddenLine xmlns="" xmlns:a14="http://schemas.microsoft.com/office/drawing/2010/main" w="9525">
                   <a:solidFill>
                     <a:srgbClr val="000000"/>
                   </a:solidFill>
@@ -4170,7 +4177,7 @@
             </a:ln>
             <a:extLst>
               <a:ext uri="{91240B29-F687-4f45-9708-019B960494DF}">
-                <a14:hiddenLine xmlns:a14="http://schemas.microsoft.com/office/drawing/2010/main" xmlns="" w="9525">
+                <a14:hiddenLine xmlns="" xmlns:a14="http://schemas.microsoft.com/office/drawing/2010/main" w="9525">
                   <a:solidFill>
                     <a:srgbClr val="000000"/>
                   </a:solidFill>
@@ -4260,7 +4267,7 @@
             </a:ln>
             <a:extLst>
               <a:ext uri="{91240B29-F687-4f45-9708-019B960494DF}">
-                <a14:hiddenLine xmlns:a14="http://schemas.microsoft.com/office/drawing/2010/main" xmlns="" w="9525">
+                <a14:hiddenLine xmlns="" xmlns:a14="http://schemas.microsoft.com/office/drawing/2010/main" w="9525">
                   <a:solidFill>
                     <a:srgbClr val="000000"/>
                   </a:solidFill>
@@ -4400,7 +4407,7 @@
           <a:p>
             <a:fld id="{7FDBF50C-4ABB-48C4-BC36-F12119FAB571}" type="datetimeFigureOut">
               <a:rPr lang="it-IT" smtClean="0"/>
-              <a:t>03/06/2021</a:t>
+              <a:t>07/06/2021</a:t>
             </a:fld>
             <a:endParaRPr lang="it-IT"/>
           </a:p>
@@ -4667,7 +4674,7 @@
           <a:p>
             <a:fld id="{7FDBF50C-4ABB-48C4-BC36-F12119FAB571}" type="datetimeFigureOut">
               <a:rPr lang="it-IT" smtClean="0"/>
-              <a:t>03/06/2021</a:t>
+              <a:t>07/06/2021</a:t>
             </a:fld>
             <a:endParaRPr lang="it-IT"/>
           </a:p>
@@ -4863,7 +4870,7 @@
           <a:p>
             <a:fld id="{7FDBF50C-4ABB-48C4-BC36-F12119FAB571}" type="datetimeFigureOut">
               <a:rPr lang="it-IT" smtClean="0"/>
-              <a:t>03/06/2021</a:t>
+              <a:t>07/06/2021</a:t>
             </a:fld>
             <a:endParaRPr lang="it-IT"/>
           </a:p>
@@ -5126,7 +5133,7 @@
           <a:p>
             <a:fld id="{7FDBF50C-4ABB-48C4-BC36-F12119FAB571}" type="datetimeFigureOut">
               <a:rPr lang="it-IT" smtClean="0"/>
-              <a:t>03/06/2021</a:t>
+              <a:t>07/06/2021</a:t>
             </a:fld>
             <a:endParaRPr lang="it-IT"/>
           </a:p>
@@ -5560,7 +5567,7 @@
           <a:p>
             <a:fld id="{7FDBF50C-4ABB-48C4-BC36-F12119FAB571}" type="datetimeFigureOut">
               <a:rPr lang="it-IT" smtClean="0"/>
-              <a:t>03/06/2021</a:t>
+              <a:t>07/06/2021</a:t>
             </a:fld>
             <a:endParaRPr lang="it-IT"/>
           </a:p>
@@ -6106,7 +6113,7 @@
           <a:p>
             <a:fld id="{7FDBF50C-4ABB-48C4-BC36-F12119FAB571}" type="datetimeFigureOut">
               <a:rPr lang="it-IT" smtClean="0"/>
-              <a:t>03/06/2021</a:t>
+              <a:t>07/06/2021</a:t>
             </a:fld>
             <a:endParaRPr lang="it-IT"/>
           </a:p>
@@ -6826,7 +6833,7 @@
           <a:p>
             <a:fld id="{7FDBF50C-4ABB-48C4-BC36-F12119FAB571}" type="datetimeFigureOut">
               <a:rPr lang="it-IT" smtClean="0"/>
-              <a:t>03/06/2021</a:t>
+              <a:t>07/06/2021</a:t>
             </a:fld>
             <a:endParaRPr lang="it-IT"/>
           </a:p>
@@ -6996,7 +7003,7 @@
           <a:p>
             <a:fld id="{7FDBF50C-4ABB-48C4-BC36-F12119FAB571}" type="datetimeFigureOut">
               <a:rPr lang="it-IT" smtClean="0"/>
-              <a:t>03/06/2021</a:t>
+              <a:t>07/06/2021</a:t>
             </a:fld>
             <a:endParaRPr lang="it-IT"/>
           </a:p>
@@ -7176,7 +7183,7 @@
           <a:p>
             <a:fld id="{7FDBF50C-4ABB-48C4-BC36-F12119FAB571}" type="datetimeFigureOut">
               <a:rPr lang="it-IT" smtClean="0"/>
-              <a:t>03/06/2021</a:t>
+              <a:t>07/06/2021</a:t>
             </a:fld>
             <a:endParaRPr lang="it-IT"/>
           </a:p>
@@ -7346,7 +7353,7 @@
           <a:p>
             <a:fld id="{7FDBF50C-4ABB-48C4-BC36-F12119FAB571}" type="datetimeFigureOut">
               <a:rPr lang="it-IT" smtClean="0"/>
-              <a:t>03/06/2021</a:t>
+              <a:t>07/06/2021</a:t>
             </a:fld>
             <a:endParaRPr lang="it-IT"/>
           </a:p>
@@ -7596,7 +7603,7 @@
           <a:p>
             <a:fld id="{7FDBF50C-4ABB-48C4-BC36-F12119FAB571}" type="datetimeFigureOut">
               <a:rPr lang="it-IT" smtClean="0"/>
-              <a:t>03/06/2021</a:t>
+              <a:t>07/06/2021</a:t>
             </a:fld>
             <a:endParaRPr lang="it-IT"/>
           </a:p>
@@ -7828,7 +7835,7 @@
           <a:p>
             <a:fld id="{7FDBF50C-4ABB-48C4-BC36-F12119FAB571}" type="datetimeFigureOut">
               <a:rPr lang="it-IT" smtClean="0"/>
-              <a:t>03/06/2021</a:t>
+              <a:t>07/06/2021</a:t>
             </a:fld>
             <a:endParaRPr lang="it-IT"/>
           </a:p>
@@ -8209,7 +8216,7 @@
           <a:p>
             <a:fld id="{7FDBF50C-4ABB-48C4-BC36-F12119FAB571}" type="datetimeFigureOut">
               <a:rPr lang="it-IT" smtClean="0"/>
-              <a:t>03/06/2021</a:t>
+              <a:t>07/06/2021</a:t>
             </a:fld>
             <a:endParaRPr lang="it-IT"/>
           </a:p>
@@ -8327,7 +8334,7 @@
           <a:p>
             <a:fld id="{7FDBF50C-4ABB-48C4-BC36-F12119FAB571}" type="datetimeFigureOut">
               <a:rPr lang="it-IT" smtClean="0"/>
-              <a:t>03/06/2021</a:t>
+              <a:t>07/06/2021</a:t>
             </a:fld>
             <a:endParaRPr lang="it-IT"/>
           </a:p>
@@ -8422,7 +8429,7 @@
           <a:p>
             <a:fld id="{7FDBF50C-4ABB-48C4-BC36-F12119FAB571}" type="datetimeFigureOut">
               <a:rPr lang="it-IT" smtClean="0"/>
-              <a:t>03/06/2021</a:t>
+              <a:t>07/06/2021</a:t>
             </a:fld>
             <a:endParaRPr lang="it-IT"/>
           </a:p>
@@ -8671,7 +8678,7 @@
           <a:p>
             <a:fld id="{7FDBF50C-4ABB-48C4-BC36-F12119FAB571}" type="datetimeFigureOut">
               <a:rPr lang="it-IT" smtClean="0"/>
-              <a:t>03/06/2021</a:t>
+              <a:t>07/06/2021</a:t>
             </a:fld>
             <a:endParaRPr lang="it-IT"/>
           </a:p>
@@ -8951,7 +8958,7 @@
           <a:p>
             <a:fld id="{7FDBF50C-4ABB-48C4-BC36-F12119FAB571}" type="datetimeFigureOut">
               <a:rPr lang="it-IT" smtClean="0"/>
-              <a:t>03/06/2021</a:t>
+              <a:t>07/06/2021</a:t>
             </a:fld>
             <a:endParaRPr lang="it-IT"/>
           </a:p>
@@ -9067,7 +9074,7 @@
           <a:noFill/>
           <a:extLst>
             <a:ext uri="{909E8E84-426E-40dd-AFC4-6F175D3DCCD1}">
-              <a14:hiddenFill xmlns:a14="http://schemas.microsoft.com/office/drawing/2010/main" xmlns="">
+              <a14:hiddenFill xmlns="" xmlns:a14="http://schemas.microsoft.com/office/drawing/2010/main">
                 <a:solidFill>
                   <a:srgbClr val="FFFFFF"/>
                 </a:solidFill>
@@ -9141,7 +9148,7 @@
               </a:ln>
               <a:extLst>
                 <a:ext uri="{91240B29-F687-4f45-9708-019B960494DF}">
-                  <a14:hiddenLine xmlns:a14="http://schemas.microsoft.com/office/drawing/2010/main" xmlns="" w="9525">
+                  <a14:hiddenLine xmlns="" xmlns:a14="http://schemas.microsoft.com/office/drawing/2010/main" w="9525">
                     <a:solidFill>
                       <a:srgbClr val="000000"/>
                     </a:solidFill>
@@ -9231,7 +9238,7 @@
               </a:ln>
               <a:extLst>
                 <a:ext uri="{91240B29-F687-4f45-9708-019B960494DF}">
-                  <a14:hiddenLine xmlns:a14="http://schemas.microsoft.com/office/drawing/2010/main" xmlns="" w="9525">
+                  <a14:hiddenLine xmlns="" xmlns:a14="http://schemas.microsoft.com/office/drawing/2010/main" w="9525">
                     <a:solidFill>
                       <a:srgbClr val="000000"/>
                     </a:solidFill>
@@ -9321,7 +9328,7 @@
               </a:ln>
               <a:extLst>
                 <a:ext uri="{91240B29-F687-4f45-9708-019B960494DF}">
-                  <a14:hiddenLine xmlns:a14="http://schemas.microsoft.com/office/drawing/2010/main" xmlns="" w="9525">
+                  <a14:hiddenLine xmlns="" xmlns:a14="http://schemas.microsoft.com/office/drawing/2010/main" w="9525">
                     <a:solidFill>
                       <a:srgbClr val="000000"/>
                     </a:solidFill>
@@ -9383,7 +9390,7 @@
               </a:ln>
               <a:extLst>
                 <a:ext uri="{91240B29-F687-4f45-9708-019B960494DF}">
-                  <a14:hiddenLine xmlns:a14="http://schemas.microsoft.com/office/drawing/2010/main" xmlns="" w="9525">
+                  <a14:hiddenLine xmlns="" xmlns:a14="http://schemas.microsoft.com/office/drawing/2010/main" w="9525">
                     <a:solidFill>
                       <a:srgbClr val="000000"/>
                     </a:solidFill>
@@ -9473,7 +9480,7 @@
               </a:ln>
               <a:extLst>
                 <a:ext uri="{91240B29-F687-4f45-9708-019B960494DF}">
-                  <a14:hiddenLine xmlns:a14="http://schemas.microsoft.com/office/drawing/2010/main" xmlns="" w="9525">
+                  <a14:hiddenLine xmlns="" xmlns:a14="http://schemas.microsoft.com/office/drawing/2010/main" w="9525">
                     <a:solidFill>
                       <a:srgbClr val="000000"/>
                     </a:solidFill>
@@ -9535,7 +9542,7 @@
               </a:ln>
               <a:extLst>
                 <a:ext uri="{91240B29-F687-4f45-9708-019B960494DF}">
-                  <a14:hiddenLine xmlns:a14="http://schemas.microsoft.com/office/drawing/2010/main" xmlns="" w="9525">
+                  <a14:hiddenLine xmlns="" xmlns:a14="http://schemas.microsoft.com/office/drawing/2010/main" w="9525">
                     <a:solidFill>
                       <a:srgbClr val="000000"/>
                     </a:solidFill>
@@ -9597,7 +9604,7 @@
               </a:ln>
               <a:extLst>
                 <a:ext uri="{91240B29-F687-4f45-9708-019B960494DF}">
-                  <a14:hiddenLine xmlns:a14="http://schemas.microsoft.com/office/drawing/2010/main" xmlns="" w="9525">
+                  <a14:hiddenLine xmlns="" xmlns:a14="http://schemas.microsoft.com/office/drawing/2010/main" w="9525">
                     <a:solidFill>
                       <a:srgbClr val="000000"/>
                     </a:solidFill>
@@ -9687,7 +9694,7 @@
               </a:ln>
               <a:extLst>
                 <a:ext uri="{91240B29-F687-4f45-9708-019B960494DF}">
-                  <a14:hiddenLine xmlns:a14="http://schemas.microsoft.com/office/drawing/2010/main" xmlns="" w="9525">
+                  <a14:hiddenLine xmlns="" xmlns:a14="http://schemas.microsoft.com/office/drawing/2010/main" w="9525">
                     <a:solidFill>
                       <a:srgbClr val="000000"/>
                     </a:solidFill>
@@ -9777,7 +9784,7 @@
               </a:ln>
               <a:extLst>
                 <a:ext uri="{91240B29-F687-4f45-9708-019B960494DF}">
-                  <a14:hiddenLine xmlns:a14="http://schemas.microsoft.com/office/drawing/2010/main" xmlns="" w="9525">
+                  <a14:hiddenLine xmlns="" xmlns:a14="http://schemas.microsoft.com/office/drawing/2010/main" w="9525">
                     <a:solidFill>
                       <a:srgbClr val="000000"/>
                     </a:solidFill>
@@ -9839,7 +9846,7 @@
               </a:ln>
               <a:extLst>
                 <a:ext uri="{91240B29-F687-4f45-9708-019B960494DF}">
-                  <a14:hiddenLine xmlns:a14="http://schemas.microsoft.com/office/drawing/2010/main" xmlns="" w="9525">
+                  <a14:hiddenLine xmlns="" xmlns:a14="http://schemas.microsoft.com/office/drawing/2010/main" w="9525">
                     <a:solidFill>
                       <a:srgbClr val="000000"/>
                     </a:solidFill>
@@ -9949,7 +9956,7 @@
               </a:ln>
               <a:extLst>
                 <a:ext uri="{91240B29-F687-4f45-9708-019B960494DF}">
-                  <a14:hiddenLine xmlns:a14="http://schemas.microsoft.com/office/drawing/2010/main" xmlns="" w="9525">
+                  <a14:hiddenLine xmlns="" xmlns:a14="http://schemas.microsoft.com/office/drawing/2010/main" w="9525">
                     <a:solidFill>
                       <a:srgbClr val="000000"/>
                     </a:solidFill>
@@ -10033,7 +10040,7 @@
               </a:ln>
               <a:extLst>
                 <a:ext uri="{91240B29-F687-4f45-9708-019B960494DF}">
-                  <a14:hiddenLine xmlns:a14="http://schemas.microsoft.com/office/drawing/2010/main" xmlns="" w="9525">
+                  <a14:hiddenLine xmlns="" xmlns:a14="http://schemas.microsoft.com/office/drawing/2010/main" w="9525">
                     <a:solidFill>
                       <a:srgbClr val="000000"/>
                     </a:solidFill>
@@ -10095,7 +10102,7 @@
               </a:ln>
               <a:extLst>
                 <a:ext uri="{91240B29-F687-4f45-9708-019B960494DF}">
-                  <a14:hiddenLine xmlns:a14="http://schemas.microsoft.com/office/drawing/2010/main" xmlns="" w="9525">
+                  <a14:hiddenLine xmlns="" xmlns:a14="http://schemas.microsoft.com/office/drawing/2010/main" w="9525">
                     <a:solidFill>
                       <a:srgbClr val="000000"/>
                     </a:solidFill>
@@ -10157,7 +10164,7 @@
               </a:ln>
               <a:extLst>
                 <a:ext uri="{91240B29-F687-4f45-9708-019B960494DF}">
-                  <a14:hiddenLine xmlns:a14="http://schemas.microsoft.com/office/drawing/2010/main" xmlns="" w="9525">
+                  <a14:hiddenLine xmlns="" xmlns:a14="http://schemas.microsoft.com/office/drawing/2010/main" w="9525">
                     <a:solidFill>
                       <a:srgbClr val="000000"/>
                     </a:solidFill>
@@ -10247,7 +10254,7 @@
               </a:ln>
               <a:extLst>
                 <a:ext uri="{91240B29-F687-4f45-9708-019B960494DF}">
-                  <a14:hiddenLine xmlns:a14="http://schemas.microsoft.com/office/drawing/2010/main" xmlns="" w="9525">
+                  <a14:hiddenLine xmlns="" xmlns:a14="http://schemas.microsoft.com/office/drawing/2010/main" w="9525">
                     <a:solidFill>
                       <a:srgbClr val="000000"/>
                     </a:solidFill>
@@ -10281,7 +10288,7 @@
               </a:ln>
               <a:extLst>
                 <a:ext uri="{91240B29-F687-4f45-9708-019B960494DF}">
-                  <a14:hiddenLine xmlns:a14="http://schemas.microsoft.com/office/drawing/2010/main" xmlns="" w="9525">
+                  <a14:hiddenLine xmlns="" xmlns:a14="http://schemas.microsoft.com/office/drawing/2010/main" w="9525">
                     <a:solidFill>
                       <a:srgbClr val="000000"/>
                     </a:solidFill>
@@ -10346,7 +10353,7 @@
               </a:ln>
               <a:extLst>
                 <a:ext uri="{91240B29-F687-4f45-9708-019B960494DF}">
-                  <a14:hiddenLine xmlns:a14="http://schemas.microsoft.com/office/drawing/2010/main" xmlns="" w="9525">
+                  <a14:hiddenLine xmlns="" xmlns:a14="http://schemas.microsoft.com/office/drawing/2010/main" w="9525">
                     <a:solidFill>
                       <a:srgbClr val="000000"/>
                     </a:solidFill>
@@ -10436,7 +10443,7 @@
               </a:ln>
               <a:extLst>
                 <a:ext uri="{91240B29-F687-4f45-9708-019B960494DF}">
-                  <a14:hiddenLine xmlns:a14="http://schemas.microsoft.com/office/drawing/2010/main" xmlns="" w="9525">
+                  <a14:hiddenLine xmlns="" xmlns:a14="http://schemas.microsoft.com/office/drawing/2010/main" w="9525">
                     <a:solidFill>
                       <a:srgbClr val="000000"/>
                     </a:solidFill>
@@ -10498,7 +10505,7 @@
               </a:ln>
               <a:extLst>
                 <a:ext uri="{91240B29-F687-4f45-9708-019B960494DF}">
-                  <a14:hiddenLine xmlns:a14="http://schemas.microsoft.com/office/drawing/2010/main" xmlns="" w="9525">
+                  <a14:hiddenLine xmlns="" xmlns:a14="http://schemas.microsoft.com/office/drawing/2010/main" w="9525">
                     <a:solidFill>
                       <a:srgbClr val="000000"/>
                     </a:solidFill>
@@ -10588,7 +10595,7 @@
               </a:ln>
               <a:extLst>
                 <a:ext uri="{91240B29-F687-4f45-9708-019B960494DF}">
-                  <a14:hiddenLine xmlns:a14="http://schemas.microsoft.com/office/drawing/2010/main" xmlns="" w="9525">
+                  <a14:hiddenLine xmlns="" xmlns:a14="http://schemas.microsoft.com/office/drawing/2010/main" w="9525">
                     <a:solidFill>
                       <a:srgbClr val="000000"/>
                     </a:solidFill>
@@ -10653,7 +10660,7 @@
               </a:ln>
               <a:extLst>
                 <a:ext uri="{91240B29-F687-4f45-9708-019B960494DF}">
-                  <a14:hiddenLine xmlns:a14="http://schemas.microsoft.com/office/drawing/2010/main" xmlns="" w="9525">
+                  <a14:hiddenLine xmlns="" xmlns:a14="http://schemas.microsoft.com/office/drawing/2010/main" w="9525">
                     <a:solidFill>
                       <a:srgbClr val="000000"/>
                     </a:solidFill>
@@ -10715,7 +10722,7 @@
               </a:ln>
               <a:extLst>
                 <a:ext uri="{91240B29-F687-4f45-9708-019B960494DF}">
-                  <a14:hiddenLine xmlns:a14="http://schemas.microsoft.com/office/drawing/2010/main" xmlns="" w="9525">
+                  <a14:hiddenLine xmlns="" xmlns:a14="http://schemas.microsoft.com/office/drawing/2010/main" w="9525">
                     <a:solidFill>
                       <a:srgbClr val="000000"/>
                     </a:solidFill>
@@ -10805,7 +10812,7 @@
               </a:ln>
               <a:extLst>
                 <a:ext uri="{91240B29-F687-4f45-9708-019B960494DF}">
-                  <a14:hiddenLine xmlns:a14="http://schemas.microsoft.com/office/drawing/2010/main" xmlns="" w="9525">
+                  <a14:hiddenLine xmlns="" xmlns:a14="http://schemas.microsoft.com/office/drawing/2010/main" w="9525">
                     <a:solidFill>
                       <a:srgbClr val="000000"/>
                     </a:solidFill>
@@ -10895,7 +10902,7 @@
               </a:ln>
               <a:extLst>
                 <a:ext uri="{91240B29-F687-4f45-9708-019B960494DF}">
-                  <a14:hiddenLine xmlns:a14="http://schemas.microsoft.com/office/drawing/2010/main" xmlns="" w="9525">
+                  <a14:hiddenLine xmlns="" xmlns:a14="http://schemas.microsoft.com/office/drawing/2010/main" w="9525">
                     <a:solidFill>
                       <a:srgbClr val="000000"/>
                     </a:solidFill>
@@ -10960,7 +10967,7 @@
               </a:ln>
               <a:extLst>
                 <a:ext uri="{91240B29-F687-4f45-9708-019B960494DF}">
-                  <a14:hiddenLine xmlns:a14="http://schemas.microsoft.com/office/drawing/2010/main" xmlns="" w="9525">
+                  <a14:hiddenLine xmlns="" xmlns:a14="http://schemas.microsoft.com/office/drawing/2010/main" w="9525">
                     <a:solidFill>
                       <a:srgbClr val="000000"/>
                     </a:solidFill>
@@ -11080,7 +11087,7 @@
               </a:ln>
               <a:extLst>
                 <a:ext uri="{91240B29-F687-4f45-9708-019B960494DF}">
-                  <a14:hiddenLine xmlns:a14="http://schemas.microsoft.com/office/drawing/2010/main" xmlns="" w="9525">
+                  <a14:hiddenLine xmlns="" xmlns:a14="http://schemas.microsoft.com/office/drawing/2010/main" w="9525">
                     <a:solidFill>
                       <a:srgbClr val="000000"/>
                     </a:solidFill>
@@ -11178,7 +11185,7 @@
               </a:ln>
               <a:extLst>
                 <a:ext uri="{91240B29-F687-4f45-9708-019B960494DF}">
-                  <a14:hiddenLine xmlns:a14="http://schemas.microsoft.com/office/drawing/2010/main" xmlns="" w="9525">
+                  <a14:hiddenLine xmlns="" xmlns:a14="http://schemas.microsoft.com/office/drawing/2010/main" w="9525">
                     <a:solidFill>
                       <a:srgbClr val="000000"/>
                     </a:solidFill>
@@ -11293,7 +11300,7 @@
               </a:ln>
               <a:extLst>
                 <a:ext uri="{91240B29-F687-4f45-9708-019B960494DF}">
-                  <a14:hiddenLine xmlns:a14="http://schemas.microsoft.com/office/drawing/2010/main" xmlns="" w="9525">
+                  <a14:hiddenLine xmlns="" xmlns:a14="http://schemas.microsoft.com/office/drawing/2010/main" w="9525">
                     <a:solidFill>
                       <a:srgbClr val="000000"/>
                     </a:solidFill>
@@ -11383,7 +11390,7 @@
               </a:ln>
               <a:extLst>
                 <a:ext uri="{91240B29-F687-4f45-9708-019B960494DF}">
-                  <a14:hiddenLine xmlns:a14="http://schemas.microsoft.com/office/drawing/2010/main" xmlns="" w="9525">
+                  <a14:hiddenLine xmlns="" xmlns:a14="http://schemas.microsoft.com/office/drawing/2010/main" w="9525">
                     <a:solidFill>
                       <a:srgbClr val="000000"/>
                     </a:solidFill>
@@ -11448,7 +11455,7 @@
               </a:ln>
               <a:extLst>
                 <a:ext uri="{91240B29-F687-4f45-9708-019B960494DF}">
-                  <a14:hiddenLine xmlns:a14="http://schemas.microsoft.com/office/drawing/2010/main" xmlns="" w="9525">
+                  <a14:hiddenLine xmlns="" xmlns:a14="http://schemas.microsoft.com/office/drawing/2010/main" w="9525">
                     <a:solidFill>
                       <a:srgbClr val="000000"/>
                     </a:solidFill>
@@ -11538,7 +11545,7 @@
               </a:ln>
               <a:extLst>
                 <a:ext uri="{91240B29-F687-4f45-9708-019B960494DF}">
-                  <a14:hiddenLine xmlns:a14="http://schemas.microsoft.com/office/drawing/2010/main" xmlns="" w="9525">
+                  <a14:hiddenLine xmlns="" xmlns:a14="http://schemas.microsoft.com/office/drawing/2010/main" w="9525">
                     <a:solidFill>
                       <a:srgbClr val="000000"/>
                     </a:solidFill>
@@ -11606,7 +11613,7 @@
               </a:ln>
               <a:extLst>
                 <a:ext uri="{91240B29-F687-4f45-9708-019B960494DF}">
-                  <a14:hiddenLine xmlns:a14="http://schemas.microsoft.com/office/drawing/2010/main" xmlns="" w="9525">
+                  <a14:hiddenLine xmlns="" xmlns:a14="http://schemas.microsoft.com/office/drawing/2010/main" w="9525">
                     <a:solidFill>
                       <a:srgbClr val="000000"/>
                     </a:solidFill>
@@ -11696,7 +11703,7 @@
               </a:ln>
               <a:extLst>
                 <a:ext uri="{91240B29-F687-4f45-9708-019B960494DF}">
-                  <a14:hiddenLine xmlns:a14="http://schemas.microsoft.com/office/drawing/2010/main" xmlns="" w="9525">
+                  <a14:hiddenLine xmlns="" xmlns:a14="http://schemas.microsoft.com/office/drawing/2010/main" w="9525">
                     <a:solidFill>
                       <a:srgbClr val="000000"/>
                     </a:solidFill>
@@ -11764,7 +11771,7 @@
               </a:ln>
               <a:extLst>
                 <a:ext uri="{91240B29-F687-4f45-9708-019B960494DF}">
-                  <a14:hiddenLine xmlns:a14="http://schemas.microsoft.com/office/drawing/2010/main" xmlns="" w="9525">
+                  <a14:hiddenLine xmlns="" xmlns:a14="http://schemas.microsoft.com/office/drawing/2010/main" w="9525">
                     <a:solidFill>
                       <a:srgbClr val="000000"/>
                     </a:solidFill>
@@ -11854,7 +11861,7 @@
               </a:ln>
               <a:extLst>
                 <a:ext uri="{91240B29-F687-4f45-9708-019B960494DF}">
-                  <a14:hiddenLine xmlns:a14="http://schemas.microsoft.com/office/drawing/2010/main" xmlns="" w="9525">
+                  <a14:hiddenLine xmlns="" xmlns:a14="http://schemas.microsoft.com/office/drawing/2010/main" w="9525">
                     <a:solidFill>
                       <a:srgbClr val="000000"/>
                     </a:solidFill>
@@ -11888,7 +11895,7 @@
               </a:ln>
               <a:extLst>
                 <a:ext uri="{91240B29-F687-4f45-9708-019B960494DF}">
-                  <a14:hiddenLine xmlns:a14="http://schemas.microsoft.com/office/drawing/2010/main" xmlns="" w="9525">
+                  <a14:hiddenLine xmlns="" xmlns:a14="http://schemas.microsoft.com/office/drawing/2010/main" w="9525">
                     <a:solidFill>
                       <a:srgbClr val="000000"/>
                     </a:solidFill>
@@ -12028,7 +12035,7 @@
           <a:p>
             <a:fld id="{7FDBF50C-4ABB-48C4-BC36-F12119FAB571}" type="datetimeFigureOut">
               <a:rPr lang="it-IT" smtClean="0"/>
-              <a:t>03/06/2021</a:t>
+              <a:t>07/06/2021</a:t>
             </a:fld>
             <a:endParaRPr lang="it-IT"/>
           </a:p>
@@ -12563,7 +12570,7 @@
           <p:cNvPr id="2" name="Titolo 1">
             <a:extLst>
               <a:ext uri="{FF2B5EF4-FFF2-40B4-BE49-F238E27FC236}">
-                <a16:creationId xmlns:a16="http://schemas.microsoft.com/office/drawing/2014/main" id="{8C0FE870-368B-490D-829A-022704F219CA}"/>
+                <a16:creationId xmlns:a16="http://schemas.microsoft.com/office/drawing/2014/main" id="{737EED46-2CEC-4331-AE1A-FCDABC855ED3}"/>
               </a:ext>
             </a:extLst>
           </p:cNvPr>
@@ -12574,12 +12581,22 @@
             <p:ph type="title"/>
           </p:nvPr>
         </p:nvSpPr>
-        <p:spPr/>
+        <p:spPr>
+          <a:xfrm>
+            <a:off x="1141412" y="140346"/>
+            <a:ext cx="9905998" cy="1025724"/>
+          </a:xfrm>
+        </p:spPr>
         <p:txBody>
-          <a:bodyPr/>
+          <a:bodyPr>
+            <a:normAutofit fontScale="90000"/>
+          </a:bodyPr>
           <a:lstStyle/>
           <a:p>
-            <a:endParaRPr lang="it-IT"/>
+            <a:r>
+              <a:rPr lang="it-IT" dirty="0"/>
+              <a:t>Perché l’inversione di popolazione si assesta su un valore inferiore dopo il picco iniziale?</a:t>
+            </a:r>
           </a:p>
         </p:txBody>
       </p:sp>
@@ -12588,7 +12605,7 @@
           <p:cNvPr id="3" name="Segnaposto contenuto 2">
             <a:extLst>
               <a:ext uri="{FF2B5EF4-FFF2-40B4-BE49-F238E27FC236}">
-                <a16:creationId xmlns:a16="http://schemas.microsoft.com/office/drawing/2014/main" id="{1B48E74C-616E-4923-BF2F-E4BCFB41341C}"/>
+                <a16:creationId xmlns:a16="http://schemas.microsoft.com/office/drawing/2014/main" id="{7377F98E-2AEB-4F25-8915-A3AF04B6BBD1}"/>
               </a:ext>
             </a:extLst>
           </p:cNvPr>
@@ -12604,10 +12621,774 @@
           <a:bodyPr/>
           <a:lstStyle/>
           <a:p>
-            <a:endParaRPr lang="it-IT"/>
+            <a:endParaRPr lang="it-IT" dirty="0"/>
           </a:p>
         </p:txBody>
       </p:sp>
+    </p:spTree>
+    <p:extLst>
+      <p:ext uri="{BB962C8B-B14F-4D97-AF65-F5344CB8AC3E}">
+        <p14:creationId xmlns:p14="http://schemas.microsoft.com/office/powerpoint/2010/main" val="3466151987"/>
+      </p:ext>
+    </p:extLst>
+  </p:cSld>
+  <p:clrMapOvr>
+    <a:masterClrMapping/>
+  </p:clrMapOvr>
+</p:sld>
+</file>
+
+<file path=ppt/slides/slide11.xml><?xml version="1.0" encoding="utf-8"?>
+<p:sld xmlns:a="http://schemas.openxmlformats.org/drawingml/2006/main" xmlns:r="http://schemas.openxmlformats.org/officeDocument/2006/relationships" xmlns:p="http://schemas.openxmlformats.org/presentationml/2006/main">
+  <p:cSld>
+    <p:spTree>
+      <p:nvGrpSpPr>
+        <p:cNvPr id="1" name=""/>
+        <p:cNvGrpSpPr/>
+        <p:nvPr/>
+      </p:nvGrpSpPr>
+      <p:grpSpPr>
+        <a:xfrm>
+          <a:off x="0" y="0"/>
+          <a:ext cx="0" cy="0"/>
+          <a:chOff x="0" y="0"/>
+          <a:chExt cx="0" cy="0"/>
+        </a:xfrm>
+      </p:grpSpPr>
+      <p:pic>
+        <p:nvPicPr>
+          <p:cNvPr id="5" name="Immagine 4">
+            <a:extLst>
+              <a:ext uri="{FF2B5EF4-FFF2-40B4-BE49-F238E27FC236}">
+                <a16:creationId xmlns:a16="http://schemas.microsoft.com/office/drawing/2014/main" id="{23A3AB50-619E-4214-BB34-FD52B7DEC821}"/>
+              </a:ext>
+            </a:extLst>
+          </p:cNvPr>
+          <p:cNvPicPr>
+            <a:picLocks noChangeAspect="1"/>
+          </p:cNvPicPr>
+          <p:nvPr/>
+        </p:nvPicPr>
+        <p:blipFill>
+          <a:blip r:embed="rId2"/>
+          <a:stretch>
+            <a:fillRect/>
+          </a:stretch>
+        </p:blipFill>
+        <p:spPr>
+          <a:xfrm>
+            <a:off x="201336" y="123966"/>
+            <a:ext cx="11671882" cy="6492622"/>
+          </a:xfrm>
+          <a:prstGeom prst="rect">
+            <a:avLst/>
+          </a:prstGeom>
+        </p:spPr>
+      </p:pic>
+      <p:sp>
+        <p:nvSpPr>
+          <p:cNvPr id="2" name="Titolo 1">
+            <a:extLst>
+              <a:ext uri="{FF2B5EF4-FFF2-40B4-BE49-F238E27FC236}">
+                <a16:creationId xmlns:a16="http://schemas.microsoft.com/office/drawing/2014/main" id="{3E8982A2-FDE4-47FF-B9AB-14E4CD459CF0}"/>
+              </a:ext>
+            </a:extLst>
+          </p:cNvPr>
+          <p:cNvSpPr>
+            <a:spLocks noGrp="1"/>
+          </p:cNvSpPr>
+          <p:nvPr>
+            <p:ph type="title"/>
+          </p:nvPr>
+        </p:nvSpPr>
+        <p:spPr>
+          <a:xfrm>
+            <a:off x="1442907" y="555163"/>
+            <a:ext cx="5067648" cy="713064"/>
+          </a:xfrm>
+        </p:spPr>
+        <p:txBody>
+          <a:bodyPr/>
+          <a:lstStyle/>
+          <a:p>
+            <a:r>
+              <a:rPr lang="it-IT" dirty="0">
+                <a:solidFill>
+                  <a:schemeClr val="bg1">
+                    <a:lumMod val="95000"/>
+                    <a:lumOff val="5000"/>
+                  </a:schemeClr>
+                </a:solidFill>
+              </a:rPr>
+              <a:t>Automa perfezionato</a:t>
+            </a:r>
+          </a:p>
+        </p:txBody>
+      </p:sp>
+      <p:sp>
+        <p:nvSpPr>
+          <p:cNvPr id="4" name="CasellaDiTesto 3">
+            <a:extLst>
+              <a:ext uri="{FF2B5EF4-FFF2-40B4-BE49-F238E27FC236}">
+                <a16:creationId xmlns:a16="http://schemas.microsoft.com/office/drawing/2014/main" id="{962A4BD0-735C-4BDC-8EA2-B262A8709868}"/>
+              </a:ext>
+            </a:extLst>
+          </p:cNvPr>
+          <p:cNvSpPr txBox="1"/>
+          <p:nvPr/>
+        </p:nvSpPr>
+        <p:spPr>
+          <a:xfrm>
+            <a:off x="1442907" y="1055649"/>
+            <a:ext cx="9905998" cy="646331"/>
+          </a:xfrm>
+          <a:prstGeom prst="rect">
+            <a:avLst/>
+          </a:prstGeom>
+          <a:noFill/>
+        </p:spPr>
+        <p:txBody>
+          <a:bodyPr wrap="square" rtlCol="0">
+            <a:spAutoFit/>
+          </a:bodyPr>
+          <a:lstStyle/>
+          <a:p>
+            <a:r>
+              <a:rPr lang="it-IT" dirty="0">
+                <a:solidFill>
+                  <a:schemeClr val="bg1">
+                    <a:lumMod val="95000"/>
+                    <a:lumOff val="5000"/>
+                  </a:schemeClr>
+                </a:solidFill>
+              </a:rPr>
+              <a:t>La regola di </a:t>
+            </a:r>
+            <a:r>
+              <a:rPr lang="it-IT" i="1" dirty="0" err="1">
+                <a:solidFill>
+                  <a:schemeClr val="bg1">
+                    <a:lumMod val="95000"/>
+                    <a:lumOff val="5000"/>
+                  </a:schemeClr>
+                </a:solidFill>
+              </a:rPr>
+              <a:t>Noise</a:t>
+            </a:r>
+            <a:r>
+              <a:rPr lang="it-IT" i="1" dirty="0">
+                <a:solidFill>
+                  <a:schemeClr val="bg1">
+                    <a:lumMod val="95000"/>
+                    <a:lumOff val="5000"/>
+                  </a:schemeClr>
+                </a:solidFill>
+              </a:rPr>
+              <a:t> </a:t>
+            </a:r>
+            <a:r>
+              <a:rPr lang="it-IT" i="1" dirty="0" err="1">
+                <a:solidFill>
+                  <a:schemeClr val="bg1">
+                    <a:lumMod val="95000"/>
+                    <a:lumOff val="5000"/>
+                  </a:schemeClr>
+                </a:solidFill>
+              </a:rPr>
+              <a:t>Photon</a:t>
+            </a:r>
+            <a:r>
+              <a:rPr lang="it-IT" i="1" dirty="0">
+                <a:solidFill>
+                  <a:schemeClr val="bg1">
+                    <a:lumMod val="95000"/>
+                    <a:lumOff val="5000"/>
+                  </a:schemeClr>
+                </a:solidFill>
+              </a:rPr>
+              <a:t> </a:t>
+            </a:r>
+            <a:r>
+              <a:rPr lang="it-IT" i="1" dirty="0" err="1">
+                <a:solidFill>
+                  <a:schemeClr val="bg1">
+                    <a:lumMod val="95000"/>
+                    <a:lumOff val="5000"/>
+                  </a:schemeClr>
+                </a:solidFill>
+              </a:rPr>
+              <a:t>Creation</a:t>
+            </a:r>
+            <a:r>
+              <a:rPr lang="it-IT" dirty="0">
+                <a:solidFill>
+                  <a:schemeClr val="bg1">
+                    <a:lumMod val="95000"/>
+                    <a:lumOff val="5000"/>
+                  </a:schemeClr>
+                </a:solidFill>
+              </a:rPr>
+              <a:t> risulta piuttosto approssimativa: unisce effetti di emissione spontanea e agitazione termica in un’unica probabilità di rumore. Cosa succede se questi due effetti vengono separati?</a:t>
+            </a:r>
+          </a:p>
+        </p:txBody>
+      </p:sp>
+      <p:sp>
+        <p:nvSpPr>
+          <p:cNvPr id="6" name="CasellaDiTesto 5">
+            <a:extLst>
+              <a:ext uri="{FF2B5EF4-FFF2-40B4-BE49-F238E27FC236}">
+                <a16:creationId xmlns:a16="http://schemas.microsoft.com/office/drawing/2014/main" id="{5BE9BAA0-562F-4069-ACD3-08D468860F6B}"/>
+              </a:ext>
+            </a:extLst>
+          </p:cNvPr>
+          <p:cNvSpPr txBox="1"/>
+          <p:nvPr/>
+        </p:nvSpPr>
+        <p:spPr>
+          <a:xfrm>
+            <a:off x="8052733" y="3926325"/>
+            <a:ext cx="3820485" cy="2123658"/>
+          </a:xfrm>
+          <a:prstGeom prst="rect">
+            <a:avLst/>
+          </a:prstGeom>
+          <a:noFill/>
+        </p:spPr>
+        <p:txBody>
+          <a:bodyPr wrap="square" rtlCol="0">
+            <a:spAutoFit/>
+          </a:bodyPr>
+          <a:lstStyle/>
+          <a:p>
+            <a:r>
+              <a:rPr lang="it-IT" sz="1200" dirty="0">
+                <a:solidFill>
+                  <a:schemeClr val="bg1">
+                    <a:lumMod val="95000"/>
+                    <a:lumOff val="5000"/>
+                  </a:schemeClr>
+                </a:solidFill>
+                <a:latin typeface="Miriam Mono CLM" panose="02000503000000000000" pitchFamily="2" charset="-79"/>
+                <a:cs typeface="Miriam Mono CLM" panose="02000503000000000000" pitchFamily="2" charset="-79"/>
+              </a:rPr>
+              <a:t>TIME_STEPS = 1000;</a:t>
+            </a:r>
+          </a:p>
+          <a:p>
+            <a:r>
+              <a:rPr lang="it-IT" sz="1200" dirty="0">
+                <a:solidFill>
+                  <a:schemeClr val="bg1">
+                    <a:lumMod val="95000"/>
+                    <a:lumOff val="5000"/>
+                  </a:schemeClr>
+                </a:solidFill>
+                <a:latin typeface="Miriam Mono CLM" panose="02000503000000000000" pitchFamily="2" charset="-79"/>
+                <a:cs typeface="Miriam Mono CLM" panose="02000503000000000000" pitchFamily="2" charset="-79"/>
+              </a:rPr>
+              <a:t>LATTICE_WIDTH = 150;</a:t>
+            </a:r>
+          </a:p>
+          <a:p>
+            <a:r>
+              <a:rPr lang="it-IT" sz="1200" dirty="0">
+                <a:solidFill>
+                  <a:schemeClr val="bg1">
+                    <a:lumMod val="95000"/>
+                    <a:lumOff val="5000"/>
+                  </a:schemeClr>
+                </a:solidFill>
+                <a:latin typeface="Miriam Mono CLM" panose="02000503000000000000" pitchFamily="2" charset="-79"/>
+                <a:cs typeface="Miriam Mono CLM" panose="02000503000000000000" pitchFamily="2" charset="-79"/>
+              </a:rPr>
+              <a:t>LATTICE_HEIGHT = 150;</a:t>
+            </a:r>
+          </a:p>
+          <a:p>
+            <a:r>
+              <a:rPr lang="it-IT" sz="1200" dirty="0">
+                <a:solidFill>
+                  <a:schemeClr val="bg1">
+                    <a:lumMod val="95000"/>
+                    <a:lumOff val="5000"/>
+                  </a:schemeClr>
+                </a:solidFill>
+                <a:latin typeface="Miriam Mono CLM" panose="02000503000000000000" pitchFamily="2" charset="-79"/>
+                <a:cs typeface="Miriam Mono CLM" panose="02000503000000000000" pitchFamily="2" charset="-79"/>
+              </a:rPr>
+              <a:t>PHOTON_SATURATION = 25;</a:t>
+            </a:r>
+          </a:p>
+          <a:p>
+            <a:endParaRPr lang="it-IT" sz="1200" dirty="0">
+              <a:solidFill>
+                <a:schemeClr val="bg1">
+                  <a:lumMod val="95000"/>
+                  <a:lumOff val="5000"/>
+                </a:schemeClr>
+              </a:solidFill>
+              <a:latin typeface="Miriam Mono CLM" panose="02000503000000000000" pitchFamily="2" charset="-79"/>
+              <a:cs typeface="Miriam Mono CLM" panose="02000503000000000000" pitchFamily="2" charset="-79"/>
+            </a:endParaRPr>
+          </a:p>
+          <a:p>
+            <a:r>
+              <a:rPr lang="it-IT" sz="1200" dirty="0" err="1">
+                <a:solidFill>
+                  <a:schemeClr val="bg1">
+                    <a:lumMod val="95000"/>
+                    <a:lumOff val="5000"/>
+                  </a:schemeClr>
+                </a:solidFill>
+                <a:latin typeface="Miriam Mono CLM" panose="02000503000000000000" pitchFamily="2" charset="-79"/>
+                <a:cs typeface="Miriam Mono CLM" panose="02000503000000000000" pitchFamily="2" charset="-79"/>
+              </a:rPr>
+              <a:t>electronLifeTime</a:t>
+            </a:r>
+            <a:r>
+              <a:rPr lang="it-IT" sz="1200" dirty="0">
+                <a:solidFill>
+                  <a:schemeClr val="bg1">
+                    <a:lumMod val="95000"/>
+                    <a:lumOff val="5000"/>
+                  </a:schemeClr>
+                </a:solidFill>
+                <a:latin typeface="Miriam Mono CLM" panose="02000503000000000000" pitchFamily="2" charset="-79"/>
+                <a:cs typeface="Miriam Mono CLM" panose="02000503000000000000" pitchFamily="2" charset="-79"/>
+              </a:rPr>
+              <a:t> = 30;</a:t>
+            </a:r>
+          </a:p>
+          <a:p>
+            <a:r>
+              <a:rPr lang="it-IT" sz="1200" dirty="0" err="1">
+                <a:solidFill>
+                  <a:schemeClr val="bg1">
+                    <a:lumMod val="95000"/>
+                    <a:lumOff val="5000"/>
+                  </a:schemeClr>
+                </a:solidFill>
+                <a:latin typeface="Miriam Mono CLM" panose="02000503000000000000" pitchFamily="2" charset="-79"/>
+                <a:cs typeface="Miriam Mono CLM" panose="02000503000000000000" pitchFamily="2" charset="-79"/>
+              </a:rPr>
+              <a:t>photonLifeTime</a:t>
+            </a:r>
+            <a:r>
+              <a:rPr lang="it-IT" sz="1200" dirty="0">
+                <a:solidFill>
+                  <a:schemeClr val="bg1">
+                    <a:lumMod val="95000"/>
+                    <a:lumOff val="5000"/>
+                  </a:schemeClr>
+                </a:solidFill>
+                <a:latin typeface="Miriam Mono CLM" panose="02000503000000000000" pitchFamily="2" charset="-79"/>
+                <a:cs typeface="Miriam Mono CLM" panose="02000503000000000000" pitchFamily="2" charset="-79"/>
+              </a:rPr>
+              <a:t> = 10;</a:t>
+            </a:r>
+          </a:p>
+          <a:p>
+            <a:r>
+              <a:rPr lang="it-IT" sz="1200" dirty="0" err="1">
+                <a:solidFill>
+                  <a:schemeClr val="bg1">
+                    <a:lumMod val="95000"/>
+                    <a:lumOff val="5000"/>
+                  </a:schemeClr>
+                </a:solidFill>
+                <a:latin typeface="Miriam Mono CLM" panose="02000503000000000000" pitchFamily="2" charset="-79"/>
+                <a:cs typeface="Miriam Mono CLM" panose="02000503000000000000" pitchFamily="2" charset="-79"/>
+              </a:rPr>
+              <a:t>pumpingProbability</a:t>
+            </a:r>
+            <a:r>
+              <a:rPr lang="it-IT" sz="1200" dirty="0">
+                <a:solidFill>
+                  <a:schemeClr val="bg1">
+                    <a:lumMod val="95000"/>
+                    <a:lumOff val="5000"/>
+                  </a:schemeClr>
+                </a:solidFill>
+                <a:latin typeface="Miriam Mono CLM" panose="02000503000000000000" pitchFamily="2" charset="-79"/>
+                <a:cs typeface="Miriam Mono CLM" panose="02000503000000000000" pitchFamily="2" charset="-79"/>
+              </a:rPr>
+              <a:t> = 0.192;</a:t>
+            </a:r>
+          </a:p>
+          <a:p>
+            <a:r>
+              <a:rPr lang="it-IT" sz="1200" dirty="0" err="1">
+                <a:solidFill>
+                  <a:schemeClr val="bg1">
+                    <a:lumMod val="95000"/>
+                    <a:lumOff val="5000"/>
+                  </a:schemeClr>
+                </a:solidFill>
+                <a:latin typeface="Miriam Mono CLM" panose="02000503000000000000" pitchFamily="2" charset="-79"/>
+                <a:cs typeface="Miriam Mono CLM" panose="02000503000000000000" pitchFamily="2" charset="-79"/>
+              </a:rPr>
+              <a:t>stimulatedEmissionThreshold</a:t>
+            </a:r>
+            <a:r>
+              <a:rPr lang="it-IT" sz="1200" dirty="0">
+                <a:solidFill>
+                  <a:schemeClr val="bg1">
+                    <a:lumMod val="95000"/>
+                    <a:lumOff val="5000"/>
+                  </a:schemeClr>
+                </a:solidFill>
+                <a:latin typeface="Miriam Mono CLM" panose="02000503000000000000" pitchFamily="2" charset="-79"/>
+                <a:cs typeface="Miriam Mono CLM" panose="02000503000000000000" pitchFamily="2" charset="-79"/>
+              </a:rPr>
+              <a:t> = 1;</a:t>
+            </a:r>
+          </a:p>
+          <a:p>
+            <a:r>
+              <a:rPr lang="it-IT" sz="1200" dirty="0" err="1">
+                <a:solidFill>
+                  <a:schemeClr val="bg1">
+                    <a:lumMod val="95000"/>
+                    <a:lumOff val="5000"/>
+                  </a:schemeClr>
+                </a:solidFill>
+                <a:latin typeface="Miriam Mono CLM" panose="02000503000000000000" pitchFamily="2" charset="-79"/>
+                <a:cs typeface="Miriam Mono CLM" panose="02000503000000000000" pitchFamily="2" charset="-79"/>
+              </a:rPr>
+              <a:t>thermalExcitingProbability</a:t>
+            </a:r>
+            <a:r>
+              <a:rPr lang="it-IT" sz="1200" dirty="0">
+                <a:solidFill>
+                  <a:schemeClr val="bg1">
+                    <a:lumMod val="95000"/>
+                    <a:lumOff val="5000"/>
+                  </a:schemeClr>
+                </a:solidFill>
+                <a:latin typeface="Miriam Mono CLM" panose="02000503000000000000" pitchFamily="2" charset="-79"/>
+                <a:cs typeface="Miriam Mono CLM" panose="02000503000000000000" pitchFamily="2" charset="-79"/>
+              </a:rPr>
+              <a:t> = 0.001;</a:t>
+            </a:r>
+          </a:p>
+          <a:p>
+            <a:r>
+              <a:rPr lang="it-IT" sz="1200" dirty="0" err="1">
+                <a:solidFill>
+                  <a:schemeClr val="bg1">
+                    <a:lumMod val="95000"/>
+                    <a:lumOff val="5000"/>
+                  </a:schemeClr>
+                </a:solidFill>
+                <a:latin typeface="Miriam Mono CLM" panose="02000503000000000000" pitchFamily="2" charset="-79"/>
+                <a:cs typeface="Miriam Mono CLM" panose="02000503000000000000" pitchFamily="2" charset="-79"/>
+              </a:rPr>
+              <a:t>spontaneousEmissionProbability</a:t>
+            </a:r>
+            <a:r>
+              <a:rPr lang="it-IT" sz="1200" dirty="0">
+                <a:solidFill>
+                  <a:schemeClr val="bg1">
+                    <a:lumMod val="95000"/>
+                    <a:lumOff val="5000"/>
+                  </a:schemeClr>
+                </a:solidFill>
+                <a:latin typeface="Miriam Mono CLM" panose="02000503000000000000" pitchFamily="2" charset="-79"/>
+                <a:cs typeface="Miriam Mono CLM" panose="02000503000000000000" pitchFamily="2" charset="-79"/>
+              </a:rPr>
+              <a:t> = 0.02;</a:t>
+            </a:r>
+          </a:p>
+        </p:txBody>
+      </p:sp>
+    </p:spTree>
+    <p:extLst>
+      <p:ext uri="{BB962C8B-B14F-4D97-AF65-F5344CB8AC3E}">
+        <p14:creationId xmlns:p14="http://schemas.microsoft.com/office/powerpoint/2010/main" val="3722441106"/>
+      </p:ext>
+    </p:extLst>
+  </p:cSld>
+  <p:clrMapOvr>
+    <a:masterClrMapping/>
+  </p:clrMapOvr>
+</p:sld>
+</file>
+
+<file path=ppt/slides/slide12.xml><?xml version="1.0" encoding="utf-8"?>
+<p:sld xmlns:a="http://schemas.openxmlformats.org/drawingml/2006/main" xmlns:r="http://schemas.openxmlformats.org/officeDocument/2006/relationships" xmlns:p="http://schemas.openxmlformats.org/presentationml/2006/main">
+  <p:cSld>
+    <p:spTree>
+      <p:nvGrpSpPr>
+        <p:cNvPr id="1" name=""/>
+        <p:cNvGrpSpPr/>
+        <p:nvPr/>
+      </p:nvGrpSpPr>
+      <p:grpSpPr>
+        <a:xfrm>
+          <a:off x="0" y="0"/>
+          <a:ext cx="0" cy="0"/>
+          <a:chOff x="0" y="0"/>
+          <a:chExt cx="0" cy="0"/>
+        </a:xfrm>
+      </p:grpSpPr>
+      <p:sp>
+        <p:nvSpPr>
+          <p:cNvPr id="2" name="Titolo 1">
+            <a:extLst>
+              <a:ext uri="{FF2B5EF4-FFF2-40B4-BE49-F238E27FC236}">
+                <a16:creationId xmlns:a16="http://schemas.microsoft.com/office/drawing/2014/main" id="{8C0FE870-368B-490D-829A-022704F219CA}"/>
+              </a:ext>
+            </a:extLst>
+          </p:cNvPr>
+          <p:cNvSpPr>
+            <a:spLocks noGrp="1"/>
+          </p:cNvSpPr>
+          <p:nvPr>
+            <p:ph type="title"/>
+          </p:nvPr>
+        </p:nvSpPr>
+        <p:spPr>
+          <a:xfrm>
+            <a:off x="1258859" y="98401"/>
+            <a:ext cx="9905998" cy="968398"/>
+          </a:xfrm>
+        </p:spPr>
+        <p:txBody>
+          <a:bodyPr/>
+          <a:lstStyle/>
+          <a:p>
+            <a:r>
+              <a:rPr lang="it-IT" dirty="0"/>
+              <a:t>Dal modello alla realtà</a:t>
+            </a:r>
+          </a:p>
+        </p:txBody>
+      </p:sp>
+      <mc:AlternateContent xmlns:mc="http://schemas.openxmlformats.org/markup-compatibility/2006">
+        <mc:Choice xmlns:a14="http://schemas.microsoft.com/office/drawing/2010/main" Requires="a14">
+          <p:sp>
+            <p:nvSpPr>
+              <p:cNvPr id="6" name="CasellaDiTesto 5">
+                <a:extLst>
+                  <a:ext uri="{FF2B5EF4-FFF2-40B4-BE49-F238E27FC236}">
+                    <a16:creationId xmlns:a16="http://schemas.microsoft.com/office/drawing/2014/main" id="{4A4DCF8D-6F3F-49A4-9472-5D82285DE4EE}"/>
+                  </a:ext>
+                </a:extLst>
+              </p:cNvPr>
+              <p:cNvSpPr txBox="1"/>
+              <p:nvPr/>
+            </p:nvSpPr>
+            <p:spPr>
+              <a:xfrm>
+                <a:off x="1258859" y="865463"/>
+                <a:ext cx="9905998" cy="923330"/>
+              </a:xfrm>
+              <a:prstGeom prst="rect">
+                <a:avLst/>
+              </a:prstGeom>
+              <a:noFill/>
+            </p:spPr>
+            <p:txBody>
+              <a:bodyPr wrap="square" rtlCol="0">
+                <a:spAutoFit/>
+              </a:bodyPr>
+              <a:lstStyle/>
+              <a:p>
+                <a:r>
+                  <a:rPr lang="it-IT" dirty="0"/>
+                  <a:t>Prendiamo il caso dei valori plausibili, ad esempio…</a:t>
+                </a:r>
+              </a:p>
+              <a:p>
+                <a:r>
+                  <a:rPr lang="el-GR" dirty="0"/>
+                  <a:t>τ</a:t>
+                </a:r>
+                <a:r>
+                  <a:rPr lang="it-IT" sz="1400" dirty="0"/>
+                  <a:t>a</a:t>
+                </a:r>
+                <a:r>
+                  <a:rPr lang="it-IT" dirty="0"/>
+                  <a:t> = 100 </a:t>
+                </a:r>
+                <a:r>
+                  <a:rPr lang="it-IT" dirty="0" err="1"/>
+                  <a:t>ps</a:t>
+                </a:r>
+                <a:r>
+                  <a:rPr lang="it-IT" dirty="0"/>
+                  <a:t> [Tempo di vita dei portatori]</a:t>
+                </a:r>
+              </a:p>
+              <a:p>
+                <a:r>
+                  <a:rPr lang="it-IT" dirty="0"/>
+                  <a:t>FSR = 107 GHz (0.6 nm) </a:t>
+                </a:r>
+                <a14:m>
+                  <m:oMath xmlns:m="http://schemas.openxmlformats.org/officeDocument/2006/math">
+                    <m:r>
+                      <a:rPr lang="it-IT" i="1" smtClean="0">
+                        <a:latin typeface="Cambria Math" panose="02040503050406030204" pitchFamily="18" charset="0"/>
+                      </a:rPr>
+                      <m:t>⇒</m:t>
+                    </m:r>
+                  </m:oMath>
+                </a14:m>
+                <a:r>
+                  <a:rPr lang="it-IT" dirty="0"/>
+                  <a:t> B</a:t>
+                </a:r>
+                <a:r>
+                  <a:rPr lang="it-IT" sz="1200" dirty="0"/>
+                  <a:t>3dB</a:t>
+                </a:r>
+                <a:r>
+                  <a:rPr lang="it-IT" dirty="0"/>
+                  <a:t> =10.22 GHz </a:t>
+                </a:r>
+                <a14:m>
+                  <m:oMath xmlns:m="http://schemas.openxmlformats.org/officeDocument/2006/math">
+                    <m:r>
+                      <a:rPr lang="it-IT" i="1">
+                        <a:latin typeface="Cambria Math" panose="02040503050406030204" pitchFamily="18" charset="0"/>
+                      </a:rPr>
+                      <m:t>⇒</m:t>
+                    </m:r>
+                  </m:oMath>
+                </a14:m>
+                <a:r>
+                  <a:rPr lang="it-IT" dirty="0"/>
+                  <a:t> </a:t>
+                </a:r>
+                <a14:m>
+                  <m:oMath xmlns:m="http://schemas.openxmlformats.org/officeDocument/2006/math">
+                    <m:sSub>
+                      <m:sSubPr>
+                        <m:ctrlPr>
+                          <a:rPr lang="it-IT" b="0" i="0" smtClean="0">
+                            <a:latin typeface="Cambria Math" panose="02040503050406030204" pitchFamily="18" charset="0"/>
+                            <a:ea typeface="Cambria Math" panose="02040503050406030204" pitchFamily="18" charset="0"/>
+                          </a:rPr>
+                        </m:ctrlPr>
+                      </m:sSubPr>
+                      <m:e>
+                        <m:r>
+                          <m:rPr>
+                            <m:sty m:val="p"/>
+                          </m:rPr>
+                          <a:rPr lang="el-GR" b="0" i="1" smtClean="0">
+                            <a:latin typeface="Cambria Math" panose="02040503050406030204" pitchFamily="18" charset="0"/>
+                            <a:ea typeface="Cambria Math" panose="02040503050406030204" pitchFamily="18" charset="0"/>
+                          </a:rPr>
+                          <m:t>τ</m:t>
+                        </m:r>
+                      </m:e>
+                      <m:sub>
+                        <m:r>
+                          <m:rPr>
+                            <m:sty m:val="p"/>
+                          </m:rPr>
+                          <a:rPr lang="it-IT" b="0" i="0" smtClean="0">
+                            <a:latin typeface="Cambria Math" panose="02040503050406030204" pitchFamily="18" charset="0"/>
+                            <a:ea typeface="Cambria Math" panose="02040503050406030204" pitchFamily="18" charset="0"/>
+                          </a:rPr>
+                          <m:t>c</m:t>
+                        </m:r>
+                      </m:sub>
+                    </m:sSub>
+                    <m:r>
+                      <a:rPr lang="it-IT" b="0" i="0" smtClean="0">
+                        <a:latin typeface="Cambria Math" panose="02040503050406030204" pitchFamily="18" charset="0"/>
+                        <a:ea typeface="Cambria Math" panose="02040503050406030204" pitchFamily="18" charset="0"/>
+                      </a:rPr>
+                      <m:t>=15.57 </m:t>
+                    </m:r>
+                    <m:r>
+                      <m:rPr>
+                        <m:sty m:val="p"/>
+                      </m:rPr>
+                      <a:rPr lang="it-IT" b="0" i="0" smtClean="0">
+                        <a:latin typeface="Cambria Math" panose="02040503050406030204" pitchFamily="18" charset="0"/>
+                        <a:ea typeface="Cambria Math" panose="02040503050406030204" pitchFamily="18" charset="0"/>
+                      </a:rPr>
+                      <m:t>ps</m:t>
+                    </m:r>
+                    <m:r>
+                      <a:rPr lang="it-IT" i="1" smtClean="0">
+                        <a:latin typeface="Cambria Math" panose="02040503050406030204" pitchFamily="18" charset="0"/>
+                        <a:ea typeface="Cambria Math" panose="02040503050406030204" pitchFamily="18" charset="0"/>
+                      </a:rPr>
+                      <m:t>≈</m:t>
+                    </m:r>
+                    <m:r>
+                      <a:rPr lang="it-IT" b="0" i="1" smtClean="0">
+                        <a:latin typeface="Cambria Math" panose="02040503050406030204" pitchFamily="18" charset="0"/>
+                        <a:ea typeface="Cambria Math" panose="02040503050406030204" pitchFamily="18" charset="0"/>
+                      </a:rPr>
+                      <m:t>16 </m:t>
+                    </m:r>
+                    <m:r>
+                      <a:rPr lang="it-IT" b="0" i="1" smtClean="0">
+                        <a:latin typeface="Cambria Math" panose="02040503050406030204" pitchFamily="18" charset="0"/>
+                        <a:ea typeface="Cambria Math" panose="02040503050406030204" pitchFamily="18" charset="0"/>
+                      </a:rPr>
+                      <m:t>𝑝𝑠</m:t>
+                    </m:r>
+                  </m:oMath>
+                </a14:m>
+                <a:endParaRPr lang="it-IT" dirty="0"/>
+              </a:p>
+            </p:txBody>
+          </p:sp>
+        </mc:Choice>
+        <mc:Fallback>
+          <p:sp>
+            <p:nvSpPr>
+              <p:cNvPr id="6" name="CasellaDiTesto 5">
+                <a:extLst>
+                  <a:ext uri="{FF2B5EF4-FFF2-40B4-BE49-F238E27FC236}">
+                    <a16:creationId xmlns:a16="http://schemas.microsoft.com/office/drawing/2014/main" id="{4A4DCF8D-6F3F-49A4-9472-5D82285DE4EE}"/>
+                  </a:ext>
+                </a:extLst>
+              </p:cNvPr>
+              <p:cNvSpPr txBox="1">
+                <a:spLocks noRot="1" noChangeAspect="1" noMove="1" noResize="1" noEditPoints="1" noAdjustHandles="1" noChangeArrowheads="1" noChangeShapeType="1" noTextEdit="1"/>
+              </p:cNvSpPr>
+              <p:nvPr/>
+            </p:nvSpPr>
+            <p:spPr>
+              <a:xfrm>
+                <a:off x="1258859" y="865463"/>
+                <a:ext cx="9905998" cy="923330"/>
+              </a:xfrm>
+              <a:prstGeom prst="rect">
+                <a:avLst/>
+              </a:prstGeom>
+              <a:blipFill>
+                <a:blip r:embed="rId2"/>
+                <a:stretch>
+                  <a:fillRect l="-554" t="-3974" b="-9934"/>
+                </a:stretch>
+              </a:blipFill>
+            </p:spPr>
+            <p:txBody>
+              <a:bodyPr/>
+              <a:lstStyle/>
+              <a:p>
+                <a:r>
+                  <a:rPr lang="it-IT">
+                    <a:noFill/>
+                  </a:rPr>
+                  <a:t> </a:t>
+                </a:r>
+              </a:p>
+            </p:txBody>
+          </p:sp>
+        </mc:Fallback>
+      </mc:AlternateContent>
     </p:spTree>
     <p:extLst>
       <p:ext uri="{BB962C8B-B14F-4D97-AF65-F5344CB8AC3E}">
@@ -13587,6 +14368,36 @@
           <a:chExt cx="0" cy="0"/>
         </a:xfrm>
       </p:grpSpPr>
+      <p:pic>
+        <p:nvPicPr>
+          <p:cNvPr id="7" name="Immagine 6">
+            <a:extLst>
+              <a:ext uri="{FF2B5EF4-FFF2-40B4-BE49-F238E27FC236}">
+                <a16:creationId xmlns:a16="http://schemas.microsoft.com/office/drawing/2014/main" id="{6F051BD5-A862-488D-AF87-7D0C1009FBFB}"/>
+              </a:ext>
+            </a:extLst>
+          </p:cNvPr>
+          <p:cNvPicPr>
+            <a:picLocks noChangeAspect="1"/>
+          </p:cNvPicPr>
+          <p:nvPr/>
+        </p:nvPicPr>
+        <p:blipFill>
+          <a:blip r:embed="rId2"/>
+          <a:stretch>
+            <a:fillRect/>
+          </a:stretch>
+        </p:blipFill>
+        <p:spPr>
+          <a:xfrm>
+            <a:off x="1266738" y="989900"/>
+            <a:ext cx="10024844" cy="5577158"/>
+          </a:xfrm>
+          <a:prstGeom prst="rect">
+            <a:avLst/>
+          </a:prstGeom>
+        </p:spPr>
+      </p:pic>
       <p:sp>
         <p:nvSpPr>
           <p:cNvPr id="2" name="Titolo 1">
@@ -13622,38 +14433,443 @@
       </p:sp>
       <p:sp>
         <p:nvSpPr>
-          <p:cNvPr id="3" name="Segnaposto contenuto 2">
+          <p:cNvPr id="4" name="CasellaDiTesto 3">
             <a:extLst>
               <a:ext uri="{FF2B5EF4-FFF2-40B4-BE49-F238E27FC236}">
-                <a16:creationId xmlns:a16="http://schemas.microsoft.com/office/drawing/2014/main" id="{B85B9862-EAF6-4DE9-8B9E-5957D3317518}"/>
+                <a16:creationId xmlns:a16="http://schemas.microsoft.com/office/drawing/2014/main" id="{C839472A-FE7F-4A55-9D1C-B82A58B72CB4}"/>
               </a:ext>
             </a:extLst>
           </p:cNvPr>
-          <p:cNvSpPr>
-            <a:spLocks noGrp="1"/>
-          </p:cNvSpPr>
-          <p:nvPr>
-            <p:ph idx="1"/>
-          </p:nvPr>
+          <p:cNvSpPr txBox="1"/>
+          <p:nvPr/>
         </p:nvSpPr>
         <p:spPr>
           <a:xfrm>
-            <a:off x="8053431" y="2249487"/>
-            <a:ext cx="2993980" cy="3541714"/>
+            <a:off x="7315898" y="1965290"/>
+            <a:ext cx="3731513" cy="923330"/>
           </a:xfrm>
+          <a:prstGeom prst="rect">
+            <a:avLst/>
+          </a:prstGeom>
+          <a:noFill/>
         </p:spPr>
         <p:txBody>
-          <a:bodyPr/>
+          <a:bodyPr wrap="square" rtlCol="0">
+            <a:spAutoFit/>
+          </a:bodyPr>
           <a:lstStyle/>
           <a:p>
-            <a:endParaRPr lang="it-IT" dirty="0"/>
+            <a:pPr algn="r"/>
+            <a:r>
+              <a:rPr lang="it-IT" dirty="0">
+                <a:solidFill>
+                  <a:schemeClr val="bg1">
+                    <a:lumMod val="95000"/>
+                    <a:lumOff val="5000"/>
+                  </a:schemeClr>
+                </a:solidFill>
+              </a:rPr>
+              <a:t>Per valori di </a:t>
+            </a:r>
+            <a:r>
+              <a:rPr lang="el-GR" dirty="0">
+                <a:solidFill>
+                  <a:schemeClr val="bg1">
+                    <a:lumMod val="95000"/>
+                    <a:lumOff val="5000"/>
+                  </a:schemeClr>
+                </a:solidFill>
+              </a:rPr>
+              <a:t>τ</a:t>
+            </a:r>
+            <a:r>
+              <a:rPr lang="en-US" sz="1200" dirty="0">
+                <a:solidFill>
+                  <a:schemeClr val="bg1">
+                    <a:lumMod val="95000"/>
+                    <a:lumOff val="5000"/>
+                  </a:schemeClr>
+                </a:solidFill>
+              </a:rPr>
+              <a:t>a </a:t>
+            </a:r>
+            <a:r>
+              <a:rPr lang="en-US" dirty="0">
+                <a:solidFill>
+                  <a:schemeClr val="bg1">
+                    <a:lumMod val="95000"/>
+                    <a:lumOff val="5000"/>
+                  </a:schemeClr>
+                </a:solidFill>
+              </a:rPr>
+              <a:t>e </a:t>
+            </a:r>
+            <a:r>
+              <a:rPr lang="el-GR" dirty="0">
+                <a:solidFill>
+                  <a:schemeClr val="bg1">
+                    <a:lumMod val="95000"/>
+                    <a:lumOff val="5000"/>
+                  </a:schemeClr>
+                </a:solidFill>
+              </a:rPr>
+              <a:t>τ</a:t>
+            </a:r>
+            <a:r>
+              <a:rPr lang="en-US" sz="1200" dirty="0">
+                <a:solidFill>
+                  <a:schemeClr val="bg1">
+                    <a:lumMod val="95000"/>
+                    <a:lumOff val="5000"/>
+                  </a:schemeClr>
+                </a:solidFill>
+              </a:rPr>
+              <a:t>c </a:t>
+            </a:r>
+            <a:r>
+              <a:rPr lang="en-US" dirty="0">
+                <a:solidFill>
+                  <a:schemeClr val="bg1">
+                    <a:lumMod val="95000"/>
+                    <a:lumOff val="5000"/>
+                  </a:schemeClr>
+                </a:solidFill>
+              </a:rPr>
+              <a:t>molto </a:t>
+            </a:r>
+            <a:r>
+              <a:rPr lang="en-US" dirty="0" err="1">
+                <a:solidFill>
+                  <a:schemeClr val="bg1">
+                    <a:lumMod val="95000"/>
+                    <a:lumOff val="5000"/>
+                  </a:schemeClr>
+                </a:solidFill>
+              </a:rPr>
+              <a:t>vicini</a:t>
+            </a:r>
+            <a:r>
+              <a:rPr lang="en-US" dirty="0">
+                <a:solidFill>
+                  <a:schemeClr val="bg1">
+                    <a:lumMod val="95000"/>
+                    <a:lumOff val="5000"/>
+                  </a:schemeClr>
+                </a:solidFill>
+              </a:rPr>
+              <a:t>, il regime di </a:t>
+            </a:r>
+            <a:r>
+              <a:rPr lang="en-US" dirty="0" err="1">
+                <a:solidFill>
+                  <a:schemeClr val="bg1">
+                    <a:lumMod val="95000"/>
+                    <a:lumOff val="5000"/>
+                  </a:schemeClr>
+                </a:solidFill>
+              </a:rPr>
+              <a:t>funzionamento</a:t>
+            </a:r>
+            <a:r>
+              <a:rPr lang="en-US" dirty="0">
+                <a:solidFill>
+                  <a:schemeClr val="bg1">
+                    <a:lumMod val="95000"/>
+                    <a:lumOff val="5000"/>
+                  </a:schemeClr>
+                </a:solidFill>
+              </a:rPr>
+              <a:t> </a:t>
+            </a:r>
+            <a:r>
+              <a:rPr lang="it-IT" dirty="0">
+                <a:solidFill>
+                  <a:schemeClr val="bg1">
+                    <a:lumMod val="95000"/>
+                    <a:lumOff val="5000"/>
+                  </a:schemeClr>
+                </a:solidFill>
+              </a:rPr>
+              <a:t>è «costante» o </a:t>
+            </a:r>
+            <a:r>
+              <a:rPr lang="it-IT" i="1" dirty="0">
+                <a:solidFill>
+                  <a:schemeClr val="bg1">
+                    <a:lumMod val="95000"/>
+                    <a:lumOff val="5000"/>
+                  </a:schemeClr>
+                </a:solidFill>
+              </a:rPr>
+              <a:t>non-</a:t>
+            </a:r>
+            <a:r>
+              <a:rPr lang="it-IT" i="1" dirty="0" err="1">
+                <a:solidFill>
+                  <a:schemeClr val="bg1">
+                    <a:lumMod val="95000"/>
+                    <a:lumOff val="5000"/>
+                  </a:schemeClr>
+                </a:solidFill>
+              </a:rPr>
+              <a:t>spiking</a:t>
+            </a:r>
+            <a:endParaRPr lang="it-IT" dirty="0">
+              <a:solidFill>
+                <a:schemeClr val="bg1">
+                  <a:lumMod val="95000"/>
+                  <a:lumOff val="5000"/>
+                </a:schemeClr>
+              </a:solidFill>
+            </a:endParaRPr>
+          </a:p>
+        </p:txBody>
+      </p:sp>
+      <p:sp>
+        <p:nvSpPr>
+          <p:cNvPr id="3" name="CasellaDiTesto 2">
+            <a:extLst>
+              <a:ext uri="{FF2B5EF4-FFF2-40B4-BE49-F238E27FC236}">
+                <a16:creationId xmlns:a16="http://schemas.microsoft.com/office/drawing/2014/main" id="{D101E619-2BF7-4516-AE62-D7C0F1CB8E25}"/>
+              </a:ext>
+            </a:extLst>
+          </p:cNvPr>
+          <p:cNvSpPr txBox="1"/>
+          <p:nvPr/>
+        </p:nvSpPr>
+        <p:spPr>
+          <a:xfrm>
+            <a:off x="7533314" y="2999885"/>
+            <a:ext cx="3144982" cy="1938992"/>
+          </a:xfrm>
+          <a:prstGeom prst="rect">
+            <a:avLst/>
+          </a:prstGeom>
+          <a:noFill/>
+        </p:spPr>
+        <p:txBody>
+          <a:bodyPr wrap="square" rtlCol="0">
+            <a:spAutoFit/>
+          </a:bodyPr>
+          <a:lstStyle/>
+          <a:p>
+            <a:r>
+              <a:rPr lang="it-IT" sz="1200" dirty="0">
+                <a:solidFill>
+                  <a:schemeClr val="bg1">
+                    <a:lumMod val="95000"/>
+                    <a:lumOff val="5000"/>
+                  </a:schemeClr>
+                </a:solidFill>
+                <a:latin typeface="Miriam Mono CLM" panose="02000503000000000000" pitchFamily="2" charset="-79"/>
+                <a:cs typeface="Miriam Mono CLM" panose="02000503000000000000" pitchFamily="2" charset="-79"/>
+              </a:rPr>
+              <a:t>TIME_STEPS = 200;</a:t>
+            </a:r>
+          </a:p>
+          <a:p>
+            <a:r>
+              <a:rPr lang="it-IT" sz="1200" dirty="0">
+                <a:solidFill>
+                  <a:schemeClr val="bg1">
+                    <a:lumMod val="95000"/>
+                    <a:lumOff val="5000"/>
+                  </a:schemeClr>
+                </a:solidFill>
+                <a:latin typeface="Miriam Mono CLM" panose="02000503000000000000" pitchFamily="2" charset="-79"/>
+                <a:cs typeface="Miriam Mono CLM" panose="02000503000000000000" pitchFamily="2" charset="-79"/>
+              </a:rPr>
+              <a:t>LATTICE_WIDTH = 200;</a:t>
+            </a:r>
+          </a:p>
+          <a:p>
+            <a:r>
+              <a:rPr lang="it-IT" sz="1200" dirty="0">
+                <a:solidFill>
+                  <a:schemeClr val="bg1">
+                    <a:lumMod val="95000"/>
+                    <a:lumOff val="5000"/>
+                  </a:schemeClr>
+                </a:solidFill>
+                <a:latin typeface="Miriam Mono CLM" panose="02000503000000000000" pitchFamily="2" charset="-79"/>
+                <a:cs typeface="Miriam Mono CLM" panose="02000503000000000000" pitchFamily="2" charset="-79"/>
+              </a:rPr>
+              <a:t>LATTICE_HEIGHT = 200;</a:t>
+            </a:r>
+          </a:p>
+          <a:p>
+            <a:r>
+              <a:rPr lang="it-IT" sz="1200" dirty="0">
+                <a:solidFill>
+                  <a:schemeClr val="bg1">
+                    <a:lumMod val="95000"/>
+                    <a:lumOff val="5000"/>
+                  </a:schemeClr>
+                </a:solidFill>
+                <a:latin typeface="Miriam Mono CLM" panose="02000503000000000000" pitchFamily="2" charset="-79"/>
+                <a:cs typeface="Miriam Mono CLM" panose="02000503000000000000" pitchFamily="2" charset="-79"/>
+              </a:rPr>
+              <a:t>PHOTON_SATURATION = 25;</a:t>
+            </a:r>
+          </a:p>
+          <a:p>
+            <a:endParaRPr lang="it-IT" sz="1200" dirty="0">
+              <a:solidFill>
+                <a:schemeClr val="bg1">
+                  <a:lumMod val="95000"/>
+                  <a:lumOff val="5000"/>
+                </a:schemeClr>
+              </a:solidFill>
+              <a:latin typeface="Miriam Mono CLM" panose="02000503000000000000" pitchFamily="2" charset="-79"/>
+              <a:cs typeface="Miriam Mono CLM" panose="02000503000000000000" pitchFamily="2" charset="-79"/>
+            </a:endParaRPr>
+          </a:p>
+          <a:p>
+            <a:r>
+              <a:rPr lang="it-IT" sz="1200" dirty="0" err="1">
+                <a:solidFill>
+                  <a:schemeClr val="bg1">
+                    <a:lumMod val="95000"/>
+                    <a:lumOff val="5000"/>
+                  </a:schemeClr>
+                </a:solidFill>
+                <a:latin typeface="Miriam Mono CLM" panose="02000503000000000000" pitchFamily="2" charset="-79"/>
+                <a:cs typeface="Miriam Mono CLM" panose="02000503000000000000" pitchFamily="2" charset="-79"/>
+              </a:rPr>
+              <a:t>electronLifeTime</a:t>
+            </a:r>
+            <a:r>
+              <a:rPr lang="it-IT" sz="1200" dirty="0">
+                <a:solidFill>
+                  <a:schemeClr val="bg1">
+                    <a:lumMod val="95000"/>
+                    <a:lumOff val="5000"/>
+                  </a:schemeClr>
+                </a:solidFill>
+                <a:latin typeface="Miriam Mono CLM" panose="02000503000000000000" pitchFamily="2" charset="-79"/>
+                <a:cs typeface="Miriam Mono CLM" panose="02000503000000000000" pitchFamily="2" charset="-79"/>
+              </a:rPr>
+              <a:t> = 30;</a:t>
+            </a:r>
+          </a:p>
+          <a:p>
+            <a:r>
+              <a:rPr lang="it-IT" sz="1200" dirty="0" err="1">
+                <a:solidFill>
+                  <a:schemeClr val="bg1">
+                    <a:lumMod val="95000"/>
+                    <a:lumOff val="5000"/>
+                  </a:schemeClr>
+                </a:solidFill>
+                <a:latin typeface="Miriam Mono CLM" panose="02000503000000000000" pitchFamily="2" charset="-79"/>
+                <a:cs typeface="Miriam Mono CLM" panose="02000503000000000000" pitchFamily="2" charset="-79"/>
+              </a:rPr>
+              <a:t>photonLifeTime</a:t>
+            </a:r>
+            <a:r>
+              <a:rPr lang="it-IT" sz="1200" dirty="0">
+                <a:solidFill>
+                  <a:schemeClr val="bg1">
+                    <a:lumMod val="95000"/>
+                    <a:lumOff val="5000"/>
+                  </a:schemeClr>
+                </a:solidFill>
+                <a:latin typeface="Miriam Mono CLM" panose="02000503000000000000" pitchFamily="2" charset="-79"/>
+                <a:cs typeface="Miriam Mono CLM" panose="02000503000000000000" pitchFamily="2" charset="-79"/>
+              </a:rPr>
+              <a:t> = 10;</a:t>
+            </a:r>
+          </a:p>
+          <a:p>
+            <a:r>
+              <a:rPr lang="it-IT" sz="1200" dirty="0" err="1">
+                <a:solidFill>
+                  <a:schemeClr val="bg1">
+                    <a:lumMod val="95000"/>
+                    <a:lumOff val="5000"/>
+                  </a:schemeClr>
+                </a:solidFill>
+                <a:latin typeface="Miriam Mono CLM" panose="02000503000000000000" pitchFamily="2" charset="-79"/>
+                <a:cs typeface="Miriam Mono CLM" panose="02000503000000000000" pitchFamily="2" charset="-79"/>
+              </a:rPr>
+              <a:t>pumpingProbability</a:t>
+            </a:r>
+            <a:r>
+              <a:rPr lang="it-IT" sz="1200" dirty="0">
+                <a:solidFill>
+                  <a:schemeClr val="bg1">
+                    <a:lumMod val="95000"/>
+                    <a:lumOff val="5000"/>
+                  </a:schemeClr>
+                </a:solidFill>
+                <a:latin typeface="Miriam Mono CLM" panose="02000503000000000000" pitchFamily="2" charset="-79"/>
+                <a:cs typeface="Miriam Mono CLM" panose="02000503000000000000" pitchFamily="2" charset="-79"/>
+              </a:rPr>
+              <a:t> = 0.192;</a:t>
+            </a:r>
+          </a:p>
+          <a:p>
+            <a:r>
+              <a:rPr lang="it-IT" sz="1200" dirty="0" err="1">
+                <a:solidFill>
+                  <a:schemeClr val="bg1">
+                    <a:lumMod val="95000"/>
+                    <a:lumOff val="5000"/>
+                  </a:schemeClr>
+                </a:solidFill>
+                <a:latin typeface="Miriam Mono CLM" panose="02000503000000000000" pitchFamily="2" charset="-79"/>
+                <a:cs typeface="Miriam Mono CLM" panose="02000503000000000000" pitchFamily="2" charset="-79"/>
+              </a:rPr>
+              <a:t>noiseProbability</a:t>
+            </a:r>
+            <a:r>
+              <a:rPr lang="it-IT" sz="1200" dirty="0">
+                <a:solidFill>
+                  <a:schemeClr val="bg1">
+                    <a:lumMod val="95000"/>
+                    <a:lumOff val="5000"/>
+                  </a:schemeClr>
+                </a:solidFill>
+                <a:latin typeface="Miriam Mono CLM" panose="02000503000000000000" pitchFamily="2" charset="-79"/>
+                <a:cs typeface="Miriam Mono CLM" panose="02000503000000000000" pitchFamily="2" charset="-79"/>
+              </a:rPr>
+              <a:t> = 0.009;</a:t>
+            </a:r>
+          </a:p>
+          <a:p>
+            <a:r>
+              <a:rPr lang="it-IT" sz="1200" dirty="0" err="1">
+                <a:solidFill>
+                  <a:schemeClr val="bg1">
+                    <a:lumMod val="95000"/>
+                    <a:lumOff val="5000"/>
+                  </a:schemeClr>
+                </a:solidFill>
+                <a:latin typeface="Miriam Mono CLM" panose="02000503000000000000" pitchFamily="2" charset="-79"/>
+                <a:cs typeface="Miriam Mono CLM" panose="02000503000000000000" pitchFamily="2" charset="-79"/>
+              </a:rPr>
+              <a:t>stimulatedEmissionThreshold</a:t>
+            </a:r>
+            <a:r>
+              <a:rPr lang="it-IT" sz="1200" dirty="0">
+                <a:solidFill>
+                  <a:schemeClr val="bg1">
+                    <a:lumMod val="95000"/>
+                    <a:lumOff val="5000"/>
+                  </a:schemeClr>
+                </a:solidFill>
+                <a:latin typeface="Miriam Mono CLM" panose="02000503000000000000" pitchFamily="2" charset="-79"/>
+                <a:cs typeface="Miriam Mono CLM" panose="02000503000000000000" pitchFamily="2" charset="-79"/>
+              </a:rPr>
+              <a:t> = 1;</a:t>
+            </a:r>
           </a:p>
         </p:txBody>
       </p:sp>
     </p:spTree>
     <p:extLst>
       <p:ext uri="{BB962C8B-B14F-4D97-AF65-F5344CB8AC3E}">
-        <p14:creationId xmlns:p14="http://schemas.microsoft.com/office/powerpoint/2010/main" val="2924415319"/>
+        <p14:creationId xmlns:p14="http://schemas.microsoft.com/office/powerpoint/2010/main" val="1076927024"/>
       </p:ext>
     </p:extLst>
   </p:cSld>
@@ -13680,12 +14896,42 @@
           <a:chExt cx="0" cy="0"/>
         </a:xfrm>
       </p:grpSpPr>
+      <p:pic>
+        <p:nvPicPr>
+          <p:cNvPr id="13" name="Immagine 12">
+            <a:extLst>
+              <a:ext uri="{FF2B5EF4-FFF2-40B4-BE49-F238E27FC236}">
+                <a16:creationId xmlns:a16="http://schemas.microsoft.com/office/drawing/2014/main" id="{97811066-E484-4CA8-8A2F-8FF75D0E528D}"/>
+              </a:ext>
+            </a:extLst>
+          </p:cNvPr>
+          <p:cNvPicPr>
+            <a:picLocks noChangeAspect="1"/>
+          </p:cNvPicPr>
+          <p:nvPr/>
+        </p:nvPicPr>
+        <p:blipFill>
+          <a:blip r:embed="rId2"/>
+          <a:stretch>
+            <a:fillRect/>
+          </a:stretch>
+        </p:blipFill>
+        <p:spPr>
+          <a:xfrm>
+            <a:off x="116099" y="157123"/>
+            <a:ext cx="11959802" cy="6543753"/>
+          </a:xfrm>
+          <a:prstGeom prst="rect">
+            <a:avLst/>
+          </a:prstGeom>
+        </p:spPr>
+      </p:pic>
       <p:sp>
         <p:nvSpPr>
           <p:cNvPr id="2" name="Titolo 1">
             <a:extLst>
               <a:ext uri="{FF2B5EF4-FFF2-40B4-BE49-F238E27FC236}">
-                <a16:creationId xmlns:a16="http://schemas.microsoft.com/office/drawing/2014/main" id="{3E8982A2-FDE4-47FF-B9AB-14E4CD459CF0}"/>
+                <a16:creationId xmlns:a16="http://schemas.microsoft.com/office/drawing/2014/main" id="{D227C1EE-2D74-43C3-BD6D-59CE04B9031A}"/>
               </a:ext>
             </a:extLst>
           </p:cNvPr>
@@ -13696,47 +14942,591 @@
             <p:ph type="title"/>
           </p:nvPr>
         </p:nvSpPr>
-        <p:spPr/>
+        <p:spPr>
+          <a:xfrm>
+            <a:off x="1141413" y="157124"/>
+            <a:ext cx="9905998" cy="975390"/>
+          </a:xfrm>
+        </p:spPr>
         <p:txBody>
           <a:bodyPr/>
           <a:lstStyle/>
           <a:p>
             <a:r>
               <a:rPr lang="it-IT" dirty="0"/>
-              <a:t>Automa perfezionato</a:t>
+              <a:t>Regimi di funzionamento</a:t>
             </a:r>
           </a:p>
         </p:txBody>
       </p:sp>
       <p:sp>
         <p:nvSpPr>
-          <p:cNvPr id="3" name="Segnaposto contenuto 2">
+          <p:cNvPr id="5" name="CasellaDiTesto 4">
             <a:extLst>
               <a:ext uri="{FF2B5EF4-FFF2-40B4-BE49-F238E27FC236}">
-                <a16:creationId xmlns:a16="http://schemas.microsoft.com/office/drawing/2014/main" id="{054DAF2F-2849-466C-9D22-50FA2F59B58C}"/>
+                <a16:creationId xmlns:a16="http://schemas.microsoft.com/office/drawing/2014/main" id="{4FB09F8A-BE90-4E97-8A0B-E9993E228375}"/>
               </a:ext>
             </a:extLst>
           </p:cNvPr>
-          <p:cNvSpPr>
-            <a:spLocks noGrp="1"/>
-          </p:cNvSpPr>
-          <p:nvPr>
-            <p:ph idx="1"/>
-          </p:nvPr>
+          <p:cNvSpPr txBox="1"/>
+          <p:nvPr/>
         </p:nvSpPr>
-        <p:spPr/>
+        <p:spPr>
+          <a:xfrm>
+            <a:off x="4546833" y="378624"/>
+            <a:ext cx="5991136" cy="923330"/>
+          </a:xfrm>
+          <a:prstGeom prst="rect">
+            <a:avLst/>
+          </a:prstGeom>
+          <a:noFill/>
+        </p:spPr>
         <p:txBody>
-          <a:bodyPr/>
+          <a:bodyPr wrap="square" rtlCol="0">
+            <a:spAutoFit/>
+          </a:bodyPr>
           <a:lstStyle/>
           <a:p>
-            <a:endParaRPr lang="it-IT"/>
+            <a:pPr algn="r"/>
+            <a:r>
+              <a:rPr lang="it-IT" dirty="0">
+                <a:solidFill>
+                  <a:schemeClr val="bg1">
+                    <a:lumMod val="95000"/>
+                    <a:lumOff val="5000"/>
+                  </a:schemeClr>
+                </a:solidFill>
+              </a:rPr>
+              <a:t>Per valori di </a:t>
+            </a:r>
+            <a:r>
+              <a:rPr lang="el-GR" dirty="0">
+                <a:solidFill>
+                  <a:schemeClr val="bg1">
+                    <a:lumMod val="95000"/>
+                    <a:lumOff val="5000"/>
+                  </a:schemeClr>
+                </a:solidFill>
+              </a:rPr>
+              <a:t>τ</a:t>
+            </a:r>
+            <a:r>
+              <a:rPr lang="en-US" sz="1200" dirty="0">
+                <a:solidFill>
+                  <a:schemeClr val="bg1">
+                    <a:lumMod val="95000"/>
+                    <a:lumOff val="5000"/>
+                  </a:schemeClr>
+                </a:solidFill>
+              </a:rPr>
+              <a:t>a &gt;&gt;</a:t>
+            </a:r>
+            <a:r>
+              <a:rPr lang="en-US" dirty="0">
+                <a:solidFill>
+                  <a:schemeClr val="bg1">
+                    <a:lumMod val="95000"/>
+                    <a:lumOff val="5000"/>
+                  </a:schemeClr>
+                </a:solidFill>
+              </a:rPr>
+              <a:t> </a:t>
+            </a:r>
+            <a:r>
+              <a:rPr lang="el-GR" dirty="0">
+                <a:solidFill>
+                  <a:schemeClr val="bg1">
+                    <a:lumMod val="95000"/>
+                    <a:lumOff val="5000"/>
+                  </a:schemeClr>
+                </a:solidFill>
+              </a:rPr>
+              <a:t>τ</a:t>
+            </a:r>
+            <a:r>
+              <a:rPr lang="en-US" sz="1200" dirty="0">
+                <a:solidFill>
+                  <a:schemeClr val="bg1">
+                    <a:lumMod val="95000"/>
+                    <a:lumOff val="5000"/>
+                  </a:schemeClr>
+                </a:solidFill>
+              </a:rPr>
+              <a:t>c </a:t>
+            </a:r>
+            <a:r>
+              <a:rPr lang="en-US" dirty="0">
+                <a:solidFill>
+                  <a:schemeClr val="bg1">
+                    <a:lumMod val="95000"/>
+                    <a:lumOff val="5000"/>
+                  </a:schemeClr>
+                </a:solidFill>
+              </a:rPr>
+              <a:t>molto </a:t>
+            </a:r>
+            <a:r>
+              <a:rPr lang="en-US" dirty="0" err="1">
+                <a:solidFill>
+                  <a:schemeClr val="bg1">
+                    <a:lumMod val="95000"/>
+                    <a:lumOff val="5000"/>
+                  </a:schemeClr>
+                </a:solidFill>
+              </a:rPr>
+              <a:t>vicini</a:t>
+            </a:r>
+            <a:r>
+              <a:rPr lang="en-US" dirty="0">
+                <a:solidFill>
+                  <a:schemeClr val="bg1">
+                    <a:lumMod val="95000"/>
+                    <a:lumOff val="5000"/>
+                  </a:schemeClr>
+                </a:solidFill>
+              </a:rPr>
+              <a:t>, il regime di </a:t>
+            </a:r>
+            <a:r>
+              <a:rPr lang="en-US" dirty="0" err="1">
+                <a:solidFill>
+                  <a:schemeClr val="bg1">
+                    <a:lumMod val="95000"/>
+                    <a:lumOff val="5000"/>
+                  </a:schemeClr>
+                </a:solidFill>
+              </a:rPr>
+              <a:t>funzionamento</a:t>
+            </a:r>
+            <a:r>
+              <a:rPr lang="en-US" dirty="0">
+                <a:solidFill>
+                  <a:schemeClr val="bg1">
+                    <a:lumMod val="95000"/>
+                    <a:lumOff val="5000"/>
+                  </a:schemeClr>
+                </a:solidFill>
+              </a:rPr>
+              <a:t> </a:t>
+            </a:r>
+            <a:r>
+              <a:rPr lang="it-IT" dirty="0">
+                <a:solidFill>
+                  <a:schemeClr val="bg1">
+                    <a:lumMod val="95000"/>
+                    <a:lumOff val="5000"/>
+                  </a:schemeClr>
+                </a:solidFill>
+              </a:rPr>
+              <a:t>è «oscillante» con </a:t>
+            </a:r>
+            <a:r>
+              <a:rPr lang="it-IT" i="1" dirty="0" err="1">
+                <a:solidFill>
+                  <a:schemeClr val="bg1">
+                    <a:lumMod val="95000"/>
+                    <a:lumOff val="5000"/>
+                  </a:schemeClr>
+                </a:solidFill>
+              </a:rPr>
+              <a:t>relaxation</a:t>
+            </a:r>
+            <a:r>
+              <a:rPr lang="it-IT" i="1" dirty="0">
+                <a:solidFill>
+                  <a:schemeClr val="bg1">
+                    <a:lumMod val="95000"/>
+                    <a:lumOff val="5000"/>
+                  </a:schemeClr>
+                </a:solidFill>
+              </a:rPr>
+              <a:t> </a:t>
+            </a:r>
+            <a:r>
+              <a:rPr lang="it-IT" i="1" dirty="0" err="1">
+                <a:solidFill>
+                  <a:schemeClr val="bg1">
+                    <a:lumMod val="95000"/>
+                    <a:lumOff val="5000"/>
+                  </a:schemeClr>
+                </a:solidFill>
+              </a:rPr>
+              <a:t>oscillations</a:t>
+            </a:r>
+            <a:r>
+              <a:rPr lang="it-IT" dirty="0">
+                <a:solidFill>
+                  <a:schemeClr val="bg1">
+                    <a:lumMod val="95000"/>
+                    <a:lumOff val="5000"/>
+                  </a:schemeClr>
+                </a:solidFill>
+              </a:rPr>
+              <a:t>. Il transitorio oscillante si esaurisce esponenzialmente.</a:t>
+            </a:r>
+          </a:p>
+        </p:txBody>
+      </p:sp>
+      <p:sp>
+        <p:nvSpPr>
+          <p:cNvPr id="10" name="CasellaDiTesto 9">
+            <a:extLst>
+              <a:ext uri="{FF2B5EF4-FFF2-40B4-BE49-F238E27FC236}">
+                <a16:creationId xmlns:a16="http://schemas.microsoft.com/office/drawing/2014/main" id="{712C0EDD-33B5-42E0-A240-3B12C508C03C}"/>
+              </a:ext>
+            </a:extLst>
+          </p:cNvPr>
+          <p:cNvSpPr txBox="1"/>
+          <p:nvPr/>
+        </p:nvSpPr>
+        <p:spPr>
+          <a:xfrm>
+            <a:off x="1271632" y="428116"/>
+            <a:ext cx="3144982" cy="1938992"/>
+          </a:xfrm>
+          <a:prstGeom prst="rect">
+            <a:avLst/>
+          </a:prstGeom>
+          <a:noFill/>
+        </p:spPr>
+        <p:txBody>
+          <a:bodyPr wrap="square" rtlCol="0">
+            <a:spAutoFit/>
+          </a:bodyPr>
+          <a:lstStyle/>
+          <a:p>
+            <a:r>
+              <a:rPr lang="it-IT" sz="1200" dirty="0">
+                <a:solidFill>
+                  <a:schemeClr val="bg1">
+                    <a:lumMod val="95000"/>
+                    <a:lumOff val="5000"/>
+                  </a:schemeClr>
+                </a:solidFill>
+                <a:latin typeface="Miriam Mono CLM" panose="02000503000000000000" pitchFamily="2" charset="-79"/>
+                <a:cs typeface="Miriam Mono CLM" panose="02000503000000000000" pitchFamily="2" charset="-79"/>
+              </a:rPr>
+              <a:t>TIME_STEPS = 1000;</a:t>
+            </a:r>
+          </a:p>
+          <a:p>
+            <a:r>
+              <a:rPr lang="it-IT" sz="1200" dirty="0">
+                <a:solidFill>
+                  <a:schemeClr val="bg1">
+                    <a:lumMod val="95000"/>
+                    <a:lumOff val="5000"/>
+                  </a:schemeClr>
+                </a:solidFill>
+                <a:latin typeface="Miriam Mono CLM" panose="02000503000000000000" pitchFamily="2" charset="-79"/>
+                <a:cs typeface="Miriam Mono CLM" panose="02000503000000000000" pitchFamily="2" charset="-79"/>
+              </a:rPr>
+              <a:t>LATTICE_WIDTH = 150;</a:t>
+            </a:r>
+          </a:p>
+          <a:p>
+            <a:r>
+              <a:rPr lang="it-IT" sz="1200" dirty="0">
+                <a:solidFill>
+                  <a:schemeClr val="bg1">
+                    <a:lumMod val="95000"/>
+                    <a:lumOff val="5000"/>
+                  </a:schemeClr>
+                </a:solidFill>
+                <a:latin typeface="Miriam Mono CLM" panose="02000503000000000000" pitchFamily="2" charset="-79"/>
+                <a:cs typeface="Miriam Mono CLM" panose="02000503000000000000" pitchFamily="2" charset="-79"/>
+              </a:rPr>
+              <a:t>LATTICE_HEIGHT = 150;</a:t>
+            </a:r>
+          </a:p>
+          <a:p>
+            <a:r>
+              <a:rPr lang="it-IT" sz="1200" dirty="0">
+                <a:solidFill>
+                  <a:schemeClr val="bg1">
+                    <a:lumMod val="95000"/>
+                    <a:lumOff val="5000"/>
+                  </a:schemeClr>
+                </a:solidFill>
+                <a:latin typeface="Miriam Mono CLM" panose="02000503000000000000" pitchFamily="2" charset="-79"/>
+                <a:cs typeface="Miriam Mono CLM" panose="02000503000000000000" pitchFamily="2" charset="-79"/>
+              </a:rPr>
+              <a:t>PHOTON_SATURATION = 25;</a:t>
+            </a:r>
+          </a:p>
+          <a:p>
+            <a:endParaRPr lang="it-IT" sz="1200" dirty="0">
+              <a:solidFill>
+                <a:schemeClr val="bg1">
+                  <a:lumMod val="95000"/>
+                  <a:lumOff val="5000"/>
+                </a:schemeClr>
+              </a:solidFill>
+              <a:latin typeface="Miriam Mono CLM" panose="02000503000000000000" pitchFamily="2" charset="-79"/>
+              <a:cs typeface="Miriam Mono CLM" panose="02000503000000000000" pitchFamily="2" charset="-79"/>
+            </a:endParaRPr>
+          </a:p>
+          <a:p>
+            <a:r>
+              <a:rPr lang="it-IT" sz="1200" dirty="0" err="1">
+                <a:solidFill>
+                  <a:schemeClr val="bg1">
+                    <a:lumMod val="95000"/>
+                    <a:lumOff val="5000"/>
+                  </a:schemeClr>
+                </a:solidFill>
+                <a:latin typeface="Miriam Mono CLM" panose="02000503000000000000" pitchFamily="2" charset="-79"/>
+                <a:cs typeface="Miriam Mono CLM" panose="02000503000000000000" pitchFamily="2" charset="-79"/>
+              </a:rPr>
+              <a:t>electronLifeTime</a:t>
+            </a:r>
+            <a:r>
+              <a:rPr lang="it-IT" sz="1200" dirty="0">
+                <a:solidFill>
+                  <a:schemeClr val="bg1">
+                    <a:lumMod val="95000"/>
+                    <a:lumOff val="5000"/>
+                  </a:schemeClr>
+                </a:solidFill>
+                <a:latin typeface="Miriam Mono CLM" panose="02000503000000000000" pitchFamily="2" charset="-79"/>
+                <a:cs typeface="Miriam Mono CLM" panose="02000503000000000000" pitchFamily="2" charset="-79"/>
+              </a:rPr>
+              <a:t> = 180;</a:t>
+            </a:r>
+          </a:p>
+          <a:p>
+            <a:r>
+              <a:rPr lang="it-IT" sz="1200" dirty="0" err="1">
+                <a:solidFill>
+                  <a:schemeClr val="bg1">
+                    <a:lumMod val="95000"/>
+                    <a:lumOff val="5000"/>
+                  </a:schemeClr>
+                </a:solidFill>
+                <a:latin typeface="Miriam Mono CLM" panose="02000503000000000000" pitchFamily="2" charset="-79"/>
+                <a:cs typeface="Miriam Mono CLM" panose="02000503000000000000" pitchFamily="2" charset="-79"/>
+              </a:rPr>
+              <a:t>photonLifeTime</a:t>
+            </a:r>
+            <a:r>
+              <a:rPr lang="it-IT" sz="1200" dirty="0">
+                <a:solidFill>
+                  <a:schemeClr val="bg1">
+                    <a:lumMod val="95000"/>
+                    <a:lumOff val="5000"/>
+                  </a:schemeClr>
+                </a:solidFill>
+                <a:latin typeface="Miriam Mono CLM" panose="02000503000000000000" pitchFamily="2" charset="-79"/>
+                <a:cs typeface="Miriam Mono CLM" panose="02000503000000000000" pitchFamily="2" charset="-79"/>
+              </a:rPr>
+              <a:t> = 10;</a:t>
+            </a:r>
+          </a:p>
+          <a:p>
+            <a:r>
+              <a:rPr lang="it-IT" sz="1200" dirty="0" err="1">
+                <a:solidFill>
+                  <a:schemeClr val="bg1">
+                    <a:lumMod val="95000"/>
+                    <a:lumOff val="5000"/>
+                  </a:schemeClr>
+                </a:solidFill>
+                <a:latin typeface="Miriam Mono CLM" panose="02000503000000000000" pitchFamily="2" charset="-79"/>
+                <a:cs typeface="Miriam Mono CLM" panose="02000503000000000000" pitchFamily="2" charset="-79"/>
+              </a:rPr>
+              <a:t>pumpingProbability</a:t>
+            </a:r>
+            <a:r>
+              <a:rPr lang="it-IT" sz="1200" dirty="0">
+                <a:solidFill>
+                  <a:schemeClr val="bg1">
+                    <a:lumMod val="95000"/>
+                    <a:lumOff val="5000"/>
+                  </a:schemeClr>
+                </a:solidFill>
+                <a:latin typeface="Miriam Mono CLM" panose="02000503000000000000" pitchFamily="2" charset="-79"/>
+                <a:cs typeface="Miriam Mono CLM" panose="02000503000000000000" pitchFamily="2" charset="-79"/>
+              </a:rPr>
+              <a:t> = 0.0125;</a:t>
+            </a:r>
+          </a:p>
+          <a:p>
+            <a:r>
+              <a:rPr lang="it-IT" sz="1200" dirty="0" err="1">
+                <a:solidFill>
+                  <a:schemeClr val="bg1">
+                    <a:lumMod val="95000"/>
+                    <a:lumOff val="5000"/>
+                  </a:schemeClr>
+                </a:solidFill>
+                <a:latin typeface="Miriam Mono CLM" panose="02000503000000000000" pitchFamily="2" charset="-79"/>
+                <a:cs typeface="Miriam Mono CLM" panose="02000503000000000000" pitchFamily="2" charset="-79"/>
+              </a:rPr>
+              <a:t>noiseProbability</a:t>
+            </a:r>
+            <a:r>
+              <a:rPr lang="it-IT" sz="1200" dirty="0">
+                <a:solidFill>
+                  <a:schemeClr val="bg1">
+                    <a:lumMod val="95000"/>
+                    <a:lumOff val="5000"/>
+                  </a:schemeClr>
+                </a:solidFill>
+                <a:latin typeface="Miriam Mono CLM" panose="02000503000000000000" pitchFamily="2" charset="-79"/>
+                <a:cs typeface="Miriam Mono CLM" panose="02000503000000000000" pitchFamily="2" charset="-79"/>
+              </a:rPr>
+              <a:t> = 0.0001;</a:t>
+            </a:r>
+          </a:p>
+          <a:p>
+            <a:r>
+              <a:rPr lang="it-IT" sz="1200" dirty="0" err="1">
+                <a:solidFill>
+                  <a:schemeClr val="bg1">
+                    <a:lumMod val="95000"/>
+                    <a:lumOff val="5000"/>
+                  </a:schemeClr>
+                </a:solidFill>
+                <a:latin typeface="Miriam Mono CLM" panose="02000503000000000000" pitchFamily="2" charset="-79"/>
+                <a:cs typeface="Miriam Mono CLM" panose="02000503000000000000" pitchFamily="2" charset="-79"/>
+              </a:rPr>
+              <a:t>stimulatedEmissionThreshold</a:t>
+            </a:r>
+            <a:r>
+              <a:rPr lang="it-IT" sz="1200" dirty="0">
+                <a:solidFill>
+                  <a:schemeClr val="bg1">
+                    <a:lumMod val="95000"/>
+                    <a:lumOff val="5000"/>
+                  </a:schemeClr>
+                </a:solidFill>
+                <a:latin typeface="Miriam Mono CLM" panose="02000503000000000000" pitchFamily="2" charset="-79"/>
+                <a:cs typeface="Miriam Mono CLM" panose="02000503000000000000" pitchFamily="2" charset="-79"/>
+              </a:rPr>
+              <a:t> = 1;</a:t>
+            </a:r>
+          </a:p>
+        </p:txBody>
+      </p:sp>
+      <p:sp>
+        <p:nvSpPr>
+          <p:cNvPr id="11" name="CasellaDiTesto 10">
+            <a:extLst>
+              <a:ext uri="{FF2B5EF4-FFF2-40B4-BE49-F238E27FC236}">
+                <a16:creationId xmlns:a16="http://schemas.microsoft.com/office/drawing/2014/main" id="{3DC3C07B-CE94-4C9E-8C40-AC1B285B67C0}"/>
+              </a:ext>
+            </a:extLst>
+          </p:cNvPr>
+          <p:cNvSpPr txBox="1"/>
+          <p:nvPr/>
+        </p:nvSpPr>
+        <p:spPr>
+          <a:xfrm>
+            <a:off x="3720516" y="1259113"/>
+            <a:ext cx="7139031" cy="276999"/>
+          </a:xfrm>
+          <a:prstGeom prst="rect">
+            <a:avLst/>
+          </a:prstGeom>
+          <a:noFill/>
+        </p:spPr>
+        <p:txBody>
+          <a:bodyPr wrap="square" rtlCol="0">
+            <a:spAutoFit/>
+          </a:bodyPr>
+          <a:lstStyle/>
+          <a:p>
+            <a:r>
+              <a:rPr lang="it-IT" sz="1200" dirty="0">
+                <a:solidFill>
+                  <a:schemeClr val="bg1">
+                    <a:lumMod val="95000"/>
+                    <a:lumOff val="5000"/>
+                  </a:schemeClr>
+                </a:solidFill>
+                <a:latin typeface="Cambria" panose="02040503050406030204" pitchFamily="18" charset="0"/>
+                <a:ea typeface="Cambria" panose="02040503050406030204" pitchFamily="18" charset="0"/>
+                <a:cs typeface="JasmineUPC" panose="020B0502040204020203" pitchFamily="18" charset="-34"/>
+              </a:rPr>
+              <a:t>Più è alta la </a:t>
+            </a:r>
+            <a:r>
+              <a:rPr lang="it-IT" sz="1200" dirty="0" err="1">
+                <a:solidFill>
+                  <a:schemeClr val="bg1">
+                    <a:lumMod val="95000"/>
+                    <a:lumOff val="5000"/>
+                  </a:schemeClr>
+                </a:solidFill>
+                <a:latin typeface="Cambria" panose="02040503050406030204" pitchFamily="18" charset="0"/>
+                <a:ea typeface="Cambria" panose="02040503050406030204" pitchFamily="18" charset="0"/>
+                <a:cs typeface="JasmineUPC" panose="020B0502040204020203" pitchFamily="18" charset="-34"/>
+              </a:rPr>
+              <a:t>pumping</a:t>
+            </a:r>
+            <a:r>
+              <a:rPr lang="it-IT" sz="1200" dirty="0">
+                <a:solidFill>
+                  <a:schemeClr val="bg1">
+                    <a:lumMod val="95000"/>
+                    <a:lumOff val="5000"/>
+                  </a:schemeClr>
+                </a:solidFill>
+                <a:latin typeface="Cambria" panose="02040503050406030204" pitchFamily="18" charset="0"/>
+                <a:ea typeface="Cambria" panose="02040503050406030204" pitchFamily="18" charset="0"/>
+                <a:cs typeface="JasmineUPC" panose="020B0502040204020203" pitchFamily="18" charset="-34"/>
+              </a:rPr>
+              <a:t> rate, più deve aumentare il valore di </a:t>
+            </a:r>
+            <a:r>
+              <a:rPr lang="el-GR" sz="1200" dirty="0">
+                <a:solidFill>
+                  <a:schemeClr val="bg1">
+                    <a:lumMod val="95000"/>
+                    <a:lumOff val="5000"/>
+                  </a:schemeClr>
+                </a:solidFill>
+                <a:latin typeface="Cambria" panose="02040503050406030204" pitchFamily="18" charset="0"/>
+                <a:ea typeface="Cambria" panose="02040503050406030204" pitchFamily="18" charset="0"/>
+                <a:cs typeface="JasmineUPC" panose="020B0502040204020203" pitchFamily="18" charset="-34"/>
+              </a:rPr>
+              <a:t>τ</a:t>
+            </a:r>
+            <a:r>
+              <a:rPr lang="it-IT" sz="1050" dirty="0">
+                <a:solidFill>
+                  <a:schemeClr val="bg1">
+                    <a:lumMod val="95000"/>
+                    <a:lumOff val="5000"/>
+                  </a:schemeClr>
+                </a:solidFill>
+                <a:latin typeface="Cambria" panose="02040503050406030204" pitchFamily="18" charset="0"/>
+                <a:ea typeface="Cambria" panose="02040503050406030204" pitchFamily="18" charset="0"/>
+                <a:cs typeface="JasmineUPC" panose="020B0502040204020203" pitchFamily="18" charset="-34"/>
+              </a:rPr>
+              <a:t>a</a:t>
+            </a:r>
+            <a:r>
+              <a:rPr lang="it-IT" sz="1200" dirty="0">
+                <a:solidFill>
+                  <a:schemeClr val="bg1">
+                    <a:lumMod val="95000"/>
+                    <a:lumOff val="5000"/>
+                  </a:schemeClr>
+                </a:solidFill>
+                <a:latin typeface="Cambria" panose="02040503050406030204" pitchFamily="18" charset="0"/>
+                <a:ea typeface="Cambria" panose="02040503050406030204" pitchFamily="18" charset="0"/>
+                <a:cs typeface="JasmineUPC" panose="020B0502040204020203" pitchFamily="18" charset="-34"/>
+              </a:rPr>
+              <a:t> per rendere evidente il regime oscillatorio</a:t>
+            </a:r>
           </a:p>
         </p:txBody>
       </p:sp>
     </p:spTree>
     <p:extLst>
       <p:ext uri="{BB962C8B-B14F-4D97-AF65-F5344CB8AC3E}">
-        <p14:creationId xmlns:p14="http://schemas.microsoft.com/office/powerpoint/2010/main" val="3722441106"/>
+        <p14:creationId xmlns:p14="http://schemas.microsoft.com/office/powerpoint/2010/main" val="2924415319"/>
       </p:ext>
     </p:extLst>
   </p:cSld>
@@ -13779,40 +15569,240 @@
             <p:ph type="title"/>
           </p:nvPr>
         </p:nvSpPr>
-        <p:spPr/>
+        <p:spPr>
+          <a:xfrm>
+            <a:off x="1141413" y="106790"/>
+            <a:ext cx="9905998" cy="874722"/>
+          </a:xfrm>
+        </p:spPr>
         <p:txBody>
           <a:bodyPr/>
           <a:lstStyle/>
           <a:p>
             <a:r>
               <a:rPr lang="it-IT" dirty="0"/>
-              <a:t>Considerazioni sui parametri di simulazione</a:t>
+              <a:t>Soglia di pompaggio</a:t>
             </a:r>
           </a:p>
         </p:txBody>
       </p:sp>
       <p:sp>
         <p:nvSpPr>
-          <p:cNvPr id="3" name="Segnaposto contenuto 2">
+          <p:cNvPr id="4" name="CasellaDiTesto 3">
             <a:extLst>
               <a:ext uri="{FF2B5EF4-FFF2-40B4-BE49-F238E27FC236}">
-                <a16:creationId xmlns:a16="http://schemas.microsoft.com/office/drawing/2014/main" id="{7072361F-22B8-42E6-B207-ADF667E021CC}"/>
+                <a16:creationId xmlns:a16="http://schemas.microsoft.com/office/drawing/2014/main" id="{DDC35683-D0E1-4379-9E1F-97650295748D}"/>
               </a:ext>
             </a:extLst>
           </p:cNvPr>
-          <p:cNvSpPr>
-            <a:spLocks noGrp="1"/>
-          </p:cNvSpPr>
-          <p:nvPr>
-            <p:ph idx="1"/>
-          </p:nvPr>
+          <p:cNvSpPr txBox="1"/>
+          <p:nvPr/>
         </p:nvSpPr>
-        <p:spPr/>
+        <p:spPr>
+          <a:xfrm>
+            <a:off x="1031846" y="813732"/>
+            <a:ext cx="10184235" cy="646331"/>
+          </a:xfrm>
+          <a:prstGeom prst="rect">
+            <a:avLst/>
+          </a:prstGeom>
+          <a:noFill/>
+        </p:spPr>
         <p:txBody>
-          <a:bodyPr/>
+          <a:bodyPr wrap="square" rtlCol="0">
+            <a:spAutoFit/>
+          </a:bodyPr>
           <a:lstStyle/>
           <a:p>
-            <a:endParaRPr lang="it-IT"/>
+            <a:r>
+              <a:rPr lang="it-IT" dirty="0"/>
+              <a:t>Come ci si aspetta dal modello, è possibile trovare un valore di soglia per il </a:t>
+            </a:r>
+            <a:r>
+              <a:rPr lang="it-IT" dirty="0" err="1"/>
+              <a:t>pompagglio</a:t>
+            </a:r>
+            <a:r>
+              <a:rPr lang="it-IT" dirty="0"/>
+              <a:t>, oltre il quale la popolazione di fotoni aumenta ben oltre la popolazione riconducibile ad emissione spontanea.</a:t>
+            </a:r>
+          </a:p>
+        </p:txBody>
+      </p:sp>
+      <p:sp>
+        <p:nvSpPr>
+          <p:cNvPr id="5" name="CasellaDiTesto 4">
+            <a:extLst>
+              <a:ext uri="{FF2B5EF4-FFF2-40B4-BE49-F238E27FC236}">
+                <a16:creationId xmlns:a16="http://schemas.microsoft.com/office/drawing/2014/main" id="{1D8C7D55-2EE2-4CF5-B0CA-92D5394A27F6}"/>
+              </a:ext>
+            </a:extLst>
+          </p:cNvPr>
+          <p:cNvSpPr txBox="1"/>
+          <p:nvPr/>
+        </p:nvSpPr>
+        <p:spPr>
+          <a:xfrm>
+            <a:off x="1031846" y="1639159"/>
+            <a:ext cx="2978092" cy="584775"/>
+          </a:xfrm>
+          <a:prstGeom prst="rect">
+            <a:avLst/>
+          </a:prstGeom>
+          <a:noFill/>
+        </p:spPr>
+        <p:txBody>
+          <a:bodyPr wrap="square" rtlCol="0">
+            <a:spAutoFit/>
+          </a:bodyPr>
+          <a:lstStyle/>
+          <a:p>
+            <a:r>
+              <a:rPr lang="it-IT" sz="1600" dirty="0">
+                <a:solidFill>
+                  <a:schemeClr val="accent3">
+                    <a:lumMod val="50000"/>
+                  </a:schemeClr>
+                </a:solidFill>
+                <a:latin typeface="Calibri" panose="020F0502020204030204" pitchFamily="34" charset="0"/>
+                <a:cs typeface="Calibri" panose="020F0502020204030204" pitchFamily="34" charset="0"/>
+              </a:rPr>
+              <a:t>Aumentando</a:t>
+            </a:r>
+            <a:r>
+              <a:rPr lang="it-IT" sz="1600" dirty="0">
+                <a:solidFill>
+                  <a:schemeClr val="accent3">
+                    <a:lumMod val="75000"/>
+                  </a:schemeClr>
+                </a:solidFill>
+                <a:latin typeface="Calibri" panose="020F0502020204030204" pitchFamily="34" charset="0"/>
+                <a:cs typeface="Calibri" panose="020F0502020204030204" pitchFamily="34" charset="0"/>
+              </a:rPr>
+              <a:t> la probabilità di rumore la soglia si alza</a:t>
+            </a:r>
+          </a:p>
+        </p:txBody>
+      </p:sp>
+      <p:sp>
+        <p:nvSpPr>
+          <p:cNvPr id="6" name="CasellaDiTesto 5">
+            <a:extLst>
+              <a:ext uri="{FF2B5EF4-FFF2-40B4-BE49-F238E27FC236}">
+                <a16:creationId xmlns:a16="http://schemas.microsoft.com/office/drawing/2014/main" id="{BB45ED82-D19E-46C7-B791-804C4978159B}"/>
+              </a:ext>
+            </a:extLst>
+          </p:cNvPr>
+          <p:cNvSpPr txBox="1"/>
+          <p:nvPr/>
+        </p:nvSpPr>
+        <p:spPr>
+          <a:xfrm>
+            <a:off x="8256166" y="2598003"/>
+            <a:ext cx="3438088" cy="830997"/>
+          </a:xfrm>
+          <a:prstGeom prst="rect">
+            <a:avLst/>
+          </a:prstGeom>
+          <a:noFill/>
+        </p:spPr>
+        <p:txBody>
+          <a:bodyPr wrap="square" rtlCol="0">
+            <a:spAutoFit/>
+          </a:bodyPr>
+          <a:lstStyle/>
+          <a:p>
+            <a:r>
+              <a:rPr lang="it-IT" sz="1600" dirty="0">
+                <a:solidFill>
+                  <a:schemeClr val="accent3">
+                    <a:lumMod val="50000"/>
+                  </a:schemeClr>
+                </a:solidFill>
+                <a:latin typeface="Calibri" panose="020F0502020204030204" pitchFamily="34" charset="0"/>
+                <a:cs typeface="Calibri" panose="020F0502020204030204" pitchFamily="34" charset="0"/>
+              </a:rPr>
+              <a:t>Aumentando</a:t>
+            </a:r>
+            <a:r>
+              <a:rPr lang="it-IT" sz="1600" dirty="0">
+                <a:solidFill>
+                  <a:schemeClr val="bg2">
+                    <a:lumMod val="75000"/>
+                  </a:schemeClr>
+                </a:solidFill>
+                <a:latin typeface="Calibri" panose="020F0502020204030204" pitchFamily="34" charset="0"/>
+                <a:cs typeface="Calibri" panose="020F0502020204030204" pitchFamily="34" charset="0"/>
+              </a:rPr>
+              <a:t> il tempo di vita della cavità o dei portatori, la soglia si abbassa</a:t>
+            </a:r>
+          </a:p>
+        </p:txBody>
+      </p:sp>
+      <p:sp>
+        <p:nvSpPr>
+          <p:cNvPr id="7" name="CasellaDiTesto 6">
+            <a:extLst>
+              <a:ext uri="{FF2B5EF4-FFF2-40B4-BE49-F238E27FC236}">
+                <a16:creationId xmlns:a16="http://schemas.microsoft.com/office/drawing/2014/main" id="{C2BE6774-1976-4244-99DF-B710584B976F}"/>
+              </a:ext>
+            </a:extLst>
+          </p:cNvPr>
+          <p:cNvSpPr txBox="1"/>
+          <p:nvPr/>
+        </p:nvSpPr>
+        <p:spPr>
+          <a:xfrm>
+            <a:off x="1031846" y="4341679"/>
+            <a:ext cx="3438088" cy="584775"/>
+          </a:xfrm>
+          <a:prstGeom prst="rect">
+            <a:avLst/>
+          </a:prstGeom>
+          <a:noFill/>
+        </p:spPr>
+        <p:txBody>
+          <a:bodyPr wrap="square" rtlCol="0">
+            <a:spAutoFit/>
+          </a:bodyPr>
+          <a:lstStyle/>
+          <a:p>
+            <a:r>
+              <a:rPr lang="it-IT" sz="1600" dirty="0">
+                <a:solidFill>
+                  <a:schemeClr val="accent3">
+                    <a:lumMod val="75000"/>
+                  </a:schemeClr>
+                </a:solidFill>
+                <a:latin typeface="Calibri" panose="020F0502020204030204" pitchFamily="34" charset="0"/>
+                <a:cs typeface="Calibri" panose="020F0502020204030204" pitchFamily="34" charset="0"/>
+              </a:rPr>
+              <a:t>Al </a:t>
+            </a:r>
+            <a:r>
+              <a:rPr lang="it-IT" sz="1600" dirty="0">
+                <a:solidFill>
+                  <a:schemeClr val="bg2">
+                    <a:lumMod val="50000"/>
+                  </a:schemeClr>
+                </a:solidFill>
+                <a:latin typeface="Calibri" panose="020F0502020204030204" pitchFamily="34" charset="0"/>
+                <a:cs typeface="Calibri" panose="020F0502020204030204" pitchFamily="34" charset="0"/>
+              </a:rPr>
+              <a:t>diminuire</a:t>
+            </a:r>
+            <a:r>
+              <a:rPr lang="it-IT" sz="1600" dirty="0">
+                <a:solidFill>
+                  <a:schemeClr val="accent3">
+                    <a:lumMod val="75000"/>
+                  </a:schemeClr>
+                </a:solidFill>
+                <a:latin typeface="Calibri" panose="020F0502020204030204" pitchFamily="34" charset="0"/>
+                <a:cs typeface="Calibri" panose="020F0502020204030204" pitchFamily="34" charset="0"/>
+              </a:rPr>
+              <a:t> della probabilità di emissione stimolata, la soglia si alza</a:t>
+            </a:r>
           </a:p>
         </p:txBody>
       </p:sp>

</xml_diff>

<commit_message>
Updated presentation and added a new figure
</commit_message>
<xml_diff>
--- a/Presentation/PresentazioneDispositivi.pptx
+++ b/Presentation/PresentazioneDispositivi.pptx
@@ -14,9 +14,12 @@
     <p:sldId id="267" r:id="rId8"/>
     <p:sldId id="261" r:id="rId9"/>
     <p:sldId id="263" r:id="rId10"/>
-    <p:sldId id="266" r:id="rId11"/>
-    <p:sldId id="262" r:id="rId12"/>
-    <p:sldId id="264" r:id="rId13"/>
+    <p:sldId id="269" r:id="rId11"/>
+    <p:sldId id="270" r:id="rId12"/>
+    <p:sldId id="266" r:id="rId13"/>
+    <p:sldId id="262" r:id="rId14"/>
+    <p:sldId id="264" r:id="rId15"/>
+    <p:sldId id="268" r:id="rId16"/>
   </p:sldIdLst>
   <p:sldSz cx="12192000" cy="6858000"/>
   <p:notesSz cx="6858000" cy="9144000"/>
@@ -181,7 +184,7 @@
           <a:noFill/>
           <a:extLst>
             <a:ext uri="{909E8E84-426E-40dd-AFC4-6F175D3DCCD1}">
-              <a14:hiddenFill xmlns="" xmlns:a14="http://schemas.microsoft.com/office/drawing/2010/main">
+              <a14:hiddenFill xmlns:a14="http://schemas.microsoft.com/office/drawing/2010/main" xmlns="">
                 <a:solidFill>
                   <a:srgbClr val="FFFFFF"/>
                 </a:solidFill>
@@ -241,7 +244,7 @@
             </a:ln>
             <a:extLst>
               <a:ext uri="{91240B29-F687-4f45-9708-019B960494DF}">
-                <a14:hiddenLine xmlns="" xmlns:a14="http://schemas.microsoft.com/office/drawing/2010/main" w="9525">
+                <a14:hiddenLine xmlns:a14="http://schemas.microsoft.com/office/drawing/2010/main" xmlns="" w="9525">
                   <a:solidFill>
                     <a:srgbClr val="000000"/>
                   </a:solidFill>
@@ -331,7 +334,7 @@
             </a:ln>
             <a:extLst>
               <a:ext uri="{91240B29-F687-4f45-9708-019B960494DF}">
-                <a14:hiddenLine xmlns="" xmlns:a14="http://schemas.microsoft.com/office/drawing/2010/main" w="9525">
+                <a14:hiddenLine xmlns:a14="http://schemas.microsoft.com/office/drawing/2010/main" xmlns="" w="9525">
                   <a:solidFill>
                     <a:srgbClr val="000000"/>
                   </a:solidFill>
@@ -421,7 +424,7 @@
             </a:ln>
             <a:extLst>
               <a:ext uri="{91240B29-F687-4f45-9708-019B960494DF}">
-                <a14:hiddenLine xmlns="" xmlns:a14="http://schemas.microsoft.com/office/drawing/2010/main" w="9525">
+                <a14:hiddenLine xmlns:a14="http://schemas.microsoft.com/office/drawing/2010/main" xmlns="" w="9525">
                   <a:solidFill>
                     <a:srgbClr val="000000"/>
                   </a:solidFill>
@@ -455,7 +458,7 @@
             </a:ln>
             <a:extLst>
               <a:ext uri="{91240B29-F687-4f45-9708-019B960494DF}">
-                <a14:hiddenLine xmlns="" xmlns:a14="http://schemas.microsoft.com/office/drawing/2010/main" w="9525">
+                <a14:hiddenLine xmlns:a14="http://schemas.microsoft.com/office/drawing/2010/main" xmlns="" w="9525">
                   <a:solidFill>
                     <a:srgbClr val="000000"/>
                   </a:solidFill>
@@ -545,7 +548,7 @@
             </a:ln>
             <a:extLst>
               <a:ext uri="{91240B29-F687-4f45-9708-019B960494DF}">
-                <a14:hiddenLine xmlns="" xmlns:a14="http://schemas.microsoft.com/office/drawing/2010/main" w="9525">
+                <a14:hiddenLine xmlns:a14="http://schemas.microsoft.com/office/drawing/2010/main" xmlns="" w="9525">
                   <a:solidFill>
                     <a:srgbClr val="000000"/>
                   </a:solidFill>
@@ -607,7 +610,7 @@
             </a:ln>
             <a:extLst>
               <a:ext uri="{91240B29-F687-4f45-9708-019B960494DF}">
-                <a14:hiddenLine xmlns="" xmlns:a14="http://schemas.microsoft.com/office/drawing/2010/main" w="9525">
+                <a14:hiddenLine xmlns:a14="http://schemas.microsoft.com/office/drawing/2010/main" xmlns="" w="9525">
                   <a:solidFill>
                     <a:srgbClr val="000000"/>
                   </a:solidFill>
@@ -669,7 +672,7 @@
             </a:ln>
             <a:extLst>
               <a:ext uri="{91240B29-F687-4f45-9708-019B960494DF}">
-                <a14:hiddenLine xmlns="" xmlns:a14="http://schemas.microsoft.com/office/drawing/2010/main" w="9525">
+                <a14:hiddenLine xmlns:a14="http://schemas.microsoft.com/office/drawing/2010/main" xmlns="" w="9525">
                   <a:solidFill>
                     <a:srgbClr val="000000"/>
                   </a:solidFill>
@@ -759,7 +762,7 @@
             </a:ln>
             <a:extLst>
               <a:ext uri="{91240B29-F687-4f45-9708-019B960494DF}">
-                <a14:hiddenLine xmlns="" xmlns:a14="http://schemas.microsoft.com/office/drawing/2010/main" w="9525">
+                <a14:hiddenLine xmlns:a14="http://schemas.microsoft.com/office/drawing/2010/main" xmlns="" w="9525">
                   <a:solidFill>
                     <a:srgbClr val="000000"/>
                   </a:solidFill>
@@ -821,7 +824,7 @@
             </a:ln>
             <a:extLst>
               <a:ext uri="{91240B29-F687-4f45-9708-019B960494DF}">
-                <a14:hiddenLine xmlns="" xmlns:a14="http://schemas.microsoft.com/office/drawing/2010/main" w="9525">
+                <a14:hiddenLine xmlns:a14="http://schemas.microsoft.com/office/drawing/2010/main" xmlns="" w="9525">
                   <a:solidFill>
                     <a:srgbClr val="000000"/>
                   </a:solidFill>
@@ -883,7 +886,7 @@
             </a:ln>
             <a:extLst>
               <a:ext uri="{91240B29-F687-4f45-9708-019B960494DF}">
-                <a14:hiddenLine xmlns="" xmlns:a14="http://schemas.microsoft.com/office/drawing/2010/main" w="9525">
+                <a14:hiddenLine xmlns:a14="http://schemas.microsoft.com/office/drawing/2010/main" xmlns="" w="9525">
                   <a:solidFill>
                     <a:srgbClr val="000000"/>
                   </a:solidFill>
@@ -973,7 +976,7 @@
             </a:ln>
             <a:extLst>
               <a:ext uri="{91240B29-F687-4f45-9708-019B960494DF}">
-                <a14:hiddenLine xmlns="" xmlns:a14="http://schemas.microsoft.com/office/drawing/2010/main" w="9525">
+                <a14:hiddenLine xmlns:a14="http://schemas.microsoft.com/office/drawing/2010/main" xmlns="" w="9525">
                   <a:solidFill>
                     <a:srgbClr val="000000"/>
                   </a:solidFill>
@@ -1063,7 +1066,7 @@
             </a:ln>
             <a:extLst>
               <a:ext uri="{91240B29-F687-4f45-9708-019B960494DF}">
-                <a14:hiddenLine xmlns="" xmlns:a14="http://schemas.microsoft.com/office/drawing/2010/main" w="9525">
+                <a14:hiddenLine xmlns:a14="http://schemas.microsoft.com/office/drawing/2010/main" xmlns="" w="9525">
                   <a:solidFill>
                     <a:srgbClr val="000000"/>
                   </a:solidFill>
@@ -1125,7 +1128,7 @@
             </a:ln>
             <a:extLst>
               <a:ext uri="{91240B29-F687-4f45-9708-019B960494DF}">
-                <a14:hiddenLine xmlns="" xmlns:a14="http://schemas.microsoft.com/office/drawing/2010/main" w="9525">
+                <a14:hiddenLine xmlns:a14="http://schemas.microsoft.com/office/drawing/2010/main" xmlns="" w="9525">
                   <a:solidFill>
                     <a:srgbClr val="000000"/>
                   </a:solidFill>
@@ -1235,7 +1238,7 @@
             </a:ln>
             <a:extLst>
               <a:ext uri="{91240B29-F687-4f45-9708-019B960494DF}">
-                <a14:hiddenLine xmlns="" xmlns:a14="http://schemas.microsoft.com/office/drawing/2010/main" w="9525">
+                <a14:hiddenLine xmlns:a14="http://schemas.microsoft.com/office/drawing/2010/main" xmlns="" w="9525">
                   <a:solidFill>
                     <a:srgbClr val="000000"/>
                   </a:solidFill>
@@ -1297,7 +1300,7 @@
             </a:ln>
             <a:extLst>
               <a:ext uri="{91240B29-F687-4f45-9708-019B960494DF}">
-                <a14:hiddenLine xmlns="" xmlns:a14="http://schemas.microsoft.com/office/drawing/2010/main" w="9525">
+                <a14:hiddenLine xmlns:a14="http://schemas.microsoft.com/office/drawing/2010/main" xmlns="" w="9525">
                   <a:solidFill>
                     <a:srgbClr val="000000"/>
                   </a:solidFill>
@@ -1387,7 +1390,7 @@
             </a:ln>
             <a:extLst>
               <a:ext uri="{91240B29-F687-4f45-9708-019B960494DF}">
-                <a14:hiddenLine xmlns="" xmlns:a14="http://schemas.microsoft.com/office/drawing/2010/main" w="9525">
+                <a14:hiddenLine xmlns:a14="http://schemas.microsoft.com/office/drawing/2010/main" xmlns="" w="9525">
                   <a:solidFill>
                     <a:srgbClr val="000000"/>
                   </a:solidFill>
@@ -1477,7 +1480,7 @@
             </a:ln>
             <a:extLst>
               <a:ext uri="{91240B29-F687-4f45-9708-019B960494DF}">
-                <a14:hiddenLine xmlns="" xmlns:a14="http://schemas.microsoft.com/office/drawing/2010/main" w="9525">
+                <a14:hiddenLine xmlns:a14="http://schemas.microsoft.com/office/drawing/2010/main" xmlns="" w="9525">
                   <a:solidFill>
                     <a:srgbClr val="000000"/>
                   </a:solidFill>
@@ -1539,7 +1542,7 @@
             </a:ln>
             <a:extLst>
               <a:ext uri="{91240B29-F687-4f45-9708-019B960494DF}">
-                <a14:hiddenLine xmlns="" xmlns:a14="http://schemas.microsoft.com/office/drawing/2010/main" w="9525">
+                <a14:hiddenLine xmlns:a14="http://schemas.microsoft.com/office/drawing/2010/main" xmlns="" w="9525">
                   <a:solidFill>
                     <a:srgbClr val="000000"/>
                   </a:solidFill>
@@ -1629,7 +1632,7 @@
             </a:ln>
             <a:extLst>
               <a:ext uri="{91240B29-F687-4f45-9708-019B960494DF}">
-                <a14:hiddenLine xmlns="" xmlns:a14="http://schemas.microsoft.com/office/drawing/2010/main" w="9525">
+                <a14:hiddenLine xmlns:a14="http://schemas.microsoft.com/office/drawing/2010/main" xmlns="" w="9525">
                   <a:solidFill>
                     <a:srgbClr val="000000"/>
                   </a:solidFill>
@@ -1719,7 +1722,7 @@
             </a:ln>
             <a:extLst>
               <a:ext uri="{91240B29-F687-4f45-9708-019B960494DF}">
-                <a14:hiddenLine xmlns="" xmlns:a14="http://schemas.microsoft.com/office/drawing/2010/main" w="9525">
+                <a14:hiddenLine xmlns:a14="http://schemas.microsoft.com/office/drawing/2010/main" xmlns="" w="9525">
                   <a:solidFill>
                     <a:srgbClr val="000000"/>
                   </a:solidFill>
@@ -1775,7 +1778,7 @@
             </a:ln>
             <a:extLst>
               <a:ext uri="{91240B29-F687-4f45-9708-019B960494DF}">
-                <a14:hiddenLine xmlns="" xmlns:a14="http://schemas.microsoft.com/office/drawing/2010/main" w="9525">
+                <a14:hiddenLine xmlns:a14="http://schemas.microsoft.com/office/drawing/2010/main" xmlns="" w="9525">
                   <a:solidFill>
                     <a:srgbClr val="000000"/>
                   </a:solidFill>
@@ -1865,7 +1868,7 @@
             </a:ln>
             <a:extLst>
               <a:ext uri="{91240B29-F687-4f45-9708-019B960494DF}">
-                <a14:hiddenLine xmlns="" xmlns:a14="http://schemas.microsoft.com/office/drawing/2010/main" w="9525">
+                <a14:hiddenLine xmlns:a14="http://schemas.microsoft.com/office/drawing/2010/main" xmlns="" w="9525">
                   <a:solidFill>
                     <a:srgbClr val="000000"/>
                   </a:solidFill>
@@ -1921,7 +1924,7 @@
             </a:ln>
             <a:extLst>
               <a:ext uri="{91240B29-F687-4f45-9708-019B960494DF}">
-                <a14:hiddenLine xmlns="" xmlns:a14="http://schemas.microsoft.com/office/drawing/2010/main" w="9525">
+                <a14:hiddenLine xmlns:a14="http://schemas.microsoft.com/office/drawing/2010/main" xmlns="" w="9525">
                   <a:solidFill>
                     <a:srgbClr val="000000"/>
                   </a:solidFill>
@@ -2011,7 +2014,7 @@
             </a:ln>
             <a:extLst>
               <a:ext uri="{91240B29-F687-4f45-9708-019B960494DF}">
-                <a14:hiddenLine xmlns="" xmlns:a14="http://schemas.microsoft.com/office/drawing/2010/main" w="9525">
+                <a14:hiddenLine xmlns:a14="http://schemas.microsoft.com/office/drawing/2010/main" xmlns="" w="9525">
                   <a:solidFill>
                     <a:srgbClr val="000000"/>
                   </a:solidFill>
@@ -2079,7 +2082,7 @@
             </a:ln>
             <a:extLst>
               <a:ext uri="{91240B29-F687-4f45-9708-019B960494DF}">
-                <a14:hiddenLine xmlns="" xmlns:a14="http://schemas.microsoft.com/office/drawing/2010/main" w="9525">
+                <a14:hiddenLine xmlns:a14="http://schemas.microsoft.com/office/drawing/2010/main" xmlns="" w="9525">
                   <a:solidFill>
                     <a:srgbClr val="000000"/>
                   </a:solidFill>
@@ -2169,7 +2172,7 @@
             </a:ln>
             <a:extLst>
               <a:ext uri="{91240B29-F687-4f45-9708-019B960494DF}">
-                <a14:hiddenLine xmlns="" xmlns:a14="http://schemas.microsoft.com/office/drawing/2010/main" w="9525">
+                <a14:hiddenLine xmlns:a14="http://schemas.microsoft.com/office/drawing/2010/main" xmlns="" w="9525">
                   <a:solidFill>
                     <a:srgbClr val="000000"/>
                   </a:solidFill>
@@ -2237,7 +2240,7 @@
             </a:ln>
             <a:extLst>
               <a:ext uri="{91240B29-F687-4f45-9708-019B960494DF}">
-                <a14:hiddenLine xmlns="" xmlns:a14="http://schemas.microsoft.com/office/drawing/2010/main" w="9525">
+                <a14:hiddenLine xmlns:a14="http://schemas.microsoft.com/office/drawing/2010/main" xmlns="" w="9525">
                   <a:solidFill>
                     <a:srgbClr val="000000"/>
                   </a:solidFill>
@@ -2327,7 +2330,7 @@
             </a:ln>
             <a:extLst>
               <a:ext uri="{91240B29-F687-4f45-9708-019B960494DF}">
-                <a14:hiddenLine xmlns="" xmlns:a14="http://schemas.microsoft.com/office/drawing/2010/main" w="9525">
+                <a14:hiddenLine xmlns:a14="http://schemas.microsoft.com/office/drawing/2010/main" xmlns="" w="9525">
                   <a:solidFill>
                     <a:srgbClr val="000000"/>
                   </a:solidFill>
@@ -2361,7 +2364,7 @@
             </a:ln>
             <a:extLst>
               <a:ext uri="{91240B29-F687-4f45-9708-019B960494DF}">
-                <a14:hiddenLine xmlns="" xmlns:a14="http://schemas.microsoft.com/office/drawing/2010/main" w="9525">
+                <a14:hiddenLine xmlns:a14="http://schemas.microsoft.com/office/drawing/2010/main" xmlns="" w="9525">
                   <a:solidFill>
                     <a:srgbClr val="000000"/>
                   </a:solidFill>
@@ -2451,7 +2454,7 @@
             </a:ln>
             <a:extLst>
               <a:ext uri="{91240B29-F687-4f45-9708-019B960494DF}">
-                <a14:hiddenLine xmlns="" xmlns:a14="http://schemas.microsoft.com/office/drawing/2010/main" w="9525">
+                <a14:hiddenLine xmlns:a14="http://schemas.microsoft.com/office/drawing/2010/main" xmlns="" w="9525">
                   <a:solidFill>
                     <a:srgbClr val="000000"/>
                   </a:solidFill>
@@ -2513,7 +2516,7 @@
             </a:ln>
             <a:extLst>
               <a:ext uri="{91240B29-F687-4f45-9708-019B960494DF}">
-                <a14:hiddenLine xmlns="" xmlns:a14="http://schemas.microsoft.com/office/drawing/2010/main" w="9525">
+                <a14:hiddenLine xmlns:a14="http://schemas.microsoft.com/office/drawing/2010/main" xmlns="" w="9525">
                   <a:solidFill>
                     <a:srgbClr val="000000"/>
                   </a:solidFill>
@@ -2575,7 +2578,7 @@
             </a:ln>
             <a:extLst>
               <a:ext uri="{91240B29-F687-4f45-9708-019B960494DF}">
-                <a14:hiddenLine xmlns="" xmlns:a14="http://schemas.microsoft.com/office/drawing/2010/main" w="9525">
+                <a14:hiddenLine xmlns:a14="http://schemas.microsoft.com/office/drawing/2010/main" xmlns="" w="9525">
                   <a:solidFill>
                     <a:srgbClr val="000000"/>
                   </a:solidFill>
@@ -2665,7 +2668,7 @@
             </a:ln>
             <a:extLst>
               <a:ext uri="{91240B29-F687-4f45-9708-019B960494DF}">
-                <a14:hiddenLine xmlns="" xmlns:a14="http://schemas.microsoft.com/office/drawing/2010/main" w="9525">
+                <a14:hiddenLine xmlns:a14="http://schemas.microsoft.com/office/drawing/2010/main" xmlns="" w="9525">
                   <a:solidFill>
                     <a:srgbClr val="000000"/>
                   </a:solidFill>
@@ -2733,7 +2736,7 @@
             </a:ln>
             <a:extLst>
               <a:ext uri="{91240B29-F687-4f45-9708-019B960494DF}">
-                <a14:hiddenLine xmlns="" xmlns:a14="http://schemas.microsoft.com/office/drawing/2010/main" w="9525">
+                <a14:hiddenLine xmlns:a14="http://schemas.microsoft.com/office/drawing/2010/main" xmlns="" w="9525">
                   <a:solidFill>
                     <a:srgbClr val="000000"/>
                   </a:solidFill>
@@ -2795,7 +2798,7 @@
             </a:ln>
             <a:extLst>
               <a:ext uri="{91240B29-F687-4f45-9708-019B960494DF}">
-                <a14:hiddenLine xmlns="" xmlns:a14="http://schemas.microsoft.com/office/drawing/2010/main" w="9525">
+                <a14:hiddenLine xmlns:a14="http://schemas.microsoft.com/office/drawing/2010/main" xmlns="" w="9525">
                   <a:solidFill>
                     <a:srgbClr val="000000"/>
                   </a:solidFill>
@@ -2885,7 +2888,7 @@
             </a:ln>
             <a:extLst>
               <a:ext uri="{91240B29-F687-4f45-9708-019B960494DF}">
-                <a14:hiddenLine xmlns="" xmlns:a14="http://schemas.microsoft.com/office/drawing/2010/main" w="9525">
+                <a14:hiddenLine xmlns:a14="http://schemas.microsoft.com/office/drawing/2010/main" xmlns="" w="9525">
                   <a:solidFill>
                     <a:srgbClr val="000000"/>
                   </a:solidFill>
@@ -2947,7 +2950,7 @@
             </a:ln>
             <a:extLst>
               <a:ext uri="{91240B29-F687-4f45-9708-019B960494DF}">
-                <a14:hiddenLine xmlns="" xmlns:a14="http://schemas.microsoft.com/office/drawing/2010/main" w="9525">
+                <a14:hiddenLine xmlns:a14="http://schemas.microsoft.com/office/drawing/2010/main" xmlns="" w="9525">
                   <a:solidFill>
                     <a:srgbClr val="000000"/>
                   </a:solidFill>
@@ -3037,7 +3040,7 @@
             </a:ln>
             <a:extLst>
               <a:ext uri="{91240B29-F687-4f45-9708-019B960494DF}">
-                <a14:hiddenLine xmlns="" xmlns:a14="http://schemas.microsoft.com/office/drawing/2010/main" w="9525">
+                <a14:hiddenLine xmlns:a14="http://schemas.microsoft.com/office/drawing/2010/main" xmlns="" w="9525">
                   <a:solidFill>
                     <a:srgbClr val="000000"/>
                   </a:solidFill>
@@ -3099,7 +3102,7 @@
             </a:ln>
             <a:extLst>
               <a:ext uri="{91240B29-F687-4f45-9708-019B960494DF}">
-                <a14:hiddenLine xmlns="" xmlns:a14="http://schemas.microsoft.com/office/drawing/2010/main" w="9525">
+                <a14:hiddenLine xmlns:a14="http://schemas.microsoft.com/office/drawing/2010/main" xmlns="" w="9525">
                   <a:solidFill>
                     <a:srgbClr val="000000"/>
                   </a:solidFill>
@@ -3189,7 +3192,7 @@
             </a:ln>
             <a:extLst>
               <a:ext uri="{91240B29-F687-4f45-9708-019B960494DF}">
-                <a14:hiddenLine xmlns="" xmlns:a14="http://schemas.microsoft.com/office/drawing/2010/main" w="9525">
+                <a14:hiddenLine xmlns:a14="http://schemas.microsoft.com/office/drawing/2010/main" xmlns="" w="9525">
                   <a:solidFill>
                     <a:srgbClr val="000000"/>
                   </a:solidFill>
@@ -3223,7 +3226,7 @@
             </a:ln>
             <a:extLst>
               <a:ext uri="{91240B29-F687-4f45-9708-019B960494DF}">
-                <a14:hiddenLine xmlns="" xmlns:a14="http://schemas.microsoft.com/office/drawing/2010/main" w="9525">
+                <a14:hiddenLine xmlns:a14="http://schemas.microsoft.com/office/drawing/2010/main" xmlns="" w="9525">
                   <a:solidFill>
                     <a:srgbClr val="000000"/>
                   </a:solidFill>
@@ -3288,7 +3291,7 @@
             </a:ln>
             <a:extLst>
               <a:ext uri="{91240B29-F687-4f45-9708-019B960494DF}">
-                <a14:hiddenLine xmlns="" xmlns:a14="http://schemas.microsoft.com/office/drawing/2010/main" w="9525">
+                <a14:hiddenLine xmlns:a14="http://schemas.microsoft.com/office/drawing/2010/main" xmlns="" w="9525">
                   <a:solidFill>
                     <a:srgbClr val="000000"/>
                   </a:solidFill>
@@ -3378,7 +3381,7 @@
             </a:ln>
             <a:extLst>
               <a:ext uri="{91240B29-F687-4f45-9708-019B960494DF}">
-                <a14:hiddenLine xmlns="" xmlns:a14="http://schemas.microsoft.com/office/drawing/2010/main" w="9525">
+                <a14:hiddenLine xmlns:a14="http://schemas.microsoft.com/office/drawing/2010/main" xmlns="" w="9525">
                   <a:solidFill>
                     <a:srgbClr val="000000"/>
                   </a:solidFill>
@@ -3440,7 +3443,7 @@
             </a:ln>
             <a:extLst>
               <a:ext uri="{91240B29-F687-4f45-9708-019B960494DF}">
-                <a14:hiddenLine xmlns="" xmlns:a14="http://schemas.microsoft.com/office/drawing/2010/main" w="9525">
+                <a14:hiddenLine xmlns:a14="http://schemas.microsoft.com/office/drawing/2010/main" xmlns="" w="9525">
                   <a:solidFill>
                     <a:srgbClr val="000000"/>
                   </a:solidFill>
@@ -3530,7 +3533,7 @@
             </a:ln>
             <a:extLst>
               <a:ext uri="{91240B29-F687-4f45-9708-019B960494DF}">
-                <a14:hiddenLine xmlns="" xmlns:a14="http://schemas.microsoft.com/office/drawing/2010/main" w="9525">
+                <a14:hiddenLine xmlns:a14="http://schemas.microsoft.com/office/drawing/2010/main" xmlns="" w="9525">
                   <a:solidFill>
                     <a:srgbClr val="000000"/>
                   </a:solidFill>
@@ -3620,7 +3623,7 @@
             </a:ln>
             <a:extLst>
               <a:ext uri="{91240B29-F687-4f45-9708-019B960494DF}">
-                <a14:hiddenLine xmlns="" xmlns:a14="http://schemas.microsoft.com/office/drawing/2010/main" w="9525">
+                <a14:hiddenLine xmlns:a14="http://schemas.microsoft.com/office/drawing/2010/main" xmlns="" w="9525">
                   <a:solidFill>
                     <a:srgbClr val="000000"/>
                   </a:solidFill>
@@ -3685,7 +3688,7 @@
             </a:ln>
             <a:extLst>
               <a:ext uri="{91240B29-F687-4f45-9708-019B960494DF}">
-                <a14:hiddenLine xmlns="" xmlns:a14="http://schemas.microsoft.com/office/drawing/2010/main" w="9525">
+                <a14:hiddenLine xmlns:a14="http://schemas.microsoft.com/office/drawing/2010/main" xmlns="" w="9525">
                   <a:solidFill>
                     <a:srgbClr val="000000"/>
                   </a:solidFill>
@@ -3747,7 +3750,7 @@
             </a:ln>
             <a:extLst>
               <a:ext uri="{91240B29-F687-4f45-9708-019B960494DF}">
-                <a14:hiddenLine xmlns="" xmlns:a14="http://schemas.microsoft.com/office/drawing/2010/main" w="9525">
+                <a14:hiddenLine xmlns:a14="http://schemas.microsoft.com/office/drawing/2010/main" xmlns="" w="9525">
                   <a:solidFill>
                     <a:srgbClr val="000000"/>
                   </a:solidFill>
@@ -3837,7 +3840,7 @@
             </a:ln>
             <a:extLst>
               <a:ext uri="{91240B29-F687-4f45-9708-019B960494DF}">
-                <a14:hiddenLine xmlns="" xmlns:a14="http://schemas.microsoft.com/office/drawing/2010/main" w="9525">
+                <a14:hiddenLine xmlns:a14="http://schemas.microsoft.com/office/drawing/2010/main" xmlns="" w="9525">
                   <a:solidFill>
                     <a:srgbClr val="000000"/>
                   </a:solidFill>
@@ -3927,7 +3930,7 @@
             </a:ln>
             <a:extLst>
               <a:ext uri="{91240B29-F687-4f45-9708-019B960494DF}">
-                <a14:hiddenLine xmlns="" xmlns:a14="http://schemas.microsoft.com/office/drawing/2010/main" w="9525">
+                <a14:hiddenLine xmlns:a14="http://schemas.microsoft.com/office/drawing/2010/main" xmlns="" w="9525">
                   <a:solidFill>
                     <a:srgbClr val="000000"/>
                   </a:solidFill>
@@ -3989,7 +3992,7 @@
             </a:ln>
             <a:extLst>
               <a:ext uri="{91240B29-F687-4f45-9708-019B960494DF}">
-                <a14:hiddenLine xmlns="" xmlns:a14="http://schemas.microsoft.com/office/drawing/2010/main" w="9525">
+                <a14:hiddenLine xmlns:a14="http://schemas.microsoft.com/office/drawing/2010/main" xmlns="" w="9525">
                   <a:solidFill>
                     <a:srgbClr val="000000"/>
                   </a:solidFill>
@@ -4109,7 +4112,7 @@
             </a:ln>
             <a:extLst>
               <a:ext uri="{91240B29-F687-4f45-9708-019B960494DF}">
-                <a14:hiddenLine xmlns="" xmlns:a14="http://schemas.microsoft.com/office/drawing/2010/main" w="9525">
+                <a14:hiddenLine xmlns:a14="http://schemas.microsoft.com/office/drawing/2010/main" xmlns="" w="9525">
                   <a:solidFill>
                     <a:srgbClr val="000000"/>
                   </a:solidFill>
@@ -4177,7 +4180,7 @@
             </a:ln>
             <a:extLst>
               <a:ext uri="{91240B29-F687-4f45-9708-019B960494DF}">
-                <a14:hiddenLine xmlns="" xmlns:a14="http://schemas.microsoft.com/office/drawing/2010/main" w="9525">
+                <a14:hiddenLine xmlns:a14="http://schemas.microsoft.com/office/drawing/2010/main" xmlns="" w="9525">
                   <a:solidFill>
                     <a:srgbClr val="000000"/>
                   </a:solidFill>
@@ -4267,7 +4270,7 @@
             </a:ln>
             <a:extLst>
               <a:ext uri="{91240B29-F687-4f45-9708-019B960494DF}">
-                <a14:hiddenLine xmlns="" xmlns:a14="http://schemas.microsoft.com/office/drawing/2010/main" w="9525">
+                <a14:hiddenLine xmlns:a14="http://schemas.microsoft.com/office/drawing/2010/main" xmlns="" w="9525">
                   <a:solidFill>
                     <a:srgbClr val="000000"/>
                   </a:solidFill>
@@ -4407,7 +4410,7 @@
           <a:p>
             <a:fld id="{7FDBF50C-4ABB-48C4-BC36-F12119FAB571}" type="datetimeFigureOut">
               <a:rPr lang="it-IT" smtClean="0"/>
-              <a:t>07/06/2021</a:t>
+              <a:t>09/06/2021</a:t>
             </a:fld>
             <a:endParaRPr lang="it-IT"/>
           </a:p>
@@ -4674,7 +4677,7 @@
           <a:p>
             <a:fld id="{7FDBF50C-4ABB-48C4-BC36-F12119FAB571}" type="datetimeFigureOut">
               <a:rPr lang="it-IT" smtClean="0"/>
-              <a:t>07/06/2021</a:t>
+              <a:t>09/06/2021</a:t>
             </a:fld>
             <a:endParaRPr lang="it-IT"/>
           </a:p>
@@ -4870,7 +4873,7 @@
           <a:p>
             <a:fld id="{7FDBF50C-4ABB-48C4-BC36-F12119FAB571}" type="datetimeFigureOut">
               <a:rPr lang="it-IT" smtClean="0"/>
-              <a:t>07/06/2021</a:t>
+              <a:t>09/06/2021</a:t>
             </a:fld>
             <a:endParaRPr lang="it-IT"/>
           </a:p>
@@ -5133,7 +5136,7 @@
           <a:p>
             <a:fld id="{7FDBF50C-4ABB-48C4-BC36-F12119FAB571}" type="datetimeFigureOut">
               <a:rPr lang="it-IT" smtClean="0"/>
-              <a:t>07/06/2021</a:t>
+              <a:t>09/06/2021</a:t>
             </a:fld>
             <a:endParaRPr lang="it-IT"/>
           </a:p>
@@ -5567,7 +5570,7 @@
           <a:p>
             <a:fld id="{7FDBF50C-4ABB-48C4-BC36-F12119FAB571}" type="datetimeFigureOut">
               <a:rPr lang="it-IT" smtClean="0"/>
-              <a:t>07/06/2021</a:t>
+              <a:t>09/06/2021</a:t>
             </a:fld>
             <a:endParaRPr lang="it-IT"/>
           </a:p>
@@ -6113,7 +6116,7 @@
           <a:p>
             <a:fld id="{7FDBF50C-4ABB-48C4-BC36-F12119FAB571}" type="datetimeFigureOut">
               <a:rPr lang="it-IT" smtClean="0"/>
-              <a:t>07/06/2021</a:t>
+              <a:t>09/06/2021</a:t>
             </a:fld>
             <a:endParaRPr lang="it-IT"/>
           </a:p>
@@ -6833,7 +6836,7 @@
           <a:p>
             <a:fld id="{7FDBF50C-4ABB-48C4-BC36-F12119FAB571}" type="datetimeFigureOut">
               <a:rPr lang="it-IT" smtClean="0"/>
-              <a:t>07/06/2021</a:t>
+              <a:t>09/06/2021</a:t>
             </a:fld>
             <a:endParaRPr lang="it-IT"/>
           </a:p>
@@ -7003,7 +7006,7 @@
           <a:p>
             <a:fld id="{7FDBF50C-4ABB-48C4-BC36-F12119FAB571}" type="datetimeFigureOut">
               <a:rPr lang="it-IT" smtClean="0"/>
-              <a:t>07/06/2021</a:t>
+              <a:t>09/06/2021</a:t>
             </a:fld>
             <a:endParaRPr lang="it-IT"/>
           </a:p>
@@ -7183,7 +7186,7 @@
           <a:p>
             <a:fld id="{7FDBF50C-4ABB-48C4-BC36-F12119FAB571}" type="datetimeFigureOut">
               <a:rPr lang="it-IT" smtClean="0"/>
-              <a:t>07/06/2021</a:t>
+              <a:t>09/06/2021</a:t>
             </a:fld>
             <a:endParaRPr lang="it-IT"/>
           </a:p>
@@ -7353,7 +7356,7 @@
           <a:p>
             <a:fld id="{7FDBF50C-4ABB-48C4-BC36-F12119FAB571}" type="datetimeFigureOut">
               <a:rPr lang="it-IT" smtClean="0"/>
-              <a:t>07/06/2021</a:t>
+              <a:t>09/06/2021</a:t>
             </a:fld>
             <a:endParaRPr lang="it-IT"/>
           </a:p>
@@ -7603,7 +7606,7 @@
           <a:p>
             <a:fld id="{7FDBF50C-4ABB-48C4-BC36-F12119FAB571}" type="datetimeFigureOut">
               <a:rPr lang="it-IT" smtClean="0"/>
-              <a:t>07/06/2021</a:t>
+              <a:t>09/06/2021</a:t>
             </a:fld>
             <a:endParaRPr lang="it-IT"/>
           </a:p>
@@ -7835,7 +7838,7 @@
           <a:p>
             <a:fld id="{7FDBF50C-4ABB-48C4-BC36-F12119FAB571}" type="datetimeFigureOut">
               <a:rPr lang="it-IT" smtClean="0"/>
-              <a:t>07/06/2021</a:t>
+              <a:t>09/06/2021</a:t>
             </a:fld>
             <a:endParaRPr lang="it-IT"/>
           </a:p>
@@ -8216,7 +8219,7 @@
           <a:p>
             <a:fld id="{7FDBF50C-4ABB-48C4-BC36-F12119FAB571}" type="datetimeFigureOut">
               <a:rPr lang="it-IT" smtClean="0"/>
-              <a:t>07/06/2021</a:t>
+              <a:t>09/06/2021</a:t>
             </a:fld>
             <a:endParaRPr lang="it-IT"/>
           </a:p>
@@ -8334,7 +8337,7 @@
           <a:p>
             <a:fld id="{7FDBF50C-4ABB-48C4-BC36-F12119FAB571}" type="datetimeFigureOut">
               <a:rPr lang="it-IT" smtClean="0"/>
-              <a:t>07/06/2021</a:t>
+              <a:t>09/06/2021</a:t>
             </a:fld>
             <a:endParaRPr lang="it-IT"/>
           </a:p>
@@ -8429,7 +8432,7 @@
           <a:p>
             <a:fld id="{7FDBF50C-4ABB-48C4-BC36-F12119FAB571}" type="datetimeFigureOut">
               <a:rPr lang="it-IT" smtClean="0"/>
-              <a:t>07/06/2021</a:t>
+              <a:t>09/06/2021</a:t>
             </a:fld>
             <a:endParaRPr lang="it-IT"/>
           </a:p>
@@ -8678,7 +8681,7 @@
           <a:p>
             <a:fld id="{7FDBF50C-4ABB-48C4-BC36-F12119FAB571}" type="datetimeFigureOut">
               <a:rPr lang="it-IT" smtClean="0"/>
-              <a:t>07/06/2021</a:t>
+              <a:t>09/06/2021</a:t>
             </a:fld>
             <a:endParaRPr lang="it-IT"/>
           </a:p>
@@ -8958,7 +8961,7 @@
           <a:p>
             <a:fld id="{7FDBF50C-4ABB-48C4-BC36-F12119FAB571}" type="datetimeFigureOut">
               <a:rPr lang="it-IT" smtClean="0"/>
-              <a:t>07/06/2021</a:t>
+              <a:t>09/06/2021</a:t>
             </a:fld>
             <a:endParaRPr lang="it-IT"/>
           </a:p>
@@ -9074,7 +9077,7 @@
           <a:noFill/>
           <a:extLst>
             <a:ext uri="{909E8E84-426E-40dd-AFC4-6F175D3DCCD1}">
-              <a14:hiddenFill xmlns="" xmlns:a14="http://schemas.microsoft.com/office/drawing/2010/main">
+              <a14:hiddenFill xmlns:a14="http://schemas.microsoft.com/office/drawing/2010/main" xmlns="">
                 <a:solidFill>
                   <a:srgbClr val="FFFFFF"/>
                 </a:solidFill>
@@ -9148,7 +9151,7 @@
               </a:ln>
               <a:extLst>
                 <a:ext uri="{91240B29-F687-4f45-9708-019B960494DF}">
-                  <a14:hiddenLine xmlns="" xmlns:a14="http://schemas.microsoft.com/office/drawing/2010/main" w="9525">
+                  <a14:hiddenLine xmlns:a14="http://schemas.microsoft.com/office/drawing/2010/main" xmlns="" w="9525">
                     <a:solidFill>
                       <a:srgbClr val="000000"/>
                     </a:solidFill>
@@ -9238,7 +9241,7 @@
               </a:ln>
               <a:extLst>
                 <a:ext uri="{91240B29-F687-4f45-9708-019B960494DF}">
-                  <a14:hiddenLine xmlns="" xmlns:a14="http://schemas.microsoft.com/office/drawing/2010/main" w="9525">
+                  <a14:hiddenLine xmlns:a14="http://schemas.microsoft.com/office/drawing/2010/main" xmlns="" w="9525">
                     <a:solidFill>
                       <a:srgbClr val="000000"/>
                     </a:solidFill>
@@ -9328,7 +9331,7 @@
               </a:ln>
               <a:extLst>
                 <a:ext uri="{91240B29-F687-4f45-9708-019B960494DF}">
-                  <a14:hiddenLine xmlns="" xmlns:a14="http://schemas.microsoft.com/office/drawing/2010/main" w="9525">
+                  <a14:hiddenLine xmlns:a14="http://schemas.microsoft.com/office/drawing/2010/main" xmlns="" w="9525">
                     <a:solidFill>
                       <a:srgbClr val="000000"/>
                     </a:solidFill>
@@ -9390,7 +9393,7 @@
               </a:ln>
               <a:extLst>
                 <a:ext uri="{91240B29-F687-4f45-9708-019B960494DF}">
-                  <a14:hiddenLine xmlns="" xmlns:a14="http://schemas.microsoft.com/office/drawing/2010/main" w="9525">
+                  <a14:hiddenLine xmlns:a14="http://schemas.microsoft.com/office/drawing/2010/main" xmlns="" w="9525">
                     <a:solidFill>
                       <a:srgbClr val="000000"/>
                     </a:solidFill>
@@ -9480,7 +9483,7 @@
               </a:ln>
               <a:extLst>
                 <a:ext uri="{91240B29-F687-4f45-9708-019B960494DF}">
-                  <a14:hiddenLine xmlns="" xmlns:a14="http://schemas.microsoft.com/office/drawing/2010/main" w="9525">
+                  <a14:hiddenLine xmlns:a14="http://schemas.microsoft.com/office/drawing/2010/main" xmlns="" w="9525">
                     <a:solidFill>
                       <a:srgbClr val="000000"/>
                     </a:solidFill>
@@ -9542,7 +9545,7 @@
               </a:ln>
               <a:extLst>
                 <a:ext uri="{91240B29-F687-4f45-9708-019B960494DF}">
-                  <a14:hiddenLine xmlns="" xmlns:a14="http://schemas.microsoft.com/office/drawing/2010/main" w="9525">
+                  <a14:hiddenLine xmlns:a14="http://schemas.microsoft.com/office/drawing/2010/main" xmlns="" w="9525">
                     <a:solidFill>
                       <a:srgbClr val="000000"/>
                     </a:solidFill>
@@ -9604,7 +9607,7 @@
               </a:ln>
               <a:extLst>
                 <a:ext uri="{91240B29-F687-4f45-9708-019B960494DF}">
-                  <a14:hiddenLine xmlns="" xmlns:a14="http://schemas.microsoft.com/office/drawing/2010/main" w="9525">
+                  <a14:hiddenLine xmlns:a14="http://schemas.microsoft.com/office/drawing/2010/main" xmlns="" w="9525">
                     <a:solidFill>
                       <a:srgbClr val="000000"/>
                     </a:solidFill>
@@ -9694,7 +9697,7 @@
               </a:ln>
               <a:extLst>
                 <a:ext uri="{91240B29-F687-4f45-9708-019B960494DF}">
-                  <a14:hiddenLine xmlns="" xmlns:a14="http://schemas.microsoft.com/office/drawing/2010/main" w="9525">
+                  <a14:hiddenLine xmlns:a14="http://schemas.microsoft.com/office/drawing/2010/main" xmlns="" w="9525">
                     <a:solidFill>
                       <a:srgbClr val="000000"/>
                     </a:solidFill>
@@ -9784,7 +9787,7 @@
               </a:ln>
               <a:extLst>
                 <a:ext uri="{91240B29-F687-4f45-9708-019B960494DF}">
-                  <a14:hiddenLine xmlns="" xmlns:a14="http://schemas.microsoft.com/office/drawing/2010/main" w="9525">
+                  <a14:hiddenLine xmlns:a14="http://schemas.microsoft.com/office/drawing/2010/main" xmlns="" w="9525">
                     <a:solidFill>
                       <a:srgbClr val="000000"/>
                     </a:solidFill>
@@ -9846,7 +9849,7 @@
               </a:ln>
               <a:extLst>
                 <a:ext uri="{91240B29-F687-4f45-9708-019B960494DF}">
-                  <a14:hiddenLine xmlns="" xmlns:a14="http://schemas.microsoft.com/office/drawing/2010/main" w="9525">
+                  <a14:hiddenLine xmlns:a14="http://schemas.microsoft.com/office/drawing/2010/main" xmlns="" w="9525">
                     <a:solidFill>
                       <a:srgbClr val="000000"/>
                     </a:solidFill>
@@ -9956,7 +9959,7 @@
               </a:ln>
               <a:extLst>
                 <a:ext uri="{91240B29-F687-4f45-9708-019B960494DF}">
-                  <a14:hiddenLine xmlns="" xmlns:a14="http://schemas.microsoft.com/office/drawing/2010/main" w="9525">
+                  <a14:hiddenLine xmlns:a14="http://schemas.microsoft.com/office/drawing/2010/main" xmlns="" w="9525">
                     <a:solidFill>
                       <a:srgbClr val="000000"/>
                     </a:solidFill>
@@ -10040,7 +10043,7 @@
               </a:ln>
               <a:extLst>
                 <a:ext uri="{91240B29-F687-4f45-9708-019B960494DF}">
-                  <a14:hiddenLine xmlns="" xmlns:a14="http://schemas.microsoft.com/office/drawing/2010/main" w="9525">
+                  <a14:hiddenLine xmlns:a14="http://schemas.microsoft.com/office/drawing/2010/main" xmlns="" w="9525">
                     <a:solidFill>
                       <a:srgbClr val="000000"/>
                     </a:solidFill>
@@ -10102,7 +10105,7 @@
               </a:ln>
               <a:extLst>
                 <a:ext uri="{91240B29-F687-4f45-9708-019B960494DF}">
-                  <a14:hiddenLine xmlns="" xmlns:a14="http://schemas.microsoft.com/office/drawing/2010/main" w="9525">
+                  <a14:hiddenLine xmlns:a14="http://schemas.microsoft.com/office/drawing/2010/main" xmlns="" w="9525">
                     <a:solidFill>
                       <a:srgbClr val="000000"/>
                     </a:solidFill>
@@ -10164,7 +10167,7 @@
               </a:ln>
               <a:extLst>
                 <a:ext uri="{91240B29-F687-4f45-9708-019B960494DF}">
-                  <a14:hiddenLine xmlns="" xmlns:a14="http://schemas.microsoft.com/office/drawing/2010/main" w="9525">
+                  <a14:hiddenLine xmlns:a14="http://schemas.microsoft.com/office/drawing/2010/main" xmlns="" w="9525">
                     <a:solidFill>
                       <a:srgbClr val="000000"/>
                     </a:solidFill>
@@ -10254,7 +10257,7 @@
               </a:ln>
               <a:extLst>
                 <a:ext uri="{91240B29-F687-4f45-9708-019B960494DF}">
-                  <a14:hiddenLine xmlns="" xmlns:a14="http://schemas.microsoft.com/office/drawing/2010/main" w="9525">
+                  <a14:hiddenLine xmlns:a14="http://schemas.microsoft.com/office/drawing/2010/main" xmlns="" w="9525">
                     <a:solidFill>
                       <a:srgbClr val="000000"/>
                     </a:solidFill>
@@ -10288,7 +10291,7 @@
               </a:ln>
               <a:extLst>
                 <a:ext uri="{91240B29-F687-4f45-9708-019B960494DF}">
-                  <a14:hiddenLine xmlns="" xmlns:a14="http://schemas.microsoft.com/office/drawing/2010/main" w="9525">
+                  <a14:hiddenLine xmlns:a14="http://schemas.microsoft.com/office/drawing/2010/main" xmlns="" w="9525">
                     <a:solidFill>
                       <a:srgbClr val="000000"/>
                     </a:solidFill>
@@ -10353,7 +10356,7 @@
               </a:ln>
               <a:extLst>
                 <a:ext uri="{91240B29-F687-4f45-9708-019B960494DF}">
-                  <a14:hiddenLine xmlns="" xmlns:a14="http://schemas.microsoft.com/office/drawing/2010/main" w="9525">
+                  <a14:hiddenLine xmlns:a14="http://schemas.microsoft.com/office/drawing/2010/main" xmlns="" w="9525">
                     <a:solidFill>
                       <a:srgbClr val="000000"/>
                     </a:solidFill>
@@ -10443,7 +10446,7 @@
               </a:ln>
               <a:extLst>
                 <a:ext uri="{91240B29-F687-4f45-9708-019B960494DF}">
-                  <a14:hiddenLine xmlns="" xmlns:a14="http://schemas.microsoft.com/office/drawing/2010/main" w="9525">
+                  <a14:hiddenLine xmlns:a14="http://schemas.microsoft.com/office/drawing/2010/main" xmlns="" w="9525">
                     <a:solidFill>
                       <a:srgbClr val="000000"/>
                     </a:solidFill>
@@ -10505,7 +10508,7 @@
               </a:ln>
               <a:extLst>
                 <a:ext uri="{91240B29-F687-4f45-9708-019B960494DF}">
-                  <a14:hiddenLine xmlns="" xmlns:a14="http://schemas.microsoft.com/office/drawing/2010/main" w="9525">
+                  <a14:hiddenLine xmlns:a14="http://schemas.microsoft.com/office/drawing/2010/main" xmlns="" w="9525">
                     <a:solidFill>
                       <a:srgbClr val="000000"/>
                     </a:solidFill>
@@ -10595,7 +10598,7 @@
               </a:ln>
               <a:extLst>
                 <a:ext uri="{91240B29-F687-4f45-9708-019B960494DF}">
-                  <a14:hiddenLine xmlns="" xmlns:a14="http://schemas.microsoft.com/office/drawing/2010/main" w="9525">
+                  <a14:hiddenLine xmlns:a14="http://schemas.microsoft.com/office/drawing/2010/main" xmlns="" w="9525">
                     <a:solidFill>
                       <a:srgbClr val="000000"/>
                     </a:solidFill>
@@ -10660,7 +10663,7 @@
               </a:ln>
               <a:extLst>
                 <a:ext uri="{91240B29-F687-4f45-9708-019B960494DF}">
-                  <a14:hiddenLine xmlns="" xmlns:a14="http://schemas.microsoft.com/office/drawing/2010/main" w="9525">
+                  <a14:hiddenLine xmlns:a14="http://schemas.microsoft.com/office/drawing/2010/main" xmlns="" w="9525">
                     <a:solidFill>
                       <a:srgbClr val="000000"/>
                     </a:solidFill>
@@ -10722,7 +10725,7 @@
               </a:ln>
               <a:extLst>
                 <a:ext uri="{91240B29-F687-4f45-9708-019B960494DF}">
-                  <a14:hiddenLine xmlns="" xmlns:a14="http://schemas.microsoft.com/office/drawing/2010/main" w="9525">
+                  <a14:hiddenLine xmlns:a14="http://schemas.microsoft.com/office/drawing/2010/main" xmlns="" w="9525">
                     <a:solidFill>
                       <a:srgbClr val="000000"/>
                     </a:solidFill>
@@ -10812,7 +10815,7 @@
               </a:ln>
               <a:extLst>
                 <a:ext uri="{91240B29-F687-4f45-9708-019B960494DF}">
-                  <a14:hiddenLine xmlns="" xmlns:a14="http://schemas.microsoft.com/office/drawing/2010/main" w="9525">
+                  <a14:hiddenLine xmlns:a14="http://schemas.microsoft.com/office/drawing/2010/main" xmlns="" w="9525">
                     <a:solidFill>
                       <a:srgbClr val="000000"/>
                     </a:solidFill>
@@ -10902,7 +10905,7 @@
               </a:ln>
               <a:extLst>
                 <a:ext uri="{91240B29-F687-4f45-9708-019B960494DF}">
-                  <a14:hiddenLine xmlns="" xmlns:a14="http://schemas.microsoft.com/office/drawing/2010/main" w="9525">
+                  <a14:hiddenLine xmlns:a14="http://schemas.microsoft.com/office/drawing/2010/main" xmlns="" w="9525">
                     <a:solidFill>
                       <a:srgbClr val="000000"/>
                     </a:solidFill>
@@ -10967,7 +10970,7 @@
               </a:ln>
               <a:extLst>
                 <a:ext uri="{91240B29-F687-4f45-9708-019B960494DF}">
-                  <a14:hiddenLine xmlns="" xmlns:a14="http://schemas.microsoft.com/office/drawing/2010/main" w="9525">
+                  <a14:hiddenLine xmlns:a14="http://schemas.microsoft.com/office/drawing/2010/main" xmlns="" w="9525">
                     <a:solidFill>
                       <a:srgbClr val="000000"/>
                     </a:solidFill>
@@ -11087,7 +11090,7 @@
               </a:ln>
               <a:extLst>
                 <a:ext uri="{91240B29-F687-4f45-9708-019B960494DF}">
-                  <a14:hiddenLine xmlns="" xmlns:a14="http://schemas.microsoft.com/office/drawing/2010/main" w="9525">
+                  <a14:hiddenLine xmlns:a14="http://schemas.microsoft.com/office/drawing/2010/main" xmlns="" w="9525">
                     <a:solidFill>
                       <a:srgbClr val="000000"/>
                     </a:solidFill>
@@ -11185,7 +11188,7 @@
               </a:ln>
               <a:extLst>
                 <a:ext uri="{91240B29-F687-4f45-9708-019B960494DF}">
-                  <a14:hiddenLine xmlns="" xmlns:a14="http://schemas.microsoft.com/office/drawing/2010/main" w="9525">
+                  <a14:hiddenLine xmlns:a14="http://schemas.microsoft.com/office/drawing/2010/main" xmlns="" w="9525">
                     <a:solidFill>
                       <a:srgbClr val="000000"/>
                     </a:solidFill>
@@ -11300,7 +11303,7 @@
               </a:ln>
               <a:extLst>
                 <a:ext uri="{91240B29-F687-4f45-9708-019B960494DF}">
-                  <a14:hiddenLine xmlns="" xmlns:a14="http://schemas.microsoft.com/office/drawing/2010/main" w="9525">
+                  <a14:hiddenLine xmlns:a14="http://schemas.microsoft.com/office/drawing/2010/main" xmlns="" w="9525">
                     <a:solidFill>
                       <a:srgbClr val="000000"/>
                     </a:solidFill>
@@ -11390,7 +11393,7 @@
               </a:ln>
               <a:extLst>
                 <a:ext uri="{91240B29-F687-4f45-9708-019B960494DF}">
-                  <a14:hiddenLine xmlns="" xmlns:a14="http://schemas.microsoft.com/office/drawing/2010/main" w="9525">
+                  <a14:hiddenLine xmlns:a14="http://schemas.microsoft.com/office/drawing/2010/main" xmlns="" w="9525">
                     <a:solidFill>
                       <a:srgbClr val="000000"/>
                     </a:solidFill>
@@ -11455,7 +11458,7 @@
               </a:ln>
               <a:extLst>
                 <a:ext uri="{91240B29-F687-4f45-9708-019B960494DF}">
-                  <a14:hiddenLine xmlns="" xmlns:a14="http://schemas.microsoft.com/office/drawing/2010/main" w="9525">
+                  <a14:hiddenLine xmlns:a14="http://schemas.microsoft.com/office/drawing/2010/main" xmlns="" w="9525">
                     <a:solidFill>
                       <a:srgbClr val="000000"/>
                     </a:solidFill>
@@ -11545,7 +11548,7 @@
               </a:ln>
               <a:extLst>
                 <a:ext uri="{91240B29-F687-4f45-9708-019B960494DF}">
-                  <a14:hiddenLine xmlns="" xmlns:a14="http://schemas.microsoft.com/office/drawing/2010/main" w="9525">
+                  <a14:hiddenLine xmlns:a14="http://schemas.microsoft.com/office/drawing/2010/main" xmlns="" w="9525">
                     <a:solidFill>
                       <a:srgbClr val="000000"/>
                     </a:solidFill>
@@ -11613,7 +11616,7 @@
               </a:ln>
               <a:extLst>
                 <a:ext uri="{91240B29-F687-4f45-9708-019B960494DF}">
-                  <a14:hiddenLine xmlns="" xmlns:a14="http://schemas.microsoft.com/office/drawing/2010/main" w="9525">
+                  <a14:hiddenLine xmlns:a14="http://schemas.microsoft.com/office/drawing/2010/main" xmlns="" w="9525">
                     <a:solidFill>
                       <a:srgbClr val="000000"/>
                     </a:solidFill>
@@ -11703,7 +11706,7 @@
               </a:ln>
               <a:extLst>
                 <a:ext uri="{91240B29-F687-4f45-9708-019B960494DF}">
-                  <a14:hiddenLine xmlns="" xmlns:a14="http://schemas.microsoft.com/office/drawing/2010/main" w="9525">
+                  <a14:hiddenLine xmlns:a14="http://schemas.microsoft.com/office/drawing/2010/main" xmlns="" w="9525">
                     <a:solidFill>
                       <a:srgbClr val="000000"/>
                     </a:solidFill>
@@ -11771,7 +11774,7 @@
               </a:ln>
               <a:extLst>
                 <a:ext uri="{91240B29-F687-4f45-9708-019B960494DF}">
-                  <a14:hiddenLine xmlns="" xmlns:a14="http://schemas.microsoft.com/office/drawing/2010/main" w="9525">
+                  <a14:hiddenLine xmlns:a14="http://schemas.microsoft.com/office/drawing/2010/main" xmlns="" w="9525">
                     <a:solidFill>
                       <a:srgbClr val="000000"/>
                     </a:solidFill>
@@ -11861,7 +11864,7 @@
               </a:ln>
               <a:extLst>
                 <a:ext uri="{91240B29-F687-4f45-9708-019B960494DF}">
-                  <a14:hiddenLine xmlns="" xmlns:a14="http://schemas.microsoft.com/office/drawing/2010/main" w="9525">
+                  <a14:hiddenLine xmlns:a14="http://schemas.microsoft.com/office/drawing/2010/main" xmlns="" w="9525">
                     <a:solidFill>
                       <a:srgbClr val="000000"/>
                     </a:solidFill>
@@ -11895,7 +11898,7 @@
               </a:ln>
               <a:extLst>
                 <a:ext uri="{91240B29-F687-4f45-9708-019B960494DF}">
-                  <a14:hiddenLine xmlns="" xmlns:a14="http://schemas.microsoft.com/office/drawing/2010/main" w="9525">
+                  <a14:hiddenLine xmlns:a14="http://schemas.microsoft.com/office/drawing/2010/main" xmlns="" w="9525">
                     <a:solidFill>
                       <a:srgbClr val="000000"/>
                     </a:solidFill>
@@ -12035,7 +12038,7 @@
           <a:p>
             <a:fld id="{7FDBF50C-4ABB-48C4-BC36-F12119FAB571}" type="datetimeFigureOut">
               <a:rPr lang="it-IT" smtClean="0"/>
-              <a:t>07/06/2021</a:t>
+              <a:t>09/06/2021</a:t>
             </a:fld>
             <a:endParaRPr lang="it-IT"/>
           </a:p>
@@ -12565,6 +12568,441 @@
           <a:chExt cx="0" cy="0"/>
         </a:xfrm>
       </p:grpSpPr>
+      <p:pic>
+        <p:nvPicPr>
+          <p:cNvPr id="10" name="Immagine 9">
+            <a:extLst>
+              <a:ext uri="{FF2B5EF4-FFF2-40B4-BE49-F238E27FC236}">
+                <a16:creationId xmlns:a16="http://schemas.microsoft.com/office/drawing/2014/main" id="{8E61818A-3793-4BD5-AACD-7CE3758C054E}"/>
+              </a:ext>
+            </a:extLst>
+          </p:cNvPr>
+          <p:cNvPicPr>
+            <a:picLocks noChangeAspect="1"/>
+          </p:cNvPicPr>
+          <p:nvPr/>
+        </p:nvPicPr>
+        <p:blipFill>
+          <a:blip r:embed="rId2">
+            <a:extLst>
+              <a:ext uri="{28A0092B-C50C-407E-A947-70E740481C1C}">
+                <a14:useLocalDpi xmlns:a14="http://schemas.microsoft.com/office/drawing/2010/main" val="0"/>
+              </a:ext>
+            </a:extLst>
+          </a:blip>
+          <a:srcRect/>
+          <a:stretch/>
+        </p:blipFill>
+        <p:spPr>
+          <a:xfrm>
+            <a:off x="4337108" y="1460063"/>
+            <a:ext cx="6710303" cy="5354755"/>
+          </a:xfrm>
+          <a:prstGeom prst="rect">
+            <a:avLst/>
+          </a:prstGeom>
+        </p:spPr>
+      </p:pic>
+      <p:sp>
+        <p:nvSpPr>
+          <p:cNvPr id="2" name="Titolo 1">
+            <a:extLst>
+              <a:ext uri="{FF2B5EF4-FFF2-40B4-BE49-F238E27FC236}">
+                <a16:creationId xmlns:a16="http://schemas.microsoft.com/office/drawing/2014/main" id="{235AAC29-1500-47EA-AC53-80AEC1D5A1F5}"/>
+              </a:ext>
+            </a:extLst>
+          </p:cNvPr>
+          <p:cNvSpPr>
+            <a:spLocks noGrp="1"/>
+          </p:cNvSpPr>
+          <p:nvPr>
+            <p:ph type="title"/>
+          </p:nvPr>
+        </p:nvSpPr>
+        <p:spPr>
+          <a:xfrm>
+            <a:off x="1141413" y="106790"/>
+            <a:ext cx="9905998" cy="874722"/>
+          </a:xfrm>
+        </p:spPr>
+        <p:txBody>
+          <a:bodyPr/>
+          <a:lstStyle/>
+          <a:p>
+            <a:r>
+              <a:rPr lang="it-IT" dirty="0"/>
+              <a:t>Soglia di pompaggio</a:t>
+            </a:r>
+          </a:p>
+        </p:txBody>
+      </p:sp>
+      <p:sp>
+        <p:nvSpPr>
+          <p:cNvPr id="4" name="CasellaDiTesto 3">
+            <a:extLst>
+              <a:ext uri="{FF2B5EF4-FFF2-40B4-BE49-F238E27FC236}">
+                <a16:creationId xmlns:a16="http://schemas.microsoft.com/office/drawing/2014/main" id="{DDC35683-D0E1-4379-9E1F-97650295748D}"/>
+              </a:ext>
+            </a:extLst>
+          </p:cNvPr>
+          <p:cNvSpPr txBox="1"/>
+          <p:nvPr/>
+        </p:nvSpPr>
+        <p:spPr>
+          <a:xfrm>
+            <a:off x="1031846" y="813732"/>
+            <a:ext cx="10184235" cy="646331"/>
+          </a:xfrm>
+          <a:prstGeom prst="rect">
+            <a:avLst/>
+          </a:prstGeom>
+          <a:noFill/>
+        </p:spPr>
+        <p:txBody>
+          <a:bodyPr wrap="square" rtlCol="0">
+            <a:spAutoFit/>
+          </a:bodyPr>
+          <a:lstStyle/>
+          <a:p>
+            <a:r>
+              <a:rPr lang="it-IT" dirty="0"/>
+              <a:t>Come ci si aspetta dal modello, è possibile trovare un valore di soglia per il </a:t>
+            </a:r>
+            <a:r>
+              <a:rPr lang="it-IT" dirty="0" err="1"/>
+              <a:t>pompagglio</a:t>
+            </a:r>
+            <a:r>
+              <a:rPr lang="it-IT" dirty="0"/>
+              <a:t>, oltre il quale la popolazione di fotoni aumenta ben oltre la popolazione riconducibile ad emissione spontanea.</a:t>
+            </a:r>
+          </a:p>
+        </p:txBody>
+      </p:sp>
+      <p:sp>
+        <p:nvSpPr>
+          <p:cNvPr id="5" name="CasellaDiTesto 4">
+            <a:extLst>
+              <a:ext uri="{FF2B5EF4-FFF2-40B4-BE49-F238E27FC236}">
+                <a16:creationId xmlns:a16="http://schemas.microsoft.com/office/drawing/2014/main" id="{1D8C7D55-2EE2-4CF5-B0CA-92D5394A27F6}"/>
+              </a:ext>
+            </a:extLst>
+          </p:cNvPr>
+          <p:cNvSpPr txBox="1"/>
+          <p:nvPr/>
+        </p:nvSpPr>
+        <p:spPr>
+          <a:xfrm>
+            <a:off x="1141413" y="1582230"/>
+            <a:ext cx="2978092" cy="584775"/>
+          </a:xfrm>
+          <a:prstGeom prst="rect">
+            <a:avLst/>
+          </a:prstGeom>
+          <a:noFill/>
+        </p:spPr>
+        <p:txBody>
+          <a:bodyPr wrap="square" rtlCol="0">
+            <a:spAutoFit/>
+          </a:bodyPr>
+          <a:lstStyle/>
+          <a:p>
+            <a:r>
+              <a:rPr lang="it-IT" sz="1600" dirty="0">
+                <a:solidFill>
+                  <a:schemeClr val="accent3">
+                    <a:lumMod val="50000"/>
+                  </a:schemeClr>
+                </a:solidFill>
+                <a:latin typeface="Calibri" panose="020F0502020204030204" pitchFamily="34" charset="0"/>
+                <a:cs typeface="Calibri" panose="020F0502020204030204" pitchFamily="34" charset="0"/>
+              </a:rPr>
+              <a:t>Aumentando</a:t>
+            </a:r>
+            <a:r>
+              <a:rPr lang="it-IT" sz="1600" dirty="0">
+                <a:solidFill>
+                  <a:schemeClr val="accent3">
+                    <a:lumMod val="75000"/>
+                  </a:schemeClr>
+                </a:solidFill>
+                <a:latin typeface="Calibri" panose="020F0502020204030204" pitchFamily="34" charset="0"/>
+                <a:cs typeface="Calibri" panose="020F0502020204030204" pitchFamily="34" charset="0"/>
+              </a:rPr>
+              <a:t> la probabilità di rumore la soglia si alza</a:t>
+            </a:r>
+          </a:p>
+        </p:txBody>
+      </p:sp>
+    </p:spTree>
+    <p:extLst>
+      <p:ext uri="{BB962C8B-B14F-4D97-AF65-F5344CB8AC3E}">
+        <p14:creationId xmlns:p14="http://schemas.microsoft.com/office/powerpoint/2010/main" val="3867886647"/>
+      </p:ext>
+    </p:extLst>
+  </p:cSld>
+  <p:clrMapOvr>
+    <a:masterClrMapping/>
+  </p:clrMapOvr>
+</p:sld>
+</file>
+
+<file path=ppt/slides/slide11.xml><?xml version="1.0" encoding="utf-8"?>
+<p:sld xmlns:a="http://schemas.openxmlformats.org/drawingml/2006/main" xmlns:r="http://schemas.openxmlformats.org/officeDocument/2006/relationships" xmlns:p="http://schemas.openxmlformats.org/presentationml/2006/main">
+  <p:cSld>
+    <p:spTree>
+      <p:nvGrpSpPr>
+        <p:cNvPr id="1" name=""/>
+        <p:cNvGrpSpPr/>
+        <p:nvPr/>
+      </p:nvGrpSpPr>
+      <p:grpSpPr>
+        <a:xfrm>
+          <a:off x="0" y="0"/>
+          <a:ext cx="0" cy="0"/>
+          <a:chOff x="0" y="0"/>
+          <a:chExt cx="0" cy="0"/>
+        </a:xfrm>
+      </p:grpSpPr>
+      <p:pic>
+        <p:nvPicPr>
+          <p:cNvPr id="10" name="Immagine 9">
+            <a:extLst>
+              <a:ext uri="{FF2B5EF4-FFF2-40B4-BE49-F238E27FC236}">
+                <a16:creationId xmlns:a16="http://schemas.microsoft.com/office/drawing/2014/main" id="{8E61818A-3793-4BD5-AACD-7CE3758C054E}"/>
+              </a:ext>
+            </a:extLst>
+          </p:cNvPr>
+          <p:cNvPicPr>
+            <a:picLocks noChangeAspect="1"/>
+          </p:cNvPicPr>
+          <p:nvPr/>
+        </p:nvPicPr>
+        <p:blipFill>
+          <a:blip r:embed="rId2">
+            <a:extLst>
+              <a:ext uri="{28A0092B-C50C-407E-A947-70E740481C1C}">
+                <a14:useLocalDpi xmlns:a14="http://schemas.microsoft.com/office/drawing/2010/main" val="0"/>
+              </a:ext>
+            </a:extLst>
+          </a:blip>
+          <a:srcRect/>
+          <a:stretch/>
+        </p:blipFill>
+        <p:spPr>
+          <a:xfrm>
+            <a:off x="1141413" y="1616657"/>
+            <a:ext cx="9456512" cy="4827198"/>
+          </a:xfrm>
+          <a:prstGeom prst="rect">
+            <a:avLst/>
+          </a:prstGeom>
+        </p:spPr>
+      </p:pic>
+      <p:sp>
+        <p:nvSpPr>
+          <p:cNvPr id="2" name="Titolo 1">
+            <a:extLst>
+              <a:ext uri="{FF2B5EF4-FFF2-40B4-BE49-F238E27FC236}">
+                <a16:creationId xmlns:a16="http://schemas.microsoft.com/office/drawing/2014/main" id="{235AAC29-1500-47EA-AC53-80AEC1D5A1F5}"/>
+              </a:ext>
+            </a:extLst>
+          </p:cNvPr>
+          <p:cNvSpPr>
+            <a:spLocks noGrp="1"/>
+          </p:cNvSpPr>
+          <p:nvPr>
+            <p:ph type="title"/>
+          </p:nvPr>
+        </p:nvSpPr>
+        <p:spPr>
+          <a:xfrm>
+            <a:off x="1141413" y="106790"/>
+            <a:ext cx="9905998" cy="874722"/>
+          </a:xfrm>
+        </p:spPr>
+        <p:txBody>
+          <a:bodyPr/>
+          <a:lstStyle/>
+          <a:p>
+            <a:r>
+              <a:rPr lang="it-IT" dirty="0"/>
+              <a:t>Soglia di pompaggio</a:t>
+            </a:r>
+          </a:p>
+        </p:txBody>
+      </p:sp>
+      <p:sp>
+        <p:nvSpPr>
+          <p:cNvPr id="4" name="CasellaDiTesto 3">
+            <a:extLst>
+              <a:ext uri="{FF2B5EF4-FFF2-40B4-BE49-F238E27FC236}">
+                <a16:creationId xmlns:a16="http://schemas.microsoft.com/office/drawing/2014/main" id="{DDC35683-D0E1-4379-9E1F-97650295748D}"/>
+              </a:ext>
+            </a:extLst>
+          </p:cNvPr>
+          <p:cNvSpPr txBox="1"/>
+          <p:nvPr/>
+        </p:nvSpPr>
+        <p:spPr>
+          <a:xfrm>
+            <a:off x="1031846" y="813732"/>
+            <a:ext cx="10184235" cy="646331"/>
+          </a:xfrm>
+          <a:prstGeom prst="rect">
+            <a:avLst/>
+          </a:prstGeom>
+          <a:noFill/>
+        </p:spPr>
+        <p:txBody>
+          <a:bodyPr wrap="square" rtlCol="0">
+            <a:spAutoFit/>
+          </a:bodyPr>
+          <a:lstStyle/>
+          <a:p>
+            <a:r>
+              <a:rPr lang="it-IT" dirty="0"/>
+              <a:t>Come ci si aspetta dal modello, è possibile trovare un valore di soglia per il pompaggio, oltre il quale la popolazione di fotoni aumenta ben oltre la popolazione riconducibile ad emissione spontanea.</a:t>
+            </a:r>
+          </a:p>
+        </p:txBody>
+      </p:sp>
+      <p:sp>
+        <p:nvSpPr>
+          <p:cNvPr id="8" name="CasellaDiTesto 7">
+            <a:extLst>
+              <a:ext uri="{FF2B5EF4-FFF2-40B4-BE49-F238E27FC236}">
+                <a16:creationId xmlns:a16="http://schemas.microsoft.com/office/drawing/2014/main" id="{ED09A5D3-A541-48E8-BD49-338450A6ECC3}"/>
+              </a:ext>
+            </a:extLst>
+          </p:cNvPr>
+          <p:cNvSpPr txBox="1"/>
+          <p:nvPr/>
+        </p:nvSpPr>
+        <p:spPr>
+          <a:xfrm>
+            <a:off x="1679196" y="1874617"/>
+            <a:ext cx="3438088" cy="584775"/>
+          </a:xfrm>
+          <a:prstGeom prst="rect">
+            <a:avLst/>
+          </a:prstGeom>
+          <a:noFill/>
+        </p:spPr>
+        <p:txBody>
+          <a:bodyPr wrap="square" rtlCol="0">
+            <a:spAutoFit/>
+          </a:bodyPr>
+          <a:lstStyle/>
+          <a:p>
+            <a:r>
+              <a:rPr lang="it-IT" sz="1600" dirty="0">
+                <a:solidFill>
+                  <a:schemeClr val="accent3">
+                    <a:lumMod val="75000"/>
+                  </a:schemeClr>
+                </a:solidFill>
+                <a:latin typeface="Calibri" panose="020F0502020204030204" pitchFamily="34" charset="0"/>
+                <a:cs typeface="Calibri" panose="020F0502020204030204" pitchFamily="34" charset="0"/>
+              </a:rPr>
+              <a:t>Al </a:t>
+            </a:r>
+            <a:r>
+              <a:rPr lang="it-IT" sz="1600" dirty="0">
+                <a:solidFill>
+                  <a:schemeClr val="bg2">
+                    <a:lumMod val="50000"/>
+                  </a:schemeClr>
+                </a:solidFill>
+                <a:latin typeface="Calibri" panose="020F0502020204030204" pitchFamily="34" charset="0"/>
+                <a:cs typeface="Calibri" panose="020F0502020204030204" pitchFamily="34" charset="0"/>
+              </a:rPr>
+              <a:t>diminuire</a:t>
+            </a:r>
+            <a:r>
+              <a:rPr lang="it-IT" sz="1600" dirty="0">
+                <a:solidFill>
+                  <a:schemeClr val="accent3">
+                    <a:lumMod val="75000"/>
+                  </a:schemeClr>
+                </a:solidFill>
+                <a:latin typeface="Calibri" panose="020F0502020204030204" pitchFamily="34" charset="0"/>
+                <a:cs typeface="Calibri" panose="020F0502020204030204" pitchFamily="34" charset="0"/>
+              </a:rPr>
+              <a:t> della probabilità di emissione stimolata, la soglia si alza</a:t>
+            </a:r>
+          </a:p>
+        </p:txBody>
+      </p:sp>
+      <p:sp>
+        <p:nvSpPr>
+          <p:cNvPr id="3" name="CasellaDiTesto 2">
+            <a:extLst>
+              <a:ext uri="{FF2B5EF4-FFF2-40B4-BE49-F238E27FC236}">
+                <a16:creationId xmlns:a16="http://schemas.microsoft.com/office/drawing/2014/main" id="{98B5D005-5F5B-4204-A237-CD43F1B765D3}"/>
+              </a:ext>
+            </a:extLst>
+          </p:cNvPr>
+          <p:cNvSpPr txBox="1"/>
+          <p:nvPr/>
+        </p:nvSpPr>
+        <p:spPr>
+          <a:xfrm>
+            <a:off x="5998128" y="4739780"/>
+            <a:ext cx="4395832" cy="1477328"/>
+          </a:xfrm>
+          <a:prstGeom prst="rect">
+            <a:avLst/>
+          </a:prstGeom>
+          <a:noFill/>
+        </p:spPr>
+        <p:txBody>
+          <a:bodyPr wrap="square" rtlCol="0">
+            <a:spAutoFit/>
+          </a:bodyPr>
+          <a:lstStyle/>
+          <a:p>
+            <a:r>
+              <a:rPr lang="it-IT" dirty="0">
+                <a:solidFill>
+                  <a:schemeClr val="bg1"/>
+                </a:solidFill>
+              </a:rPr>
+              <a:t>In base al modello del paper originale, non abbiamo esattamente una probabilità di emissione stimolata, ma una soglia di fotoni adiacenti. Aumentando tale soglia, diminuisce la probabilità di emissione stimolata</a:t>
+            </a:r>
+          </a:p>
+        </p:txBody>
+      </p:sp>
+    </p:spTree>
+    <p:extLst>
+      <p:ext uri="{BB962C8B-B14F-4D97-AF65-F5344CB8AC3E}">
+        <p14:creationId xmlns:p14="http://schemas.microsoft.com/office/powerpoint/2010/main" val="3457851968"/>
+      </p:ext>
+    </p:extLst>
+  </p:cSld>
+  <p:clrMapOvr>
+    <a:masterClrMapping/>
+  </p:clrMapOvr>
+</p:sld>
+</file>
+
+<file path=ppt/slides/slide12.xml><?xml version="1.0" encoding="utf-8"?>
+<p:sld xmlns:a="http://schemas.openxmlformats.org/drawingml/2006/main" xmlns:r="http://schemas.openxmlformats.org/officeDocument/2006/relationships" xmlns:p="http://schemas.openxmlformats.org/presentationml/2006/main">
+  <p:cSld>
+    <p:spTree>
+      <p:nvGrpSpPr>
+        <p:cNvPr id="1" name=""/>
+        <p:cNvGrpSpPr/>
+        <p:nvPr/>
+      </p:nvGrpSpPr>
+      <p:grpSpPr>
+        <a:xfrm>
+          <a:off x="0" y="0"/>
+          <a:ext cx="0" cy="0"/>
+          <a:chOff x="0" y="0"/>
+          <a:chExt cx="0" cy="0"/>
+        </a:xfrm>
+      </p:grpSpPr>
       <p:sp>
         <p:nvSpPr>
           <p:cNvPr id="2" name="Titolo 1">
@@ -12638,7 +13076,7 @@
 </p:sld>
 </file>
 
-<file path=ppt/slides/slide11.xml><?xml version="1.0" encoding="utf-8"?>
+<file path=ppt/slides/slide13.xml><?xml version="1.0" encoding="utf-8"?>
 <p:sld xmlns:a="http://schemas.openxmlformats.org/drawingml/2006/main" xmlns:r="http://schemas.openxmlformats.org/officeDocument/2006/relationships" xmlns:p="http://schemas.openxmlformats.org/presentationml/2006/main">
   <p:cSld>
     <p:spTree>
@@ -13115,7 +13553,7 @@
 </p:sld>
 </file>
 
-<file path=ppt/slides/slide12.xml><?xml version="1.0" encoding="utf-8"?>
+<file path=ppt/slides/slide14.xml><?xml version="1.0" encoding="utf-8"?>
 <p:sld xmlns:a="http://schemas.openxmlformats.org/drawingml/2006/main" xmlns:r="http://schemas.openxmlformats.org/officeDocument/2006/relationships" xmlns:p="http://schemas.openxmlformats.org/presentationml/2006/main">
   <p:cSld>
     <p:spTree>
@@ -13165,8 +13603,8 @@
           </a:p>
         </p:txBody>
       </p:sp>
-      <mc:AlternateContent xmlns:mc="http://schemas.openxmlformats.org/markup-compatibility/2006">
-        <mc:Choice xmlns:a14="http://schemas.microsoft.com/office/drawing/2010/main" Requires="a14">
+      <mc:AlternateContent xmlns:mc="http://schemas.openxmlformats.org/markup-compatibility/2006" xmlns:a14="http://schemas.microsoft.com/office/drawing/2010/main">
+        <mc:Choice Requires="a14">
           <p:sp>
             <p:nvSpPr>
               <p:cNvPr id="6" name="CasellaDiTesto 5">
@@ -13268,7 +13706,7 @@
                     <m:sSub>
                       <m:sSubPr>
                         <m:ctrlPr>
-                          <a:rPr lang="it-IT" b="0" i="0" smtClean="0">
+                          <a:rPr lang="it-IT" b="0" i="1" smtClean="0">
                             <a:latin typeface="Cambria Math" panose="02040503050406030204" pitchFamily="18" charset="0"/>
                             <a:ea typeface="Cambria Math" panose="02040503050406030204" pitchFamily="18" charset="0"/>
                           </a:rPr>
@@ -13344,7 +13782,7 @@
             </p:txBody>
           </p:sp>
         </mc:Choice>
-        <mc:Fallback>
+        <mc:Fallback xmlns="">
           <p:sp>
             <p:nvSpPr>
               <p:cNvPr id="6" name="CasellaDiTesto 5">
@@ -13402,6 +13840,117 @@
 </p:sld>
 </file>
 
+<file path=ppt/slides/slide15.xml><?xml version="1.0" encoding="utf-8"?>
+<p:sld xmlns:a="http://schemas.openxmlformats.org/drawingml/2006/main" xmlns:r="http://schemas.openxmlformats.org/officeDocument/2006/relationships" xmlns:p="http://schemas.openxmlformats.org/presentationml/2006/main">
+  <p:cSld>
+    <p:spTree>
+      <p:nvGrpSpPr>
+        <p:cNvPr id="1" name=""/>
+        <p:cNvGrpSpPr/>
+        <p:nvPr/>
+      </p:nvGrpSpPr>
+      <p:grpSpPr>
+        <a:xfrm>
+          <a:off x="0" y="0"/>
+          <a:ext cx="0" cy="0"/>
+          <a:chOff x="0" y="0"/>
+          <a:chExt cx="0" cy="0"/>
+        </a:xfrm>
+      </p:grpSpPr>
+      <p:sp>
+        <p:nvSpPr>
+          <p:cNvPr id="2" name="Titolo 1">
+            <a:extLst>
+              <a:ext uri="{FF2B5EF4-FFF2-40B4-BE49-F238E27FC236}">
+                <a16:creationId xmlns:a16="http://schemas.microsoft.com/office/drawing/2014/main" id="{904C59F9-715F-42B3-B69F-A76A0649EC22}"/>
+              </a:ext>
+            </a:extLst>
+          </p:cNvPr>
+          <p:cNvSpPr>
+            <a:spLocks noGrp="1"/>
+          </p:cNvSpPr>
+          <p:nvPr>
+            <p:ph type="title"/>
+          </p:nvPr>
+        </p:nvSpPr>
+        <p:spPr/>
+        <p:txBody>
+          <a:bodyPr/>
+          <a:lstStyle/>
+          <a:p>
+            <a:r>
+              <a:rPr lang="it-IT" dirty="0"/>
+              <a:t>Fonti</a:t>
+            </a:r>
+          </a:p>
+        </p:txBody>
+      </p:sp>
+      <p:sp>
+        <p:nvSpPr>
+          <p:cNvPr id="3" name="Segnaposto contenuto 2">
+            <a:extLst>
+              <a:ext uri="{FF2B5EF4-FFF2-40B4-BE49-F238E27FC236}">
+                <a16:creationId xmlns:a16="http://schemas.microsoft.com/office/drawing/2014/main" id="{E6D082B1-3823-4E89-BBA8-05985438D9C7}"/>
+              </a:ext>
+            </a:extLst>
+          </p:cNvPr>
+          <p:cNvSpPr>
+            <a:spLocks noGrp="1"/>
+          </p:cNvSpPr>
+          <p:nvPr>
+            <p:ph idx="1"/>
+          </p:nvPr>
+        </p:nvSpPr>
+        <p:spPr/>
+        <p:txBody>
+          <a:bodyPr>
+            <a:normAutofit/>
+          </a:bodyPr>
+          <a:lstStyle/>
+          <a:p>
+            <a:r>
+              <a:rPr lang="it-IT" sz="1600" dirty="0"/>
+              <a:t>Paper iniziale [1]: </a:t>
+            </a:r>
+            <a:r>
+              <a:rPr lang="it-IT" sz="1600" dirty="0">
+                <a:hlinkClick r:id="rId2"/>
+              </a:rPr>
+              <a:t>https://www.researchgate.net/publication/226637251_Laser_Dynamics_Modelling_and_Simulation_An_Application_of_Dynamic_Load_Balancing_of_Parallel_Cellular_Automata</a:t>
+            </a:r>
+            <a:endParaRPr lang="it-IT" sz="1600" dirty="0"/>
+          </a:p>
+          <a:p>
+            <a:endParaRPr lang="it-IT" sz="1600" dirty="0"/>
+          </a:p>
+          <a:p>
+            <a:r>
+              <a:rPr lang="it-IT" sz="1600" dirty="0"/>
+              <a:t>Dettaglio sul pompaggio di soglia e i regimi di funzionamento [2]: </a:t>
+            </a:r>
+            <a:r>
+              <a:rPr lang="it-IT" sz="1600" dirty="0">
+                <a:hlinkClick r:id="rId3"/>
+              </a:rPr>
+              <a:t>https://www.researchgate.net/publication/7525971_Cellular_automaton_model_for_the_simulation_of_laser_dynamics</a:t>
+            </a:r>
+            <a:endParaRPr lang="it-IT" sz="1600" dirty="0"/>
+          </a:p>
+        </p:txBody>
+      </p:sp>
+    </p:spTree>
+    <p:extLst>
+      <p:ext uri="{BB962C8B-B14F-4D97-AF65-F5344CB8AC3E}">
+        <p14:creationId xmlns:p14="http://schemas.microsoft.com/office/powerpoint/2010/main" val="2451398218"/>
+      </p:ext>
+    </p:extLst>
+  </p:cSld>
+  <p:clrMapOvr>
+    <a:masterClrMapping/>
+  </p:clrMapOvr>
+</p:sld>
+</file>
+
 <file path=ppt/slides/slide2.xml><?xml version="1.0" encoding="utf-8"?>
 <p:sld xmlns:a="http://schemas.openxmlformats.org/drawingml/2006/main" xmlns:r="http://schemas.openxmlformats.org/officeDocument/2006/relationships" xmlns:p="http://schemas.openxmlformats.org/presentationml/2006/main">
   <p:cSld>
@@ -13471,7 +14020,7 @@
         <p:spPr>
           <a:xfrm>
             <a:off x="4806892" y="1392838"/>
-            <a:ext cx="6240519" cy="5007961"/>
+            <a:ext cx="6240519" cy="2474487"/>
           </a:xfrm>
         </p:spPr>
         <p:txBody>
@@ -13486,7 +14035,7 @@
           <a:p>
             <a:r>
               <a:rPr lang="it-IT" dirty="0"/>
-              <a:t>Gli automi cellulari sono sistemi computazionali semplici che si prestano bene a descrivere sistemi di equazioni differenziali avanzati.</a:t>
+              <a:t>Gli automi cellulari sono modelli algoritmici semplici che si prestano bene a descrivere sistemi di equazioni differenziali di questo tipo.</a:t>
             </a:r>
           </a:p>
           <a:p>
@@ -13523,7 +14072,7 @@
         </p:blipFill>
         <p:spPr bwMode="auto">
           <a:xfrm>
-            <a:off x="273253" y="2645825"/>
+            <a:off x="331976" y="2142486"/>
             <a:ext cx="4156133" cy="1566350"/>
           </a:xfrm>
           <a:prstGeom prst="rect">
@@ -13541,6 +14090,132 @@
           </a:extLst>
         </p:spPr>
       </p:pic>
+      <p:sp>
+        <p:nvSpPr>
+          <p:cNvPr id="4" name="CasellaDiTesto 3">
+            <a:extLst>
+              <a:ext uri="{FF2B5EF4-FFF2-40B4-BE49-F238E27FC236}">
+                <a16:creationId xmlns:a16="http://schemas.microsoft.com/office/drawing/2014/main" id="{22875600-16EA-4D9E-A6D1-BDE7866AE24D}"/>
+              </a:ext>
+            </a:extLst>
+          </p:cNvPr>
+          <p:cNvSpPr txBox="1"/>
+          <p:nvPr/>
+        </p:nvSpPr>
+        <p:spPr>
+          <a:xfrm>
+            <a:off x="1040235" y="3967993"/>
+            <a:ext cx="10007176" cy="1477328"/>
+          </a:xfrm>
+          <a:prstGeom prst="rect">
+            <a:avLst/>
+          </a:prstGeom>
+          <a:noFill/>
+        </p:spPr>
+        <p:txBody>
+          <a:bodyPr wrap="square" rtlCol="0">
+            <a:spAutoFit/>
+          </a:bodyPr>
+          <a:lstStyle/>
+          <a:p>
+            <a:r>
+              <a:rPr lang="it-IT" dirty="0">
+                <a:latin typeface="Arial" panose="020B0604020202020204" pitchFamily="34" charset="0"/>
+                <a:cs typeface="Arial" panose="020B0604020202020204" pitchFamily="34" charset="0"/>
+              </a:rPr>
+              <a:t>E’ inevitabile fare assunzioni semplificative su determinati parametri: ad esempio la simulazione non basa il pompaggio sulla corrente, non lavoriamo con una </a:t>
+            </a:r>
+            <a:r>
+              <a:rPr lang="it-IT" i="1" dirty="0" err="1">
+                <a:latin typeface="Arial" panose="020B0604020202020204" pitchFamily="34" charset="0"/>
+                <a:cs typeface="Arial" panose="020B0604020202020204" pitchFamily="34" charset="0"/>
+              </a:rPr>
+              <a:t>stimulated</a:t>
+            </a:r>
+            <a:r>
+              <a:rPr lang="it-IT" i="1" dirty="0">
+                <a:latin typeface="Arial" panose="020B0604020202020204" pitchFamily="34" charset="0"/>
+                <a:cs typeface="Arial" panose="020B0604020202020204" pitchFamily="34" charset="0"/>
+              </a:rPr>
+              <a:t> </a:t>
+            </a:r>
+            <a:r>
+              <a:rPr lang="it-IT" i="1" dirty="0" err="1">
+                <a:latin typeface="Arial" panose="020B0604020202020204" pitchFamily="34" charset="0"/>
+                <a:cs typeface="Arial" panose="020B0604020202020204" pitchFamily="34" charset="0"/>
+              </a:rPr>
+              <a:t>emission</a:t>
+            </a:r>
+            <a:r>
+              <a:rPr lang="it-IT" i="1" dirty="0">
+                <a:latin typeface="Arial" panose="020B0604020202020204" pitchFamily="34" charset="0"/>
+                <a:cs typeface="Arial" panose="020B0604020202020204" pitchFamily="34" charset="0"/>
+              </a:rPr>
+              <a:t> cross-</a:t>
+            </a:r>
+            <a:r>
+              <a:rPr lang="it-IT" i="1" dirty="0" err="1">
+                <a:latin typeface="Arial" panose="020B0604020202020204" pitchFamily="34" charset="0"/>
+                <a:cs typeface="Arial" panose="020B0604020202020204" pitchFamily="34" charset="0"/>
+              </a:rPr>
+              <a:t>section</a:t>
+            </a:r>
+            <a:r>
+              <a:rPr lang="it-IT" dirty="0">
+                <a:latin typeface="Arial" panose="020B0604020202020204" pitchFamily="34" charset="0"/>
+                <a:cs typeface="Arial" panose="020B0604020202020204" pitchFamily="34" charset="0"/>
+              </a:rPr>
+              <a:t>, ma con una «soglia di emissione stimolata», usiamo una </a:t>
+            </a:r>
+            <a:r>
+              <a:rPr lang="it-IT" dirty="0" err="1">
+                <a:latin typeface="Arial" panose="020B0604020202020204" pitchFamily="34" charset="0"/>
+                <a:cs typeface="Arial" panose="020B0604020202020204" pitchFamily="34" charset="0"/>
+              </a:rPr>
+              <a:t>pumping</a:t>
+            </a:r>
+            <a:r>
+              <a:rPr lang="it-IT" dirty="0">
+                <a:latin typeface="Arial" panose="020B0604020202020204" pitchFamily="34" charset="0"/>
+                <a:cs typeface="Arial" panose="020B0604020202020204" pitchFamily="34" charset="0"/>
+              </a:rPr>
+              <a:t> </a:t>
+            </a:r>
+            <a:r>
+              <a:rPr lang="it-IT" dirty="0" err="1">
+                <a:latin typeface="Arial" panose="020B0604020202020204" pitchFamily="34" charset="0"/>
+                <a:cs typeface="Arial" panose="020B0604020202020204" pitchFamily="34" charset="0"/>
+              </a:rPr>
+              <a:t>probability</a:t>
+            </a:r>
+            <a:r>
+              <a:rPr lang="it-IT" dirty="0">
+                <a:latin typeface="Arial" panose="020B0604020202020204" pitchFamily="34" charset="0"/>
+                <a:cs typeface="Arial" panose="020B0604020202020204" pitchFamily="34" charset="0"/>
+              </a:rPr>
+              <a:t> (tuttavia facilmente riconducibile ad una </a:t>
+            </a:r>
+            <a:r>
+              <a:rPr lang="it-IT" i="1" dirty="0">
+                <a:latin typeface="Arial" panose="020B0604020202020204" pitchFamily="34" charset="0"/>
+                <a:cs typeface="Arial" panose="020B0604020202020204" pitchFamily="34" charset="0"/>
+              </a:rPr>
+              <a:t>rate</a:t>
+            </a:r>
+            <a:r>
+              <a:rPr lang="it-IT" dirty="0">
+                <a:latin typeface="Arial" panose="020B0604020202020204" pitchFamily="34" charset="0"/>
+                <a:cs typeface="Arial" panose="020B0604020202020204" pitchFamily="34" charset="0"/>
+              </a:rPr>
+              <a:t> a regime). Il modello del rumore è probabilmente quello che più risente della semplificazione.</a:t>
+            </a:r>
+            <a:endParaRPr lang="it-IT" i="1" dirty="0">
+              <a:latin typeface="Arial" panose="020B0604020202020204" pitchFamily="34" charset="0"/>
+              <a:cs typeface="Arial" panose="020B0604020202020204" pitchFamily="34" charset="0"/>
+            </a:endParaRPr>
+          </a:p>
+        </p:txBody>
+      </p:sp>
     </p:spTree>
     <p:extLst>
       <p:ext uri="{BB962C8B-B14F-4D97-AF65-F5344CB8AC3E}">
@@ -13674,7 +14349,7 @@
             </a:r>
             <a:r>
               <a:rPr lang="it-IT" dirty="0"/>
-              <a:t> istantanee e non radiative.</a:t>
+              <a:t> istantanei e non radiativi.</a:t>
             </a:r>
           </a:p>
           <a:p>
@@ -13813,6 +14488,77 @@
           </a:prstGeom>
         </p:spPr>
       </p:pic>
+      <p:sp>
+        <p:nvSpPr>
+          <p:cNvPr id="4" name="CasellaDiTesto 3">
+            <a:extLst>
+              <a:ext uri="{FF2B5EF4-FFF2-40B4-BE49-F238E27FC236}">
+                <a16:creationId xmlns:a16="http://schemas.microsoft.com/office/drawing/2014/main" id="{C2F8297F-04E3-40DC-ABAC-361ED2085971}"/>
+              </a:ext>
+            </a:extLst>
+          </p:cNvPr>
+          <p:cNvSpPr txBox="1"/>
+          <p:nvPr/>
+        </p:nvSpPr>
+        <p:spPr>
+          <a:xfrm>
+            <a:off x="847798" y="4530055"/>
+            <a:ext cx="3803798" cy="1477328"/>
+          </a:xfrm>
+          <a:prstGeom prst="rect">
+            <a:avLst/>
+          </a:prstGeom>
+          <a:noFill/>
+        </p:spPr>
+        <p:txBody>
+          <a:bodyPr wrap="square" rtlCol="0">
+            <a:spAutoFit/>
+          </a:bodyPr>
+          <a:lstStyle/>
+          <a:p>
+            <a:r>
+              <a:rPr lang="it-IT" dirty="0"/>
+              <a:t>Si tratta dell’automa di base, quello descritto nel paper di partenza</a:t>
+            </a:r>
+            <a:r>
+              <a:rPr lang="it-IT" baseline="30000" dirty="0"/>
+              <a:t>[1]</a:t>
+            </a:r>
+            <a:r>
+              <a:rPr lang="it-IT" dirty="0"/>
+              <a:t>: l’emissione spontanea e l’eccitazione termica sono condensate in una </a:t>
+            </a:r>
+            <a:r>
+              <a:rPr lang="it-IT" i="1" dirty="0" err="1"/>
+              <a:t>noise</a:t>
+            </a:r>
+            <a:r>
+              <a:rPr lang="it-IT" i="1" dirty="0"/>
+              <a:t> </a:t>
+            </a:r>
+            <a:r>
+              <a:rPr lang="it-IT" i="1" dirty="0" err="1"/>
+              <a:t>photon</a:t>
+            </a:r>
+            <a:r>
+              <a:rPr lang="it-IT" i="1" dirty="0"/>
+              <a:t> </a:t>
+            </a:r>
+            <a:r>
+              <a:rPr lang="it-IT" i="1" dirty="0" err="1"/>
+              <a:t>creation</a:t>
+            </a:r>
+            <a:r>
+              <a:rPr lang="it-IT" i="1" dirty="0"/>
+              <a:t> rule</a:t>
+            </a:r>
+            <a:r>
+              <a:rPr lang="it-IT" dirty="0"/>
+              <a:t>.</a:t>
+            </a:r>
+          </a:p>
+        </p:txBody>
+      </p:sp>
     </p:spTree>
     <p:extLst>
       <p:ext uri="{BB962C8B-B14F-4D97-AF65-F5344CB8AC3E}">
@@ -13862,7 +14608,7 @@
         <p:spPr>
           <a:xfrm>
             <a:off x="1141413" y="327514"/>
-            <a:ext cx="9905998" cy="1478570"/>
+            <a:ext cx="9905998" cy="855334"/>
           </a:xfrm>
         </p:spPr>
         <p:txBody>
@@ -13894,19 +14640,19 @@
         </p:nvSpPr>
         <p:spPr>
           <a:xfrm>
-            <a:off x="1141412" y="1551962"/>
-            <a:ext cx="9905999" cy="4714613"/>
+            <a:off x="1141412" y="1057014"/>
+            <a:ext cx="9905999" cy="5209562"/>
           </a:xfrm>
         </p:spPr>
         <p:txBody>
           <a:bodyPr>
-            <a:normAutofit lnSpcReduction="10000"/>
+            <a:normAutofit/>
           </a:bodyPr>
           <a:lstStyle/>
           <a:p>
             <a:r>
               <a:rPr lang="it-IT" dirty="0"/>
-              <a:t>L’automa è rappresentato da reticolo bidimensionale, in cui ogni cella ha un suo stato.</a:t>
+              <a:t>L’automa è rappresentato da un reticolo bidimensionale, in cui ogni cella ha un suo stato.</a:t>
             </a:r>
           </a:p>
           <a:p>
@@ -14035,8 +14781,8 @@
         </p:nvSpPr>
         <p:spPr>
           <a:xfrm>
-            <a:off x="3766657" y="906012"/>
-            <a:ext cx="8245488" cy="5444454"/>
+            <a:off x="679508" y="906012"/>
+            <a:ext cx="11332637" cy="5444454"/>
           </a:xfrm>
         </p:spPr>
         <p:txBody>
@@ -14117,7 +14863,7 @@
             </a:pPr>
             <a:r>
               <a:rPr lang="it-IT" dirty="0"/>
-              <a:t>Allo scadere del tempo di vita del fotone, viene distrutto.</a:t>
+              <a:t>Allo scadere del tempo di vita del fotone, questo viene distrutto.</a:t>
             </a:r>
           </a:p>
           <a:p>
@@ -14148,7 +14894,7 @@
             </a:pPr>
             <a:r>
               <a:rPr lang="it-IT" dirty="0"/>
-              <a:t>Allo scadere del tempo di vita dell’elettrone, avviene un decadimento non radiativo spontaneo.</a:t>
+              <a:t>Allo scadere del tempo di vita dell’elettrone, si assiste ad un decadimento non radiativo.</a:t>
             </a:r>
           </a:p>
           <a:p>
@@ -14243,8 +14989,8 @@
         </p:nvSpPr>
         <p:spPr>
           <a:xfrm>
-            <a:off x="3766657" y="906012"/>
-            <a:ext cx="8245488" cy="5444454"/>
+            <a:off x="783862" y="931179"/>
+            <a:ext cx="11408138" cy="5444454"/>
           </a:xfrm>
         </p:spPr>
         <p:txBody>
@@ -15063,28 +15809,6 @@
                   </a:schemeClr>
                 </a:solidFill>
               </a:rPr>
-              <a:t>molto </a:t>
-            </a:r>
-            <a:r>
-              <a:rPr lang="en-US" dirty="0" err="1">
-                <a:solidFill>
-                  <a:schemeClr val="bg1">
-                    <a:lumMod val="95000"/>
-                    <a:lumOff val="5000"/>
-                  </a:schemeClr>
-                </a:solidFill>
-              </a:rPr>
-              <a:t>vicini</a:t>
-            </a:r>
-            <a:r>
-              <a:rPr lang="en-US" dirty="0">
-                <a:solidFill>
-                  <a:schemeClr val="bg1">
-                    <a:lumMod val="95000"/>
-                    <a:lumOff val="5000"/>
-                  </a:schemeClr>
-                </a:solidFill>
-              </a:rPr>
               <a:t>, il regime di </a:t>
             </a:r>
             <a:r>
@@ -15553,6 +16277,36 @@
           <a:chExt cx="0" cy="0"/>
         </a:xfrm>
       </p:grpSpPr>
+      <p:pic>
+        <p:nvPicPr>
+          <p:cNvPr id="10" name="Immagine 9">
+            <a:extLst>
+              <a:ext uri="{FF2B5EF4-FFF2-40B4-BE49-F238E27FC236}">
+                <a16:creationId xmlns:a16="http://schemas.microsoft.com/office/drawing/2014/main" id="{8E61818A-3793-4BD5-AACD-7CE3758C054E}"/>
+              </a:ext>
+            </a:extLst>
+          </p:cNvPr>
+          <p:cNvPicPr>
+            <a:picLocks noChangeAspect="1"/>
+          </p:cNvPicPr>
+          <p:nvPr/>
+        </p:nvPicPr>
+        <p:blipFill>
+          <a:blip r:embed="rId2"/>
+          <a:stretch>
+            <a:fillRect/>
+          </a:stretch>
+        </p:blipFill>
+        <p:spPr>
+          <a:xfrm>
+            <a:off x="1141413" y="1457485"/>
+            <a:ext cx="9456512" cy="5145543"/>
+          </a:xfrm>
+          <a:prstGeom prst="rect">
+            <a:avLst/>
+          </a:prstGeom>
+        </p:spPr>
+      </p:pic>
       <p:sp>
         <p:nvSpPr>
           <p:cNvPr id="2" name="Titolo 1">
@@ -15631,61 +16385,6 @@
       </p:sp>
       <p:sp>
         <p:nvSpPr>
-          <p:cNvPr id="5" name="CasellaDiTesto 4">
-            <a:extLst>
-              <a:ext uri="{FF2B5EF4-FFF2-40B4-BE49-F238E27FC236}">
-                <a16:creationId xmlns:a16="http://schemas.microsoft.com/office/drawing/2014/main" id="{1D8C7D55-2EE2-4CF5-B0CA-92D5394A27F6}"/>
-              </a:ext>
-            </a:extLst>
-          </p:cNvPr>
-          <p:cNvSpPr txBox="1"/>
-          <p:nvPr/>
-        </p:nvSpPr>
-        <p:spPr>
-          <a:xfrm>
-            <a:off x="1031846" y="1639159"/>
-            <a:ext cx="2978092" cy="584775"/>
-          </a:xfrm>
-          <a:prstGeom prst="rect">
-            <a:avLst/>
-          </a:prstGeom>
-          <a:noFill/>
-        </p:spPr>
-        <p:txBody>
-          <a:bodyPr wrap="square" rtlCol="0">
-            <a:spAutoFit/>
-          </a:bodyPr>
-          <a:lstStyle/>
-          <a:p>
-            <a:r>
-              <a:rPr lang="it-IT" sz="1600" dirty="0">
-                <a:solidFill>
-                  <a:schemeClr val="accent3">
-                    <a:lumMod val="50000"/>
-                  </a:schemeClr>
-                </a:solidFill>
-                <a:latin typeface="Calibri" panose="020F0502020204030204" pitchFamily="34" charset="0"/>
-                <a:cs typeface="Calibri" panose="020F0502020204030204" pitchFamily="34" charset="0"/>
-              </a:rPr>
-              <a:t>Aumentando</a:t>
-            </a:r>
-            <a:r>
-              <a:rPr lang="it-IT" sz="1600" dirty="0">
-                <a:solidFill>
-                  <a:schemeClr val="accent3">
-                    <a:lumMod val="75000"/>
-                  </a:schemeClr>
-                </a:solidFill>
-                <a:latin typeface="Calibri" panose="020F0502020204030204" pitchFamily="34" charset="0"/>
-                <a:cs typeface="Calibri" panose="020F0502020204030204" pitchFamily="34" charset="0"/>
-              </a:rPr>
-              <a:t> la probabilità di rumore la soglia si alza</a:t>
-            </a:r>
-          </a:p>
-        </p:txBody>
-      </p:sp>
-      <p:sp>
-        <p:nvSpPr>
           <p:cNvPr id="6" name="CasellaDiTesto 5">
             <a:extLst>
               <a:ext uri="{FF2B5EF4-FFF2-40B4-BE49-F238E27FC236}">
@@ -15698,7 +16397,7 @@
         </p:nvSpPr>
         <p:spPr>
           <a:xfrm>
-            <a:off x="8256166" y="2598003"/>
+            <a:off x="2685875" y="1813875"/>
             <a:ext cx="3438088" cy="830997"/>
           </a:xfrm>
           <a:prstGeom prst="rect">
@@ -15735,73 +16434,6 @@
                 <a:cs typeface="Calibri" panose="020F0502020204030204" pitchFamily="34" charset="0"/>
               </a:rPr>
               <a:t> il tempo di vita della cavità o dei portatori, la soglia si abbassa</a:t>
-            </a:r>
-          </a:p>
-        </p:txBody>
-      </p:sp>
-      <p:sp>
-        <p:nvSpPr>
-          <p:cNvPr id="7" name="CasellaDiTesto 6">
-            <a:extLst>
-              <a:ext uri="{FF2B5EF4-FFF2-40B4-BE49-F238E27FC236}">
-                <a16:creationId xmlns:a16="http://schemas.microsoft.com/office/drawing/2014/main" id="{C2BE6774-1976-4244-99DF-B710584B976F}"/>
-              </a:ext>
-            </a:extLst>
-          </p:cNvPr>
-          <p:cNvSpPr txBox="1"/>
-          <p:nvPr/>
-        </p:nvSpPr>
-        <p:spPr>
-          <a:xfrm>
-            <a:off x="1031846" y="4341679"/>
-            <a:ext cx="3438088" cy="584775"/>
-          </a:xfrm>
-          <a:prstGeom prst="rect">
-            <a:avLst/>
-          </a:prstGeom>
-          <a:noFill/>
-        </p:spPr>
-        <p:txBody>
-          <a:bodyPr wrap="square" rtlCol="0">
-            <a:spAutoFit/>
-          </a:bodyPr>
-          <a:lstStyle/>
-          <a:p>
-            <a:r>
-              <a:rPr lang="it-IT" sz="1600" dirty="0">
-                <a:solidFill>
-                  <a:schemeClr val="accent3">
-                    <a:lumMod val="75000"/>
-                  </a:schemeClr>
-                </a:solidFill>
-                <a:latin typeface="Calibri" panose="020F0502020204030204" pitchFamily="34" charset="0"/>
-                <a:cs typeface="Calibri" panose="020F0502020204030204" pitchFamily="34" charset="0"/>
-              </a:rPr>
-              <a:t>Al </a:t>
-            </a:r>
-            <a:r>
-              <a:rPr lang="it-IT" sz="1600" dirty="0">
-                <a:solidFill>
-                  <a:schemeClr val="bg2">
-                    <a:lumMod val="50000"/>
-                  </a:schemeClr>
-                </a:solidFill>
-                <a:latin typeface="Calibri" panose="020F0502020204030204" pitchFamily="34" charset="0"/>
-                <a:cs typeface="Calibri" panose="020F0502020204030204" pitchFamily="34" charset="0"/>
-              </a:rPr>
-              <a:t>diminuire</a:t>
-            </a:r>
-            <a:r>
-              <a:rPr lang="it-IT" sz="1600" dirty="0">
-                <a:solidFill>
-                  <a:schemeClr val="accent3">
-                    <a:lumMod val="75000"/>
-                  </a:schemeClr>
-                </a:solidFill>
-                <a:latin typeface="Calibri" panose="020F0502020204030204" pitchFamily="34" charset="0"/>
-                <a:cs typeface="Calibri" panose="020F0502020204030204" pitchFamily="34" charset="0"/>
-              </a:rPr>
-              <a:t> della probabilità di emissione stimolata, la soglia si alza</a:t>
             </a:r>
           </a:p>
         </p:txBody>

</xml_diff>